<commit_message>
atualização slides de aulas 31Ago2023
</commit_message>
<xml_diff>
--- a/01 Classes/Aula03- BD Dinâmica Modelo de Domínio.pptx
+++ b/01 Classes/Aula03- BD Dinâmica Modelo de Domínio.pptx
@@ -5,35 +5,36 @@
     <p:sldMasterId id="2147483648" r:id="rId1"/>
   </p:sldMasterIdLst>
   <p:notesMasterIdLst>
-    <p:notesMasterId r:id="rId11"/>
+    <p:notesMasterId r:id="rId12"/>
   </p:notesMasterIdLst>
   <p:sldIdLst>
     <p:sldId id="256" r:id="rId2"/>
     <p:sldId id="257" r:id="rId3"/>
-    <p:sldId id="264" r:id="rId4"/>
-    <p:sldId id="258" r:id="rId5"/>
-    <p:sldId id="262" r:id="rId6"/>
-    <p:sldId id="261" r:id="rId7"/>
-    <p:sldId id="259" r:id="rId8"/>
-    <p:sldId id="263" r:id="rId9"/>
-    <p:sldId id="260" r:id="rId10"/>
+    <p:sldId id="265" r:id="rId4"/>
+    <p:sldId id="264" r:id="rId5"/>
+    <p:sldId id="258" r:id="rId6"/>
+    <p:sldId id="262" r:id="rId7"/>
+    <p:sldId id="261" r:id="rId8"/>
+    <p:sldId id="259" r:id="rId9"/>
+    <p:sldId id="263" r:id="rId10"/>
+    <p:sldId id="260" r:id="rId11"/>
   </p:sldIdLst>
   <p:sldSz cx="12192000" cy="6858000"/>
   <p:notesSz cx="6858000" cy="9144000"/>
   <p:embeddedFontLst>
     <p:embeddedFont>
       <p:font typeface="Calibri" panose="020F0502020204030204" pitchFamily="34" charset="0"/>
-      <p:regular r:id="rId12"/>
-      <p:bold r:id="rId13"/>
-      <p:italic r:id="rId14"/>
-      <p:boldItalic r:id="rId15"/>
+      <p:regular r:id="rId13"/>
+      <p:bold r:id="rId14"/>
+      <p:italic r:id="rId15"/>
+      <p:boldItalic r:id="rId16"/>
     </p:embeddedFont>
     <p:embeddedFont>
       <p:font typeface="Century Schoolbook" panose="02040604050505020304" pitchFamily="18" charset="0"/>
-      <p:regular r:id="rId16"/>
-      <p:bold r:id="rId17"/>
-      <p:italic r:id="rId18"/>
-      <p:boldItalic r:id="rId19"/>
+      <p:regular r:id="rId17"/>
+      <p:bold r:id="rId18"/>
+      <p:italic r:id="rId19"/>
+      <p:boldItalic r:id="rId20"/>
     </p:embeddedFont>
   </p:embeddedFontLst>
   <p:defaultTextStyle>
@@ -281,7 +282,7 @@
       </p15:sldGuideLst>
     </p:ext>
     <p:ext uri="http://customooxmlschemas.google.com/">
-      <go:slidesCustomData xmlns="" xmlns:mc="http://schemas.openxmlformats.org/markup-compatibility/2006" xmlns:mv="urn:schemas-microsoft-com:mac:vml" xmlns:c="http://schemas.openxmlformats.org/drawingml/2006/chart" xmlns:dgm="http://schemas.openxmlformats.org/drawingml/2006/diagram" xmlns:o="urn:schemas-microsoft-com:office:office" xmlns:v="urn:schemas-microsoft-com:vml" xmlns:pvml="urn:schemas-microsoft-com:office:powerpoint" xmlns:com="http://schemas.openxmlformats.org/drawingml/2006/compatibility" xmlns:p14="http://schemas.microsoft.com/office/powerpoint/2010/main" xmlns:p15="http://schemas.microsoft.com/office/powerpoint/2012/main" xmlns:ahyp="http://schemas.microsoft.com/office/drawing/2018/hyperlinkcolor" xmlns:go="http://customooxmlschemas.google.com/" r:id="rId20" roundtripDataSignature="AMtx7mijM5gPELxtLrcASW3xn+zmCa30EQ=="/>
+      <go:slidesCustomData xmlns="" xmlns:mc="http://schemas.openxmlformats.org/markup-compatibility/2006" xmlns:mv="urn:schemas-microsoft-com:mac:vml" xmlns:c="http://schemas.openxmlformats.org/drawingml/2006/chart" xmlns:dgm="http://schemas.openxmlformats.org/drawingml/2006/diagram" xmlns:o="urn:schemas-microsoft-com:office:office" xmlns:v="urn:schemas-microsoft-com:vml" xmlns:pvml="urn:schemas-microsoft-com:office:powerpoint" xmlns:com="http://schemas.openxmlformats.org/drawingml/2006/compatibility" xmlns:p14="http://schemas.microsoft.com/office/powerpoint/2010/main" xmlns:p15="http://schemas.microsoft.com/office/powerpoint/2012/main" xmlns:ahyp="http://schemas.microsoft.com/office/drawing/2018/hyperlinkcolor" xmlns:go="http://customooxmlschemas.google.com/" r:id="rId21" roundtripDataSignature="AMtx7mijM5gPELxtLrcASW3xn+zmCa30EQ=="/>
     </p:ext>
   </p:extLst>
 </p:presentation>
@@ -1944,6 +1945,202 @@
 </p:notes>
 </file>
 
+<file path=ppt/notesSlides/notesSlide10.xml><?xml version="1.0" encoding="utf-8"?>
+<p:notes xmlns:a="http://schemas.openxmlformats.org/drawingml/2006/main" xmlns:r="http://schemas.openxmlformats.org/officeDocument/2006/relationships" xmlns:p="http://schemas.openxmlformats.org/presentationml/2006/main" showMasterSp="0" showMasterPhAnim="0">
+  <p:cSld>
+    <p:spTree>
+      <p:nvGrpSpPr>
+        <p:cNvPr id="1" name="Shape 122"/>
+        <p:cNvGrpSpPr/>
+        <p:nvPr/>
+      </p:nvGrpSpPr>
+      <p:grpSpPr>
+        <a:xfrm>
+          <a:off x="0" y="0"/>
+          <a:ext cx="0" cy="0"/>
+          <a:chOff x="0" y="0"/>
+          <a:chExt cx="0" cy="0"/>
+        </a:xfrm>
+      </p:grpSpPr>
+      <p:sp>
+        <p:nvSpPr>
+          <p:cNvPr id="123" name="Google Shape;123;gc6d6ded6e2_0_0:notes"/>
+          <p:cNvSpPr>
+            <a:spLocks noGrp="1" noRot="1" noChangeAspect="1"/>
+          </p:cNvSpPr>
+          <p:nvPr>
+            <p:ph type="sldImg" idx="2"/>
+          </p:nvPr>
+        </p:nvSpPr>
+        <p:spPr>
+          <a:xfrm>
+            <a:off x="685800" y="1143000"/>
+            <a:ext cx="5486400" cy="3086100"/>
+          </a:xfrm>
+          <a:custGeom>
+            <a:avLst/>
+            <a:gdLst/>
+            <a:ahLst/>
+            <a:cxnLst/>
+            <a:rect l="l" t="t" r="r" b="b"/>
+            <a:pathLst>
+              <a:path w="120000" h="120000" extrusionOk="0">
+                <a:moveTo>
+                  <a:pt x="0" y="0"/>
+                </a:moveTo>
+                <a:lnTo>
+                  <a:pt x="120000" y="0"/>
+                </a:lnTo>
+                <a:lnTo>
+                  <a:pt x="120000" y="120000"/>
+                </a:lnTo>
+                <a:lnTo>
+                  <a:pt x="0" y="120000"/>
+                </a:lnTo>
+                <a:close/>
+              </a:path>
+            </a:pathLst>
+          </a:custGeom>
+          <a:noFill/>
+          <a:ln w="9525" cap="flat" cmpd="sng">
+            <a:solidFill>
+              <a:srgbClr val="000000"/>
+            </a:solidFill>
+            <a:prstDash val="solid"/>
+            <a:miter lim="800000"/>
+            <a:headEnd type="none" w="sm" len="sm"/>
+            <a:tailEnd type="none" w="sm" len="sm"/>
+          </a:ln>
+        </p:spPr>
+      </p:sp>
+      <p:sp>
+        <p:nvSpPr>
+          <p:cNvPr id="124" name="Google Shape;124;gc6d6ded6e2_0_0:notes"/>
+          <p:cNvSpPr txBox="1">
+            <a:spLocks noGrp="1"/>
+          </p:cNvSpPr>
+          <p:nvPr>
+            <p:ph type="body" idx="1"/>
+          </p:nvPr>
+        </p:nvSpPr>
+        <p:spPr>
+          <a:xfrm>
+            <a:off x="685800" y="4400550"/>
+            <a:ext cx="5486400" cy="3600600"/>
+          </a:xfrm>
+          <a:prstGeom prst="rect">
+            <a:avLst/>
+          </a:prstGeom>
+          <a:noFill/>
+          <a:ln>
+            <a:noFill/>
+          </a:ln>
+        </p:spPr>
+        <p:txBody>
+          <a:bodyPr spcFirstLastPara="1" wrap="square" lIns="91425" tIns="45700" rIns="91425" bIns="45700" anchor="t" anchorCtr="0">
+            <a:noAutofit/>
+          </a:bodyPr>
+          <a:lstStyle/>
+          <a:p>
+            <a:pPr marL="0" marR="0" lvl="0" indent="0" algn="l" rtl="0">
+              <a:lnSpc>
+                <a:spcPct val="100000"/>
+              </a:lnSpc>
+              <a:spcBef>
+                <a:spcPts val="0"/>
+              </a:spcBef>
+              <a:spcAft>
+                <a:spcPts val="0"/>
+              </a:spcAft>
+              <a:buSzPts val="1400"/>
+              <a:buNone/>
+            </a:pPr>
+            <a:endParaRPr sz="1200" b="0" i="0" u="none" strike="noStrike" cap="none">
+              <a:solidFill>
+                <a:schemeClr val="dk1"/>
+              </a:solidFill>
+              <a:latin typeface="Calibri"/>
+              <a:ea typeface="Calibri"/>
+              <a:cs typeface="Calibri"/>
+              <a:sym typeface="Calibri"/>
+            </a:endParaRPr>
+          </a:p>
+        </p:txBody>
+      </p:sp>
+      <p:sp>
+        <p:nvSpPr>
+          <p:cNvPr id="125" name="Google Shape;125;gc6d6ded6e2_0_0:notes"/>
+          <p:cNvSpPr txBox="1">
+            <a:spLocks noGrp="1"/>
+          </p:cNvSpPr>
+          <p:nvPr>
+            <p:ph type="sldNum" idx="12"/>
+          </p:nvPr>
+        </p:nvSpPr>
+        <p:spPr>
+          <a:xfrm>
+            <a:off x="3884613" y="8685213"/>
+            <a:ext cx="2971800" cy="458700"/>
+          </a:xfrm>
+          <a:prstGeom prst="rect">
+            <a:avLst/>
+          </a:prstGeom>
+          <a:noFill/>
+          <a:ln>
+            <a:noFill/>
+          </a:ln>
+        </p:spPr>
+        <p:txBody>
+          <a:bodyPr spcFirstLastPara="1" wrap="square" lIns="91425" tIns="45700" rIns="91425" bIns="45700" anchor="b" anchorCtr="0">
+            <a:noAutofit/>
+          </a:bodyPr>
+          <a:lstStyle/>
+          <a:p>
+            <a:pPr marL="0" marR="0" lvl="0" indent="0" algn="r" rtl="0">
+              <a:lnSpc>
+                <a:spcPct val="100000"/>
+              </a:lnSpc>
+              <a:spcBef>
+                <a:spcPts val="0"/>
+              </a:spcBef>
+              <a:spcAft>
+                <a:spcPts val="0"/>
+              </a:spcAft>
+              <a:buSzPts val="1200"/>
+              <a:buNone/>
+            </a:pPr>
+            <a:fld id="{00000000-1234-1234-1234-123412341234}" type="slidenum">
+              <a:rPr lang="pt-BR" sz="1200">
+                <a:solidFill>
+                  <a:schemeClr val="dk1"/>
+                </a:solidFill>
+                <a:latin typeface="Calibri"/>
+                <a:ea typeface="Calibri"/>
+                <a:cs typeface="Calibri"/>
+                <a:sym typeface="Calibri"/>
+              </a:rPr>
+              <a:t>10</a:t>
+            </a:fld>
+            <a:endParaRPr sz="1200">
+              <a:solidFill>
+                <a:schemeClr val="dk1"/>
+              </a:solidFill>
+              <a:latin typeface="Calibri"/>
+              <a:ea typeface="Calibri"/>
+              <a:cs typeface="Calibri"/>
+              <a:sym typeface="Calibri"/>
+            </a:endParaRPr>
+          </a:p>
+        </p:txBody>
+      </p:sp>
+    </p:spTree>
+  </p:cSld>
+  <p:clrMapOvr>
+    <a:masterClrMapping/>
+  </p:clrMapOvr>
+</p:notes>
+</file>
+
 <file path=ppt/notesSlides/notesSlide2.xml><?xml version="1.0" encoding="utf-8"?>
 <p:notes xmlns:a="http://schemas.openxmlformats.org/drawingml/2006/main" xmlns:r="http://schemas.openxmlformats.org/officeDocument/2006/relationships" xmlns:p="http://schemas.openxmlformats.org/presentationml/2006/main" showMasterSp="0" showMasterPhAnim="0">
   <p:cSld>
@@ -2331,7 +2528,7 @@
     </p:spTree>
     <p:extLst>
       <p:ext uri="{BB962C8B-B14F-4D97-AF65-F5344CB8AC3E}">
-        <p14:creationId xmlns:p14="http://schemas.microsoft.com/office/powerpoint/2010/main" val="3697241894"/>
+        <p14:creationId xmlns:p14="http://schemas.microsoft.com/office/powerpoint/2010/main" val="778899685"/>
       </p:ext>
     </p:extLst>
   </p:cSld>
@@ -2346,7 +2543,7 @@
   <p:cSld>
     <p:spTree>
       <p:nvGrpSpPr>
-        <p:cNvPr id="1" name="Shape 102"/>
+        <p:cNvPr id="1" name="Shape 92"/>
         <p:cNvGrpSpPr/>
         <p:nvPr/>
       </p:nvGrpSpPr>
@@ -2360,7 +2557,7 @@
       </p:grpSpPr>
       <p:sp>
         <p:nvSpPr>
-          <p:cNvPr id="103" name="Google Shape;103;gc6d6ded6e2_0_96:notes"/>
+          <p:cNvPr id="93" name="Google Shape;93;g1df91a3117e_0_0:notes"/>
           <p:cNvSpPr>
             <a:spLocks noGrp="1" noRot="1" noChangeAspect="1"/>
           </p:cNvSpPr>
@@ -2411,7 +2608,7 @@
       </p:sp>
       <p:sp>
         <p:nvSpPr>
-          <p:cNvPr id="104" name="Google Shape;104;gc6d6ded6e2_0_96:notes"/>
+          <p:cNvPr id="94" name="Google Shape;94;g1df91a3117e_0_0:notes"/>
           <p:cNvSpPr txBox="1">
             <a:spLocks noGrp="1"/>
           </p:cNvSpPr>
@@ -2465,7 +2662,7 @@
       </p:sp>
       <p:sp>
         <p:nvSpPr>
-          <p:cNvPr id="105" name="Google Shape;105;gc6d6ded6e2_0_96:notes"/>
+          <p:cNvPr id="95" name="Google Shape;95;g1df91a3117e_0_0:notes"/>
           <p:cNvSpPr txBox="1">
             <a:spLocks noGrp="1"/>
           </p:cNvSpPr>
@@ -2530,6 +2727,11 @@
         </p:txBody>
       </p:sp>
     </p:spTree>
+    <p:extLst>
+      <p:ext uri="{BB962C8B-B14F-4D97-AF65-F5344CB8AC3E}">
+        <p14:creationId xmlns:p14="http://schemas.microsoft.com/office/powerpoint/2010/main" val="3697241894"/>
+      </p:ext>
+    </p:extLst>
   </p:cSld>
   <p:clrMapOvr>
     <a:masterClrMapping/>
@@ -2726,11 +2928,6 @@
         </p:txBody>
       </p:sp>
     </p:spTree>
-    <p:extLst>
-      <p:ext uri="{BB962C8B-B14F-4D97-AF65-F5344CB8AC3E}">
-        <p14:creationId xmlns:p14="http://schemas.microsoft.com/office/powerpoint/2010/main" val="3501810081"/>
-      </p:ext>
-    </p:extLst>
   </p:cSld>
   <p:clrMapOvr>
     <a:masterClrMapping/>
@@ -2929,6 +3126,207 @@
     </p:spTree>
     <p:extLst>
       <p:ext uri="{BB962C8B-B14F-4D97-AF65-F5344CB8AC3E}">
+        <p14:creationId xmlns:p14="http://schemas.microsoft.com/office/powerpoint/2010/main" val="3501810081"/>
+      </p:ext>
+    </p:extLst>
+  </p:cSld>
+  <p:clrMapOvr>
+    <a:masterClrMapping/>
+  </p:clrMapOvr>
+</p:notes>
+</file>
+
+<file path=ppt/notesSlides/notesSlide7.xml><?xml version="1.0" encoding="utf-8"?>
+<p:notes xmlns:a="http://schemas.openxmlformats.org/drawingml/2006/main" xmlns:r="http://schemas.openxmlformats.org/officeDocument/2006/relationships" xmlns:p="http://schemas.openxmlformats.org/presentationml/2006/main" showMasterSp="0" showMasterPhAnim="0">
+  <p:cSld>
+    <p:spTree>
+      <p:nvGrpSpPr>
+        <p:cNvPr id="1" name="Shape 102"/>
+        <p:cNvGrpSpPr/>
+        <p:nvPr/>
+      </p:nvGrpSpPr>
+      <p:grpSpPr>
+        <a:xfrm>
+          <a:off x="0" y="0"/>
+          <a:ext cx="0" cy="0"/>
+          <a:chOff x="0" y="0"/>
+          <a:chExt cx="0" cy="0"/>
+        </a:xfrm>
+      </p:grpSpPr>
+      <p:sp>
+        <p:nvSpPr>
+          <p:cNvPr id="103" name="Google Shape;103;gc6d6ded6e2_0_96:notes"/>
+          <p:cNvSpPr>
+            <a:spLocks noGrp="1" noRot="1" noChangeAspect="1"/>
+          </p:cNvSpPr>
+          <p:nvPr>
+            <p:ph type="sldImg" idx="2"/>
+          </p:nvPr>
+        </p:nvSpPr>
+        <p:spPr>
+          <a:xfrm>
+            <a:off x="685800" y="1143000"/>
+            <a:ext cx="5486400" cy="3086100"/>
+          </a:xfrm>
+          <a:custGeom>
+            <a:avLst/>
+            <a:gdLst/>
+            <a:ahLst/>
+            <a:cxnLst/>
+            <a:rect l="l" t="t" r="r" b="b"/>
+            <a:pathLst>
+              <a:path w="120000" h="120000" extrusionOk="0">
+                <a:moveTo>
+                  <a:pt x="0" y="0"/>
+                </a:moveTo>
+                <a:lnTo>
+                  <a:pt x="120000" y="0"/>
+                </a:lnTo>
+                <a:lnTo>
+                  <a:pt x="120000" y="120000"/>
+                </a:lnTo>
+                <a:lnTo>
+                  <a:pt x="0" y="120000"/>
+                </a:lnTo>
+                <a:close/>
+              </a:path>
+            </a:pathLst>
+          </a:custGeom>
+          <a:noFill/>
+          <a:ln w="9525" cap="flat" cmpd="sng">
+            <a:solidFill>
+              <a:srgbClr val="000000"/>
+            </a:solidFill>
+            <a:prstDash val="solid"/>
+            <a:miter lim="800000"/>
+            <a:headEnd type="none" w="sm" len="sm"/>
+            <a:tailEnd type="none" w="sm" len="sm"/>
+          </a:ln>
+        </p:spPr>
+      </p:sp>
+      <p:sp>
+        <p:nvSpPr>
+          <p:cNvPr id="104" name="Google Shape;104;gc6d6ded6e2_0_96:notes"/>
+          <p:cNvSpPr txBox="1">
+            <a:spLocks noGrp="1"/>
+          </p:cNvSpPr>
+          <p:nvPr>
+            <p:ph type="body" idx="1"/>
+          </p:nvPr>
+        </p:nvSpPr>
+        <p:spPr>
+          <a:xfrm>
+            <a:off x="685800" y="4400550"/>
+            <a:ext cx="5486400" cy="3600600"/>
+          </a:xfrm>
+          <a:prstGeom prst="rect">
+            <a:avLst/>
+          </a:prstGeom>
+          <a:noFill/>
+          <a:ln>
+            <a:noFill/>
+          </a:ln>
+        </p:spPr>
+        <p:txBody>
+          <a:bodyPr spcFirstLastPara="1" wrap="square" lIns="91425" tIns="45700" rIns="91425" bIns="45700" anchor="t" anchorCtr="0">
+            <a:noAutofit/>
+          </a:bodyPr>
+          <a:lstStyle/>
+          <a:p>
+            <a:pPr marL="0" marR="0" lvl="0" indent="0" algn="l" rtl="0">
+              <a:lnSpc>
+                <a:spcPct val="100000"/>
+              </a:lnSpc>
+              <a:spcBef>
+                <a:spcPts val="0"/>
+              </a:spcBef>
+              <a:spcAft>
+                <a:spcPts val="0"/>
+              </a:spcAft>
+              <a:buSzPts val="1400"/>
+              <a:buNone/>
+            </a:pPr>
+            <a:endParaRPr sz="1200" b="0" i="0" u="none" strike="noStrike" cap="none">
+              <a:solidFill>
+                <a:schemeClr val="dk1"/>
+              </a:solidFill>
+              <a:latin typeface="Calibri"/>
+              <a:ea typeface="Calibri"/>
+              <a:cs typeface="Calibri"/>
+              <a:sym typeface="Calibri"/>
+            </a:endParaRPr>
+          </a:p>
+        </p:txBody>
+      </p:sp>
+      <p:sp>
+        <p:nvSpPr>
+          <p:cNvPr id="105" name="Google Shape;105;gc6d6ded6e2_0_96:notes"/>
+          <p:cNvSpPr txBox="1">
+            <a:spLocks noGrp="1"/>
+          </p:cNvSpPr>
+          <p:nvPr>
+            <p:ph type="sldNum" idx="12"/>
+          </p:nvPr>
+        </p:nvSpPr>
+        <p:spPr>
+          <a:xfrm>
+            <a:off x="3884613" y="8685213"/>
+            <a:ext cx="2971800" cy="458700"/>
+          </a:xfrm>
+          <a:prstGeom prst="rect">
+            <a:avLst/>
+          </a:prstGeom>
+          <a:noFill/>
+          <a:ln>
+            <a:noFill/>
+          </a:ln>
+        </p:spPr>
+        <p:txBody>
+          <a:bodyPr spcFirstLastPara="1" wrap="square" lIns="91425" tIns="45700" rIns="91425" bIns="45700" anchor="b" anchorCtr="0">
+            <a:noAutofit/>
+          </a:bodyPr>
+          <a:lstStyle/>
+          <a:p>
+            <a:pPr marL="0" marR="0" lvl="0" indent="0" algn="r" rtl="0">
+              <a:lnSpc>
+                <a:spcPct val="100000"/>
+              </a:lnSpc>
+              <a:spcBef>
+                <a:spcPts val="0"/>
+              </a:spcBef>
+              <a:spcAft>
+                <a:spcPts val="0"/>
+              </a:spcAft>
+              <a:buSzPts val="1200"/>
+              <a:buNone/>
+            </a:pPr>
+            <a:fld id="{00000000-1234-1234-1234-123412341234}" type="slidenum">
+              <a:rPr lang="pt-BR" sz="1200">
+                <a:solidFill>
+                  <a:schemeClr val="dk1"/>
+                </a:solidFill>
+                <a:latin typeface="Calibri"/>
+                <a:ea typeface="Calibri"/>
+                <a:cs typeface="Calibri"/>
+                <a:sym typeface="Calibri"/>
+              </a:rPr>
+              <a:t>7</a:t>
+            </a:fld>
+            <a:endParaRPr sz="1200">
+              <a:solidFill>
+                <a:schemeClr val="dk1"/>
+              </a:solidFill>
+              <a:latin typeface="Calibri"/>
+              <a:ea typeface="Calibri"/>
+              <a:cs typeface="Calibri"/>
+              <a:sym typeface="Calibri"/>
+            </a:endParaRPr>
+          </a:p>
+        </p:txBody>
+      </p:sp>
+    </p:spTree>
+    <p:extLst>
+      <p:ext uri="{BB962C8B-B14F-4D97-AF65-F5344CB8AC3E}">
         <p14:creationId xmlns:p14="http://schemas.microsoft.com/office/powerpoint/2010/main" val="1882581670"/>
       </p:ext>
     </p:extLst>
@@ -2939,7 +3337,7 @@
 </p:notes>
 </file>
 
-<file path=ppt/notesSlides/notesSlide7.xml><?xml version="1.0" encoding="utf-8"?>
+<file path=ppt/notesSlides/notesSlide8.xml><?xml version="1.0" encoding="utf-8"?>
 <p:notes xmlns:a="http://schemas.openxmlformats.org/drawingml/2006/main" xmlns:r="http://schemas.openxmlformats.org/officeDocument/2006/relationships" xmlns:p="http://schemas.openxmlformats.org/presentationml/2006/main" showMasterSp="0" showMasterPhAnim="0">
   <p:cSld>
     <p:spTree>
@@ -3113,7 +3511,7 @@
                 <a:cs typeface="Calibri"/>
                 <a:sym typeface="Calibri"/>
               </a:rPr>
-              <a:t>7</a:t>
+              <a:t>8</a:t>
             </a:fld>
             <a:endParaRPr sz="1200">
               <a:solidFill>
@@ -3135,7 +3533,7 @@
 </p:notes>
 </file>
 
-<file path=ppt/notesSlides/notesSlide8.xml><?xml version="1.0" encoding="utf-8"?>
+<file path=ppt/notesSlides/notesSlide9.xml><?xml version="1.0" encoding="utf-8"?>
 <p:notes xmlns:a="http://schemas.openxmlformats.org/drawingml/2006/main" xmlns:r="http://schemas.openxmlformats.org/officeDocument/2006/relationships" xmlns:p="http://schemas.openxmlformats.org/presentationml/2006/main" showMasterSp="0" showMasterPhAnim="0">
   <p:cSld>
     <p:spTree>
@@ -3260,202 +3658,6 @@
       <p:sp>
         <p:nvSpPr>
           <p:cNvPr id="125" name="Google Shape;125;gc6d6ded6e2_0_9:notes"/>
-          <p:cNvSpPr txBox="1">
-            <a:spLocks noGrp="1"/>
-          </p:cNvSpPr>
-          <p:nvPr>
-            <p:ph type="sldNum" idx="12"/>
-          </p:nvPr>
-        </p:nvSpPr>
-        <p:spPr>
-          <a:xfrm>
-            <a:off x="3884613" y="8685213"/>
-            <a:ext cx="2971800" cy="458700"/>
-          </a:xfrm>
-          <a:prstGeom prst="rect">
-            <a:avLst/>
-          </a:prstGeom>
-          <a:noFill/>
-          <a:ln>
-            <a:noFill/>
-          </a:ln>
-        </p:spPr>
-        <p:txBody>
-          <a:bodyPr spcFirstLastPara="1" wrap="square" lIns="91425" tIns="45700" rIns="91425" bIns="45700" anchor="b" anchorCtr="0">
-            <a:noAutofit/>
-          </a:bodyPr>
-          <a:lstStyle/>
-          <a:p>
-            <a:pPr marL="0" marR="0" lvl="0" indent="0" algn="r" rtl="0">
-              <a:lnSpc>
-                <a:spcPct val="100000"/>
-              </a:lnSpc>
-              <a:spcBef>
-                <a:spcPts val="0"/>
-              </a:spcBef>
-              <a:spcAft>
-                <a:spcPts val="0"/>
-              </a:spcAft>
-              <a:buSzPts val="1200"/>
-              <a:buNone/>
-            </a:pPr>
-            <a:fld id="{00000000-1234-1234-1234-123412341234}" type="slidenum">
-              <a:rPr lang="pt-BR" sz="1200">
-                <a:solidFill>
-                  <a:schemeClr val="dk1"/>
-                </a:solidFill>
-                <a:latin typeface="Calibri"/>
-                <a:ea typeface="Calibri"/>
-                <a:cs typeface="Calibri"/>
-                <a:sym typeface="Calibri"/>
-              </a:rPr>
-              <a:t>8</a:t>
-            </a:fld>
-            <a:endParaRPr sz="1200">
-              <a:solidFill>
-                <a:schemeClr val="dk1"/>
-              </a:solidFill>
-              <a:latin typeface="Calibri"/>
-              <a:ea typeface="Calibri"/>
-              <a:cs typeface="Calibri"/>
-              <a:sym typeface="Calibri"/>
-            </a:endParaRPr>
-          </a:p>
-        </p:txBody>
-      </p:sp>
-    </p:spTree>
-  </p:cSld>
-  <p:clrMapOvr>
-    <a:masterClrMapping/>
-  </p:clrMapOvr>
-</p:notes>
-</file>
-
-<file path=ppt/notesSlides/notesSlide9.xml><?xml version="1.0" encoding="utf-8"?>
-<p:notes xmlns:a="http://schemas.openxmlformats.org/drawingml/2006/main" xmlns:r="http://schemas.openxmlformats.org/officeDocument/2006/relationships" xmlns:p="http://schemas.openxmlformats.org/presentationml/2006/main" showMasterSp="0" showMasterPhAnim="0">
-  <p:cSld>
-    <p:spTree>
-      <p:nvGrpSpPr>
-        <p:cNvPr id="1" name="Shape 122"/>
-        <p:cNvGrpSpPr/>
-        <p:nvPr/>
-      </p:nvGrpSpPr>
-      <p:grpSpPr>
-        <a:xfrm>
-          <a:off x="0" y="0"/>
-          <a:ext cx="0" cy="0"/>
-          <a:chOff x="0" y="0"/>
-          <a:chExt cx="0" cy="0"/>
-        </a:xfrm>
-      </p:grpSpPr>
-      <p:sp>
-        <p:nvSpPr>
-          <p:cNvPr id="123" name="Google Shape;123;gc6d6ded6e2_0_0:notes"/>
-          <p:cNvSpPr>
-            <a:spLocks noGrp="1" noRot="1" noChangeAspect="1"/>
-          </p:cNvSpPr>
-          <p:nvPr>
-            <p:ph type="sldImg" idx="2"/>
-          </p:nvPr>
-        </p:nvSpPr>
-        <p:spPr>
-          <a:xfrm>
-            <a:off x="685800" y="1143000"/>
-            <a:ext cx="5486400" cy="3086100"/>
-          </a:xfrm>
-          <a:custGeom>
-            <a:avLst/>
-            <a:gdLst/>
-            <a:ahLst/>
-            <a:cxnLst/>
-            <a:rect l="l" t="t" r="r" b="b"/>
-            <a:pathLst>
-              <a:path w="120000" h="120000" extrusionOk="0">
-                <a:moveTo>
-                  <a:pt x="0" y="0"/>
-                </a:moveTo>
-                <a:lnTo>
-                  <a:pt x="120000" y="0"/>
-                </a:lnTo>
-                <a:lnTo>
-                  <a:pt x="120000" y="120000"/>
-                </a:lnTo>
-                <a:lnTo>
-                  <a:pt x="0" y="120000"/>
-                </a:lnTo>
-                <a:close/>
-              </a:path>
-            </a:pathLst>
-          </a:custGeom>
-          <a:noFill/>
-          <a:ln w="9525" cap="flat" cmpd="sng">
-            <a:solidFill>
-              <a:srgbClr val="000000"/>
-            </a:solidFill>
-            <a:prstDash val="solid"/>
-            <a:miter lim="800000"/>
-            <a:headEnd type="none" w="sm" len="sm"/>
-            <a:tailEnd type="none" w="sm" len="sm"/>
-          </a:ln>
-        </p:spPr>
-      </p:sp>
-      <p:sp>
-        <p:nvSpPr>
-          <p:cNvPr id="124" name="Google Shape;124;gc6d6ded6e2_0_0:notes"/>
-          <p:cNvSpPr txBox="1">
-            <a:spLocks noGrp="1"/>
-          </p:cNvSpPr>
-          <p:nvPr>
-            <p:ph type="body" idx="1"/>
-          </p:nvPr>
-        </p:nvSpPr>
-        <p:spPr>
-          <a:xfrm>
-            <a:off x="685800" y="4400550"/>
-            <a:ext cx="5486400" cy="3600600"/>
-          </a:xfrm>
-          <a:prstGeom prst="rect">
-            <a:avLst/>
-          </a:prstGeom>
-          <a:noFill/>
-          <a:ln>
-            <a:noFill/>
-          </a:ln>
-        </p:spPr>
-        <p:txBody>
-          <a:bodyPr spcFirstLastPara="1" wrap="square" lIns="91425" tIns="45700" rIns="91425" bIns="45700" anchor="t" anchorCtr="0">
-            <a:noAutofit/>
-          </a:bodyPr>
-          <a:lstStyle/>
-          <a:p>
-            <a:pPr marL="0" marR="0" lvl="0" indent="0" algn="l" rtl="0">
-              <a:lnSpc>
-                <a:spcPct val="100000"/>
-              </a:lnSpc>
-              <a:spcBef>
-                <a:spcPts val="0"/>
-              </a:spcBef>
-              <a:spcAft>
-                <a:spcPts val="0"/>
-              </a:spcAft>
-              <a:buSzPts val="1400"/>
-              <a:buNone/>
-            </a:pPr>
-            <a:endParaRPr sz="1200" b="0" i="0" u="none" strike="noStrike" cap="none">
-              <a:solidFill>
-                <a:schemeClr val="dk1"/>
-              </a:solidFill>
-              <a:latin typeface="Calibri"/>
-              <a:ea typeface="Calibri"/>
-              <a:cs typeface="Calibri"/>
-              <a:sym typeface="Calibri"/>
-            </a:endParaRPr>
-          </a:p>
-        </p:txBody>
-      </p:sp>
-      <p:sp>
-        <p:nvSpPr>
-          <p:cNvPr id="125" name="Google Shape;125;gc6d6ded6e2_0_0:notes"/>
           <p:cNvSpPr txBox="1">
             <a:spLocks noGrp="1"/>
           </p:cNvSpPr>
@@ -21733,6 +21935,956 @@
 </p:sld>
 </file>
 
+<file path=ppt/slides/slide10.xml><?xml version="1.0" encoding="utf-8"?>
+<p:sld xmlns:a="http://schemas.openxmlformats.org/drawingml/2006/main" xmlns:r="http://schemas.openxmlformats.org/officeDocument/2006/relationships" xmlns:p="http://schemas.openxmlformats.org/presentationml/2006/main">
+  <p:cSld>
+    <p:spTree>
+      <p:nvGrpSpPr>
+        <p:cNvPr id="1" name="Shape 126"/>
+        <p:cNvGrpSpPr/>
+        <p:nvPr/>
+      </p:nvGrpSpPr>
+      <p:grpSpPr>
+        <a:xfrm>
+          <a:off x="0" y="0"/>
+          <a:ext cx="0" cy="0"/>
+          <a:chOff x="0" y="0"/>
+          <a:chExt cx="0" cy="0"/>
+        </a:xfrm>
+      </p:grpSpPr>
+      <p:sp>
+        <p:nvSpPr>
+          <p:cNvPr id="127" name="Google Shape;127;gc6d6ded6e2_0_0"/>
+          <p:cNvSpPr/>
+          <p:nvPr/>
+        </p:nvSpPr>
+        <p:spPr>
+          <a:xfrm>
+            <a:off x="0" y="0"/>
+            <a:ext cx="12192000" cy="1747800"/>
+          </a:xfrm>
+          <a:prstGeom prst="rect">
+            <a:avLst/>
+          </a:prstGeom>
+          <a:noFill/>
+          <a:ln>
+            <a:noFill/>
+          </a:ln>
+        </p:spPr>
+        <p:txBody>
+          <a:bodyPr spcFirstLastPara="1" wrap="square" lIns="91425" tIns="45700" rIns="91425" bIns="45700" anchor="ctr" anchorCtr="0">
+            <a:noAutofit/>
+          </a:bodyPr>
+          <a:lstStyle/>
+          <a:p>
+            <a:pPr marL="0" marR="0" lvl="0" indent="0" algn="ctr" rtl="0">
+              <a:lnSpc>
+                <a:spcPct val="100000"/>
+              </a:lnSpc>
+              <a:spcBef>
+                <a:spcPts val="0"/>
+              </a:spcBef>
+              <a:spcAft>
+                <a:spcPts val="0"/>
+              </a:spcAft>
+              <a:buClr>
+                <a:srgbClr val="000000"/>
+              </a:buClr>
+              <a:buSzPts val="1800"/>
+              <a:buFont typeface="Arial"/>
+              <a:buNone/>
+            </a:pPr>
+            <a:endParaRPr sz="1800" b="0" i="0" u="none" strike="noStrike" cap="none">
+              <a:solidFill>
+                <a:schemeClr val="lt1"/>
+              </a:solidFill>
+              <a:latin typeface="Arial"/>
+              <a:ea typeface="Arial"/>
+              <a:cs typeface="Arial"/>
+              <a:sym typeface="Arial"/>
+            </a:endParaRPr>
+          </a:p>
+        </p:txBody>
+      </p:sp>
+      <p:sp>
+        <p:nvSpPr>
+          <p:cNvPr id="128" name="Google Shape;128;gc6d6ded6e2_0_0"/>
+          <p:cNvSpPr txBox="1">
+            <a:spLocks noGrp="1"/>
+          </p:cNvSpPr>
+          <p:nvPr>
+            <p:ph type="sldNum" idx="12"/>
+          </p:nvPr>
+        </p:nvSpPr>
+        <p:spPr>
+          <a:xfrm>
+            <a:off x="8737600" y="6356351"/>
+            <a:ext cx="2844900" cy="365100"/>
+          </a:xfrm>
+          <a:prstGeom prst="rect">
+            <a:avLst/>
+          </a:prstGeom>
+          <a:noFill/>
+          <a:ln>
+            <a:noFill/>
+          </a:ln>
+        </p:spPr>
+        <p:txBody>
+          <a:bodyPr spcFirstLastPara="1" wrap="square" lIns="91425" tIns="45700" rIns="91425" bIns="45700" anchor="ctr" anchorCtr="0">
+            <a:noAutofit/>
+          </a:bodyPr>
+          <a:lstStyle/>
+          <a:p>
+            <a:pPr marL="0" lvl="0" indent="0" algn="r" rtl="0">
+              <a:lnSpc>
+                <a:spcPct val="100000"/>
+              </a:lnSpc>
+              <a:spcBef>
+                <a:spcPts val="0"/>
+              </a:spcBef>
+              <a:spcAft>
+                <a:spcPts val="0"/>
+              </a:spcAft>
+              <a:buClr>
+                <a:srgbClr val="000000"/>
+              </a:buClr>
+              <a:buSzPts val="1200"/>
+              <a:buFont typeface="Arial"/>
+              <a:buNone/>
+            </a:pPr>
+            <a:fld id="{00000000-1234-1234-1234-123412341234}" type="slidenum">
+              <a:rPr lang="pt-BR"/>
+              <a:t>10</a:t>
+            </a:fld>
+            <a:endParaRPr/>
+          </a:p>
+        </p:txBody>
+      </p:sp>
+      <p:sp>
+        <p:nvSpPr>
+          <p:cNvPr id="129" name="Google Shape;129;gc6d6ded6e2_0_0"/>
+          <p:cNvSpPr/>
+          <p:nvPr/>
+        </p:nvSpPr>
+        <p:spPr>
+          <a:xfrm>
+            <a:off x="316395" y="220248"/>
+            <a:ext cx="9007488" cy="584700"/>
+          </a:xfrm>
+          <a:prstGeom prst="rect">
+            <a:avLst/>
+          </a:prstGeom>
+          <a:noFill/>
+          <a:ln>
+            <a:noFill/>
+          </a:ln>
+        </p:spPr>
+        <p:txBody>
+          <a:bodyPr spcFirstLastPara="1" wrap="square" lIns="91425" tIns="45700" rIns="91425" bIns="45700" anchor="t" anchorCtr="0">
+            <a:noAutofit/>
+          </a:bodyPr>
+          <a:lstStyle/>
+          <a:p>
+            <a:pPr marL="0" marR="0" lvl="0" indent="0" algn="l" rtl="0">
+              <a:lnSpc>
+                <a:spcPct val="100000"/>
+              </a:lnSpc>
+              <a:spcBef>
+                <a:spcPts val="0"/>
+              </a:spcBef>
+              <a:spcAft>
+                <a:spcPts val="0"/>
+              </a:spcAft>
+              <a:buClr>
+                <a:srgbClr val="000000"/>
+              </a:buClr>
+              <a:buSzPts val="3200"/>
+              <a:buFont typeface="Arial"/>
+              <a:buNone/>
+            </a:pPr>
+            <a:r>
+              <a:rPr lang="pt-BR" sz="3200" b="1" i="0" u="none" strike="noStrike" cap="none" dirty="0">
+                <a:solidFill>
+                  <a:srgbClr val="FF0000"/>
+                </a:solidFill>
+                <a:latin typeface="Century Schoolbook"/>
+                <a:ea typeface="Century Schoolbook"/>
+                <a:cs typeface="Century Schoolbook"/>
+                <a:sym typeface="Century Schoolbook"/>
+              </a:rPr>
+              <a:t>Atividade: </a:t>
+            </a:r>
+            <a:r>
+              <a:rPr lang="pt-BR" sz="2800" b="1" i="0" u="none" strike="noStrike" cap="none" dirty="0">
+                <a:solidFill>
+                  <a:srgbClr val="FF0000"/>
+                </a:solidFill>
+                <a:latin typeface="Century Schoolbook"/>
+                <a:ea typeface="Century Schoolbook"/>
+                <a:cs typeface="Century Schoolbook"/>
+                <a:sym typeface="Century Schoolbook"/>
+              </a:rPr>
+              <a:t>Modelo Lógico DER</a:t>
+            </a:r>
+            <a:r>
+              <a:rPr lang="pt-BR" sz="2800" b="1" dirty="0">
+                <a:solidFill>
+                  <a:srgbClr val="FF0000"/>
+                </a:solidFill>
+                <a:latin typeface="Century Schoolbook"/>
+                <a:ea typeface="Century Schoolbook"/>
+                <a:cs typeface="Century Schoolbook"/>
+                <a:sym typeface="Century Schoolbook"/>
+              </a:rPr>
+              <a:t> Cardinalidade</a:t>
+            </a:r>
+          </a:p>
+          <a:p>
+            <a:pPr marL="0" marR="0" lvl="0" indent="0" algn="l" rtl="0">
+              <a:lnSpc>
+                <a:spcPct val="100000"/>
+              </a:lnSpc>
+              <a:spcBef>
+                <a:spcPts val="0"/>
+              </a:spcBef>
+              <a:spcAft>
+                <a:spcPts val="0"/>
+              </a:spcAft>
+              <a:buClr>
+                <a:srgbClr val="000000"/>
+              </a:buClr>
+              <a:buSzPts val="3200"/>
+              <a:buFont typeface="Arial"/>
+              <a:buNone/>
+            </a:pPr>
+            <a:endParaRPr lang="pt-BR" sz="1400" b="0" i="0" u="none" strike="noStrike" cap="none" dirty="0">
+              <a:solidFill>
+                <a:srgbClr val="000000"/>
+              </a:solidFill>
+              <a:latin typeface="Arial"/>
+              <a:ea typeface="Arial"/>
+              <a:cs typeface="Arial"/>
+              <a:sym typeface="Arial"/>
+            </a:endParaRPr>
+          </a:p>
+        </p:txBody>
+      </p:sp>
+      <p:pic>
+        <p:nvPicPr>
+          <p:cNvPr id="130" name="Google Shape;130;gc6d6ded6e2_0_0"/>
+          <p:cNvPicPr preferRelativeResize="0"/>
+          <p:nvPr/>
+        </p:nvPicPr>
+        <p:blipFill rotWithShape="1">
+          <a:blip r:embed="rId3">
+            <a:alphaModFix/>
+          </a:blip>
+          <a:srcRect/>
+          <a:stretch/>
+        </p:blipFill>
+        <p:spPr>
+          <a:xfrm>
+            <a:off x="9206151" y="0"/>
+            <a:ext cx="2380082" cy="1371599"/>
+          </a:xfrm>
+          <a:prstGeom prst="rect">
+            <a:avLst/>
+          </a:prstGeom>
+          <a:noFill/>
+          <a:ln>
+            <a:noFill/>
+          </a:ln>
+        </p:spPr>
+      </p:pic>
+      <p:sp>
+        <p:nvSpPr>
+          <p:cNvPr id="131" name="Google Shape;131;gc6d6ded6e2_0_0"/>
+          <p:cNvSpPr/>
+          <p:nvPr/>
+        </p:nvSpPr>
+        <p:spPr>
+          <a:xfrm>
+            <a:off x="493300" y="1102973"/>
+            <a:ext cx="11089200" cy="5534779"/>
+          </a:xfrm>
+          <a:prstGeom prst="rect">
+            <a:avLst/>
+          </a:prstGeom>
+          <a:noFill/>
+          <a:ln>
+            <a:noFill/>
+          </a:ln>
+        </p:spPr>
+        <p:txBody>
+          <a:bodyPr spcFirstLastPara="1" wrap="square" lIns="91425" tIns="45700" rIns="91425" bIns="45700" anchor="t" anchorCtr="0">
+            <a:noAutofit/>
+          </a:bodyPr>
+          <a:lstStyle/>
+          <a:p>
+            <a:pPr marL="285750" marR="0" lvl="0" indent="-285750" algn="just" rtl="0">
+              <a:lnSpc>
+                <a:spcPct val="150000"/>
+              </a:lnSpc>
+              <a:spcBef>
+                <a:spcPts val="0"/>
+              </a:spcBef>
+              <a:spcAft>
+                <a:spcPts val="0"/>
+              </a:spcAft>
+              <a:buClr>
+                <a:srgbClr val="000000"/>
+              </a:buClr>
+              <a:buSzPts val="1800"/>
+              <a:buFontTx/>
+              <a:buChar char="-"/>
+            </a:pPr>
+            <a:r>
+              <a:rPr lang="pt-BR" sz="2400" b="0" i="0" u="none" strike="noStrike" cap="none" dirty="0">
+                <a:solidFill>
+                  <a:schemeClr val="dk1"/>
+                </a:solidFill>
+                <a:sym typeface="Arial"/>
+              </a:rPr>
+              <a:t>Insira</a:t>
+            </a:r>
+            <a:r>
+              <a:rPr lang="pt-BR" sz="2400" dirty="0">
+                <a:solidFill>
+                  <a:schemeClr val="dk1"/>
+                </a:solidFill>
+              </a:rPr>
+              <a:t>, </a:t>
+            </a:r>
+            <a:r>
+              <a:rPr lang="pt-BR" sz="2400" b="0" i="0" u="none" strike="noStrike" cap="none" dirty="0">
+                <a:solidFill>
+                  <a:schemeClr val="dk1"/>
+                </a:solidFill>
+                <a:sym typeface="Arial"/>
+              </a:rPr>
+              <a:t>no modelo ER elaborado, a cardinalidade (</a:t>
+            </a:r>
+            <a:r>
+              <a:rPr lang="pt-BR" sz="2400" b="1" i="0" u="none" strike="noStrike" cap="none" dirty="0">
+                <a:solidFill>
+                  <a:schemeClr val="dk1"/>
+                </a:solidFill>
+                <a:sym typeface="Arial"/>
+              </a:rPr>
+              <a:t>Máxima e Mínima</a:t>
+            </a:r>
+            <a:r>
+              <a:rPr lang="pt-BR" sz="2400" b="0" i="0" u="none" strike="noStrike" cap="none" dirty="0">
+                <a:solidFill>
+                  <a:schemeClr val="dk1"/>
+                </a:solidFill>
+                <a:sym typeface="Arial"/>
+              </a:rPr>
+              <a:t>) das entidades presentes, utilize o PDF para a </a:t>
+            </a:r>
+            <a:r>
+              <a:rPr lang="pt-BR" sz="2400" b="0" i="0" u="none" strike="noStrike" cap="none" dirty="0" err="1">
+                <a:solidFill>
+                  <a:schemeClr val="dk1"/>
+                </a:solidFill>
+                <a:sym typeface="Arial"/>
+              </a:rPr>
+              <a:t>atvidade</a:t>
+            </a:r>
+            <a:r>
+              <a:rPr lang="pt-BR" sz="2400" b="0" i="0" u="none" strike="noStrike" cap="none" dirty="0">
+                <a:solidFill>
+                  <a:schemeClr val="dk1"/>
+                </a:solidFill>
+                <a:sym typeface="Arial"/>
+              </a:rPr>
+              <a:t>.</a:t>
+            </a:r>
+          </a:p>
+          <a:p>
+            <a:pPr marR="0" lvl="0" algn="just" rtl="0">
+              <a:lnSpc>
+                <a:spcPct val="150000"/>
+              </a:lnSpc>
+              <a:spcBef>
+                <a:spcPts val="0"/>
+              </a:spcBef>
+              <a:spcAft>
+                <a:spcPts val="0"/>
+              </a:spcAft>
+              <a:buClr>
+                <a:srgbClr val="000000"/>
+              </a:buClr>
+              <a:buSzPts val="1800"/>
+            </a:pPr>
+            <a:endParaRPr lang="pt-BR" sz="2400" dirty="0">
+              <a:solidFill>
+                <a:schemeClr val="dk1"/>
+              </a:solidFill>
+            </a:endParaRPr>
+          </a:p>
+          <a:p>
+            <a:pPr algn="just">
+              <a:lnSpc>
+                <a:spcPct val="150000"/>
+              </a:lnSpc>
+              <a:buSzPts val="1800"/>
+            </a:pPr>
+            <a:r>
+              <a:rPr lang="pt-BR" sz="2400" dirty="0">
+                <a:solidFill>
+                  <a:schemeClr val="dk1"/>
+                </a:solidFill>
+              </a:rPr>
+              <a:t>	</a:t>
+            </a:r>
+            <a:r>
+              <a:rPr lang="pt-BR" sz="2400" dirty="0">
+                <a:solidFill>
+                  <a:schemeClr val="dk1"/>
+                </a:solidFill>
+                <a:hlinkClick r:id="rId4"/>
+              </a:rPr>
+              <a:t>http://www.uel.br/pessoal/valerio/Lista%20de%20exercicios%20Resolvido%2001%20-%20MC%20-%206%20folhas.pdf</a:t>
+            </a:r>
+            <a:r>
+              <a:rPr lang="pt-BR" sz="2400" dirty="0">
+                <a:solidFill>
+                  <a:schemeClr val="dk1"/>
+                </a:solidFill>
+              </a:rPr>
+              <a:t> </a:t>
+            </a:r>
+          </a:p>
+          <a:p>
+            <a:pPr marR="0" lvl="0" algn="just" rtl="0">
+              <a:lnSpc>
+                <a:spcPct val="150000"/>
+              </a:lnSpc>
+              <a:spcBef>
+                <a:spcPts val="0"/>
+              </a:spcBef>
+              <a:spcAft>
+                <a:spcPts val="0"/>
+              </a:spcAft>
+              <a:buClr>
+                <a:srgbClr val="000000"/>
+              </a:buClr>
+              <a:buSzPts val="1800"/>
+            </a:pPr>
+            <a:endParaRPr lang="pt-BR" sz="2400" dirty="0">
+              <a:solidFill>
+                <a:schemeClr val="dk1"/>
+              </a:solidFill>
+            </a:endParaRPr>
+          </a:p>
+          <a:p>
+            <a:pPr marR="0" lvl="0" algn="just" rtl="0">
+              <a:lnSpc>
+                <a:spcPct val="150000"/>
+              </a:lnSpc>
+              <a:spcBef>
+                <a:spcPts val="0"/>
+              </a:spcBef>
+              <a:spcAft>
+                <a:spcPts val="0"/>
+              </a:spcAft>
+              <a:buClr>
+                <a:srgbClr val="000000"/>
+              </a:buClr>
+              <a:buSzPts val="1800"/>
+            </a:pPr>
+            <a:r>
+              <a:rPr lang="pt-BR" sz="2400" dirty="0">
+                <a:solidFill>
+                  <a:schemeClr val="dk1"/>
+                </a:solidFill>
+              </a:rPr>
+              <a:t>-- </a:t>
+            </a:r>
+            <a:r>
+              <a:rPr lang="pt-BR" sz="2400" b="1" dirty="0">
+                <a:solidFill>
+                  <a:schemeClr val="dk1"/>
+                </a:solidFill>
+              </a:rPr>
+              <a:t>Vídeo Aula Complementar</a:t>
+            </a:r>
+          </a:p>
+          <a:p>
+            <a:pPr lvl="0" algn="just">
+              <a:lnSpc>
+                <a:spcPct val="150000"/>
+              </a:lnSpc>
+              <a:buSzPts val="1800"/>
+            </a:pPr>
+            <a:r>
+              <a:rPr lang="pt-BR" sz="2400" dirty="0">
+                <a:solidFill>
+                  <a:schemeClr val="dk1"/>
+                </a:solidFill>
+              </a:rPr>
+              <a:t>		</a:t>
+            </a:r>
+            <a:r>
+              <a:rPr lang="pt-BR" sz="2400" dirty="0">
+                <a:solidFill>
+                  <a:schemeClr val="dk1"/>
+                </a:solidFill>
+                <a:hlinkClick r:id="rId5"/>
+              </a:rPr>
+              <a:t>https://repositorio.imd.ufrn.br/videos/banco-de-dados/02-04-cardinalidade.mp4</a:t>
+            </a:r>
+            <a:endParaRPr lang="pt-BR" sz="2400" dirty="0">
+              <a:solidFill>
+                <a:schemeClr val="dk1"/>
+              </a:solidFill>
+            </a:endParaRPr>
+          </a:p>
+          <a:p>
+            <a:pPr lvl="0" algn="just">
+              <a:lnSpc>
+                <a:spcPct val="150000"/>
+              </a:lnSpc>
+              <a:buSzPts val="1800"/>
+            </a:pPr>
+            <a:endParaRPr lang="pt-BR" sz="2400" dirty="0">
+              <a:solidFill>
+                <a:schemeClr val="dk1"/>
+              </a:solidFill>
+            </a:endParaRPr>
+          </a:p>
+          <a:p>
+            <a:pPr marR="0" lvl="0" algn="just" rtl="0">
+              <a:lnSpc>
+                <a:spcPct val="150000"/>
+              </a:lnSpc>
+              <a:spcBef>
+                <a:spcPts val="0"/>
+              </a:spcBef>
+              <a:spcAft>
+                <a:spcPts val="0"/>
+              </a:spcAft>
+              <a:buClr>
+                <a:srgbClr val="000000"/>
+              </a:buClr>
+              <a:buSzPts val="1800"/>
+            </a:pPr>
+            <a:endParaRPr lang="pt-BR" sz="2400" dirty="0">
+              <a:solidFill>
+                <a:schemeClr val="dk1"/>
+              </a:solidFill>
+            </a:endParaRPr>
+          </a:p>
+          <a:p>
+            <a:pPr marL="285750" marR="0" lvl="0" indent="-285750" algn="just" rtl="0">
+              <a:lnSpc>
+                <a:spcPct val="150000"/>
+              </a:lnSpc>
+              <a:spcBef>
+                <a:spcPts val="0"/>
+              </a:spcBef>
+              <a:spcAft>
+                <a:spcPts val="0"/>
+              </a:spcAft>
+              <a:buClr>
+                <a:srgbClr val="000000"/>
+              </a:buClr>
+              <a:buSzPts val="1800"/>
+              <a:buFontTx/>
+              <a:buChar char="-"/>
+            </a:pPr>
+            <a:endParaRPr sz="2400" b="0" i="0" u="none" strike="noStrike" cap="none" dirty="0">
+              <a:solidFill>
+                <a:schemeClr val="dk1"/>
+              </a:solidFill>
+              <a:sym typeface="Arial"/>
+            </a:endParaRPr>
+          </a:p>
+          <a:p>
+            <a:pPr marL="0" marR="0" lvl="0" indent="0" algn="just" rtl="0">
+              <a:lnSpc>
+                <a:spcPct val="100000"/>
+              </a:lnSpc>
+              <a:spcBef>
+                <a:spcPts val="0"/>
+              </a:spcBef>
+              <a:spcAft>
+                <a:spcPts val="0"/>
+              </a:spcAft>
+              <a:buClr>
+                <a:srgbClr val="000000"/>
+              </a:buClr>
+              <a:buSzPts val="1800"/>
+              <a:buFont typeface="Arial"/>
+              <a:buNone/>
+            </a:pPr>
+            <a:endParaRPr sz="2400" b="0" i="0" u="none" strike="noStrike" cap="none" dirty="0">
+              <a:solidFill>
+                <a:schemeClr val="dk1"/>
+              </a:solidFill>
+              <a:sym typeface="Arial"/>
+            </a:endParaRPr>
+          </a:p>
+          <a:p>
+            <a:pPr marL="0" marR="0" lvl="0" indent="0" algn="just" rtl="0">
+              <a:lnSpc>
+                <a:spcPct val="100000"/>
+              </a:lnSpc>
+              <a:spcBef>
+                <a:spcPts val="0"/>
+              </a:spcBef>
+              <a:spcAft>
+                <a:spcPts val="0"/>
+              </a:spcAft>
+              <a:buClr>
+                <a:srgbClr val="000000"/>
+              </a:buClr>
+              <a:buSzPts val="1800"/>
+              <a:buFont typeface="Arial"/>
+              <a:buNone/>
+            </a:pPr>
+            <a:endParaRPr sz="2400" b="1" i="0" u="none" strike="noStrike" cap="none" dirty="0">
+              <a:solidFill>
+                <a:schemeClr val="dk1"/>
+              </a:solidFill>
+              <a:sym typeface="Arial"/>
+            </a:endParaRPr>
+          </a:p>
+          <a:p>
+            <a:pPr marL="0" marR="0" lvl="0" indent="0" algn="just" rtl="0">
+              <a:lnSpc>
+                <a:spcPct val="100000"/>
+              </a:lnSpc>
+              <a:spcBef>
+                <a:spcPts val="0"/>
+              </a:spcBef>
+              <a:spcAft>
+                <a:spcPts val="0"/>
+              </a:spcAft>
+              <a:buClr>
+                <a:srgbClr val="000000"/>
+              </a:buClr>
+              <a:buSzPts val="1800"/>
+              <a:buFont typeface="Arial"/>
+              <a:buNone/>
+            </a:pPr>
+            <a:endParaRPr sz="2400" b="0" i="0" u="none" strike="noStrike" cap="none" dirty="0">
+              <a:solidFill>
+                <a:schemeClr val="dk1"/>
+              </a:solidFill>
+              <a:sym typeface="Arial"/>
+            </a:endParaRPr>
+          </a:p>
+          <a:p>
+            <a:pPr marL="0" marR="0" lvl="0" indent="0" algn="just" rtl="0">
+              <a:lnSpc>
+                <a:spcPct val="150000"/>
+              </a:lnSpc>
+              <a:spcBef>
+                <a:spcPts val="0"/>
+              </a:spcBef>
+              <a:spcAft>
+                <a:spcPts val="0"/>
+              </a:spcAft>
+              <a:buClr>
+                <a:srgbClr val="000000"/>
+              </a:buClr>
+              <a:buSzPts val="1800"/>
+              <a:buFont typeface="Arial"/>
+              <a:buNone/>
+            </a:pPr>
+            <a:endParaRPr sz="2400" b="0" i="0" u="none" strike="noStrike" cap="none" dirty="0">
+              <a:solidFill>
+                <a:schemeClr val="dk1"/>
+              </a:solidFill>
+              <a:sym typeface="Arial"/>
+            </a:endParaRPr>
+          </a:p>
+        </p:txBody>
+      </p:sp>
+    </p:spTree>
+  </p:cSld>
+  <p:clrMapOvr>
+    <a:masterClrMapping/>
+  </p:clrMapOvr>
+  <p:timing>
+    <p:tnLst>
+      <p:par>
+        <p:cTn id="1" dur="indefinite" restart="never" nodeType="tmRoot">
+          <p:childTnLst>
+            <p:seq concurrent="1" nextAc="seek">
+              <p:cTn id="2" dur="indefinite" nodeType="mainSeq">
+                <p:childTnLst>
+                  <p:par>
+                    <p:cTn id="3" fill="hold">
+                      <p:stCondLst>
+                        <p:cond delay="indefinite"/>
+                      </p:stCondLst>
+                      <p:childTnLst>
+                        <p:par>
+                          <p:cTn id="4" fill="hold">
+                            <p:stCondLst>
+                              <p:cond delay="0"/>
+                            </p:stCondLst>
+                            <p:childTnLst>
+                              <p:par>
+                                <p:cTn id="5" presetID="10" presetClass="entr" presetSubtype="0" fill="hold" nodeType="clickEffect">
+                                  <p:stCondLst>
+                                    <p:cond delay="0"/>
+                                  </p:stCondLst>
+                                  <p:childTnLst>
+                                    <p:set>
+                                      <p:cBhvr>
+                                        <p:cTn id="6" dur="1" fill="hold">
+                                          <p:stCondLst>
+                                            <p:cond delay="0"/>
+                                          </p:stCondLst>
+                                        </p:cTn>
+                                        <p:tgtEl>
+                                          <p:spTgt spid="131">
+                                            <p:txEl>
+                                              <p:pRg st="0" end="0"/>
+                                            </p:txEl>
+                                          </p:spTgt>
+                                        </p:tgtEl>
+                                        <p:attrNameLst>
+                                          <p:attrName>style.visibility</p:attrName>
+                                        </p:attrNameLst>
+                                      </p:cBhvr>
+                                      <p:to>
+                                        <p:strVal val="visible"/>
+                                      </p:to>
+                                    </p:set>
+                                    <p:animEffect transition="in" filter="fade">
+                                      <p:cBhvr>
+                                        <p:cTn id="7" dur="500"/>
+                                        <p:tgtEl>
+                                          <p:spTgt spid="131">
+                                            <p:txEl>
+                                              <p:pRg st="0" end="0"/>
+                                            </p:txEl>
+                                          </p:spTgt>
+                                        </p:tgtEl>
+                                      </p:cBhvr>
+                                    </p:animEffect>
+                                  </p:childTnLst>
+                                </p:cTn>
+                              </p:par>
+                            </p:childTnLst>
+                          </p:cTn>
+                        </p:par>
+                      </p:childTnLst>
+                    </p:cTn>
+                  </p:par>
+                  <p:par>
+                    <p:cTn id="8" fill="hold">
+                      <p:stCondLst>
+                        <p:cond delay="indefinite"/>
+                      </p:stCondLst>
+                      <p:childTnLst>
+                        <p:par>
+                          <p:cTn id="9" fill="hold">
+                            <p:stCondLst>
+                              <p:cond delay="0"/>
+                            </p:stCondLst>
+                            <p:childTnLst>
+                              <p:par>
+                                <p:cTn id="10" presetID="10" presetClass="entr" presetSubtype="0" fill="hold" nodeType="clickEffect">
+                                  <p:stCondLst>
+                                    <p:cond delay="0"/>
+                                  </p:stCondLst>
+                                  <p:childTnLst>
+                                    <p:set>
+                                      <p:cBhvr>
+                                        <p:cTn id="11" dur="1" fill="hold">
+                                          <p:stCondLst>
+                                            <p:cond delay="0"/>
+                                          </p:stCondLst>
+                                        </p:cTn>
+                                        <p:tgtEl>
+                                          <p:spTgt spid="131">
+                                            <p:txEl>
+                                              <p:pRg st="2" end="2"/>
+                                            </p:txEl>
+                                          </p:spTgt>
+                                        </p:tgtEl>
+                                        <p:attrNameLst>
+                                          <p:attrName>style.visibility</p:attrName>
+                                        </p:attrNameLst>
+                                      </p:cBhvr>
+                                      <p:to>
+                                        <p:strVal val="visible"/>
+                                      </p:to>
+                                    </p:set>
+                                    <p:animEffect transition="in" filter="fade">
+                                      <p:cBhvr>
+                                        <p:cTn id="12" dur="500"/>
+                                        <p:tgtEl>
+                                          <p:spTgt spid="131">
+                                            <p:txEl>
+                                              <p:pRg st="2" end="2"/>
+                                            </p:txEl>
+                                          </p:spTgt>
+                                        </p:tgtEl>
+                                      </p:cBhvr>
+                                    </p:animEffect>
+                                  </p:childTnLst>
+                                </p:cTn>
+                              </p:par>
+                            </p:childTnLst>
+                          </p:cTn>
+                        </p:par>
+                      </p:childTnLst>
+                    </p:cTn>
+                  </p:par>
+                  <p:par>
+                    <p:cTn id="13" fill="hold">
+                      <p:stCondLst>
+                        <p:cond delay="indefinite"/>
+                      </p:stCondLst>
+                      <p:childTnLst>
+                        <p:par>
+                          <p:cTn id="14" fill="hold">
+                            <p:stCondLst>
+                              <p:cond delay="0"/>
+                            </p:stCondLst>
+                            <p:childTnLst>
+                              <p:par>
+                                <p:cTn id="15" presetID="10" presetClass="entr" presetSubtype="0" fill="hold" nodeType="clickEffect">
+                                  <p:stCondLst>
+                                    <p:cond delay="0"/>
+                                  </p:stCondLst>
+                                  <p:childTnLst>
+                                    <p:set>
+                                      <p:cBhvr>
+                                        <p:cTn id="16" dur="1" fill="hold">
+                                          <p:stCondLst>
+                                            <p:cond delay="0"/>
+                                          </p:stCondLst>
+                                        </p:cTn>
+                                        <p:tgtEl>
+                                          <p:spTgt spid="131">
+                                            <p:txEl>
+                                              <p:pRg st="4" end="4"/>
+                                            </p:txEl>
+                                          </p:spTgt>
+                                        </p:tgtEl>
+                                        <p:attrNameLst>
+                                          <p:attrName>style.visibility</p:attrName>
+                                        </p:attrNameLst>
+                                      </p:cBhvr>
+                                      <p:to>
+                                        <p:strVal val="visible"/>
+                                      </p:to>
+                                    </p:set>
+                                    <p:animEffect transition="in" filter="fade">
+                                      <p:cBhvr>
+                                        <p:cTn id="17" dur="500"/>
+                                        <p:tgtEl>
+                                          <p:spTgt spid="131">
+                                            <p:txEl>
+                                              <p:pRg st="4" end="4"/>
+                                            </p:txEl>
+                                          </p:spTgt>
+                                        </p:tgtEl>
+                                      </p:cBhvr>
+                                    </p:animEffect>
+                                  </p:childTnLst>
+                                </p:cTn>
+                              </p:par>
+                            </p:childTnLst>
+                          </p:cTn>
+                        </p:par>
+                      </p:childTnLst>
+                    </p:cTn>
+                  </p:par>
+                  <p:par>
+                    <p:cTn id="18" fill="hold">
+                      <p:stCondLst>
+                        <p:cond delay="indefinite"/>
+                      </p:stCondLst>
+                      <p:childTnLst>
+                        <p:par>
+                          <p:cTn id="19" fill="hold">
+                            <p:stCondLst>
+                              <p:cond delay="0"/>
+                            </p:stCondLst>
+                            <p:childTnLst>
+                              <p:par>
+                                <p:cTn id="20" presetID="10" presetClass="entr" presetSubtype="0" fill="hold" nodeType="clickEffect">
+                                  <p:stCondLst>
+                                    <p:cond delay="0"/>
+                                  </p:stCondLst>
+                                  <p:childTnLst>
+                                    <p:set>
+                                      <p:cBhvr>
+                                        <p:cTn id="21" dur="1" fill="hold">
+                                          <p:stCondLst>
+                                            <p:cond delay="0"/>
+                                          </p:stCondLst>
+                                        </p:cTn>
+                                        <p:tgtEl>
+                                          <p:spTgt spid="131">
+                                            <p:txEl>
+                                              <p:pRg st="5" end="5"/>
+                                            </p:txEl>
+                                          </p:spTgt>
+                                        </p:tgtEl>
+                                        <p:attrNameLst>
+                                          <p:attrName>style.visibility</p:attrName>
+                                        </p:attrNameLst>
+                                      </p:cBhvr>
+                                      <p:to>
+                                        <p:strVal val="visible"/>
+                                      </p:to>
+                                    </p:set>
+                                    <p:animEffect transition="in" filter="fade">
+                                      <p:cBhvr>
+                                        <p:cTn id="22" dur="500"/>
+                                        <p:tgtEl>
+                                          <p:spTgt spid="131">
+                                            <p:txEl>
+                                              <p:pRg st="5" end="5"/>
+                                            </p:txEl>
+                                          </p:spTgt>
+                                        </p:tgtEl>
+                                      </p:cBhvr>
+                                    </p:animEffect>
+                                  </p:childTnLst>
+                                </p:cTn>
+                              </p:par>
+                            </p:childTnLst>
+                          </p:cTn>
+                        </p:par>
+                      </p:childTnLst>
+                    </p:cTn>
+                  </p:par>
+                </p:childTnLst>
+              </p:cTn>
+              <p:prevCondLst>
+                <p:cond evt="onPrev" delay="0">
+                  <p:tgtEl>
+                    <p:sldTgt/>
+                  </p:tgtEl>
+                </p:cond>
+              </p:prevCondLst>
+              <p:nextCondLst>
+                <p:cond evt="onNext" delay="0">
+                  <p:tgtEl>
+                    <p:sldTgt/>
+                  </p:tgtEl>
+                </p:cond>
+              </p:nextCondLst>
+            </p:seq>
+          </p:childTnLst>
+        </p:cTn>
+      </p:par>
+    </p:tnLst>
+  </p:timing>
+</p:sld>
+</file>
+
 <file path=ppt/slides/slide2.xml><?xml version="1.0" encoding="utf-8"?>
 <p:sld xmlns:a="http://schemas.openxmlformats.org/drawingml/2006/main" xmlns:r="http://schemas.openxmlformats.org/officeDocument/2006/relationships" xmlns:p="http://schemas.openxmlformats.org/presentationml/2006/main">
   <p:cSld>
@@ -21996,36 +23148,6 @@
           </a:p>
         </p:txBody>
       </p:sp>
-      <p:pic>
-        <p:nvPicPr>
-          <p:cNvPr id="5" name="Imagem 4">
-            <a:extLst>
-              <a:ext uri="{FF2B5EF4-FFF2-40B4-BE49-F238E27FC236}">
-                <a16:creationId xmlns:a16="http://schemas.microsoft.com/office/drawing/2014/main" id="{61EC921F-D17E-B2C3-6BB3-A6FC3D257A23}"/>
-              </a:ext>
-            </a:extLst>
-          </p:cNvPr>
-          <p:cNvPicPr>
-            <a:picLocks noChangeAspect="1"/>
-          </p:cNvPicPr>
-          <p:nvPr/>
-        </p:nvPicPr>
-        <p:blipFill>
-          <a:blip r:embed="rId4"/>
-          <a:stretch>
-            <a:fillRect/>
-          </a:stretch>
-        </p:blipFill>
-        <p:spPr>
-          <a:xfrm>
-            <a:off x="409754" y="1360081"/>
-            <a:ext cx="10967686" cy="5115670"/>
-          </a:xfrm>
-          <a:prstGeom prst="rect">
-            <a:avLst/>
-          </a:prstGeom>
-        </p:spPr>
-      </p:pic>
       <p:sp>
         <p:nvSpPr>
           <p:cNvPr id="6" name="CaixaDeTexto 5">
@@ -22040,8 +23162,8 @@
         </p:nvSpPr>
         <p:spPr>
           <a:xfrm>
-            <a:off x="8028703" y="5259217"/>
-            <a:ext cx="3483647" cy="954107"/>
+            <a:off x="605766" y="1401579"/>
+            <a:ext cx="10988699" cy="5016758"/>
           </a:xfrm>
           <a:prstGeom prst="rect">
             <a:avLst/>
@@ -22055,13 +23177,305 @@
           <a:lstStyle/>
           <a:p>
             <a:r>
-              <a:rPr lang="pt-BR" sz="2800" b="1" dirty="0">
+              <a:rPr lang="pt-BR" sz="2000" b="1" dirty="0">
+                <a:solidFill>
+                  <a:schemeClr val="tx1"/>
+                </a:solidFill>
+              </a:rPr>
+              <a:t>-- Conceito </a:t>
+            </a:r>
+            <a:r>
+              <a:rPr lang="pt-BR" sz="2000" b="1" dirty="0">
                 <a:solidFill>
                   <a:srgbClr val="FF0000"/>
                 </a:solidFill>
               </a:rPr>
-              <a:t>Exemplo Diagrama de Classe (UML)</a:t>
+              <a:t>MER/DER</a:t>
             </a:r>
+          </a:p>
+          <a:p>
+            <a:endParaRPr lang="pt-BR" sz="2000" dirty="0">
+              <a:solidFill>
+                <a:srgbClr val="FF0000"/>
+              </a:solidFill>
+            </a:endParaRPr>
+          </a:p>
+          <a:p>
+            <a:r>
+              <a:rPr lang="pt-BR" sz="2000" dirty="0">
+                <a:solidFill>
+                  <a:srgbClr val="FF0000"/>
+                </a:solidFill>
+              </a:rPr>
+              <a:t>	</a:t>
+            </a:r>
+            <a:r>
+              <a:rPr lang="pt-BR" sz="2000" dirty="0">
+                <a:solidFill>
+                  <a:srgbClr val="FF0000"/>
+                </a:solidFill>
+                <a:hlinkClick r:id="rId4"/>
+              </a:rPr>
+              <a:t>https://www.erwin.com/br-pt/products/erwin-data-modeler/</a:t>
+            </a:r>
+            <a:endParaRPr lang="pt-BR" sz="2000" dirty="0">
+              <a:solidFill>
+                <a:srgbClr val="FF0000"/>
+              </a:solidFill>
+            </a:endParaRPr>
+          </a:p>
+          <a:p>
+            <a:r>
+              <a:rPr lang="pt-BR" sz="2000" dirty="0">
+                <a:solidFill>
+                  <a:srgbClr val="FF0000"/>
+                </a:solidFill>
+              </a:rPr>
+              <a:t>	</a:t>
+            </a:r>
+            <a:r>
+              <a:rPr lang="pt-BR" sz="2000" dirty="0">
+                <a:solidFill>
+                  <a:srgbClr val="FF0000"/>
+                </a:solidFill>
+                <a:hlinkClick r:id="rId5"/>
+              </a:rPr>
+              <a:t>https://becode.com.br/diagramas-er-ferramentas/</a:t>
+            </a:r>
+            <a:endParaRPr lang="pt-BR" sz="2000" dirty="0">
+              <a:solidFill>
+                <a:srgbClr val="FF0000"/>
+              </a:solidFill>
+            </a:endParaRPr>
+          </a:p>
+          <a:p>
+            <a:endParaRPr lang="pt-BR" sz="2000" b="1" dirty="0">
+              <a:solidFill>
+                <a:schemeClr val="tx1"/>
+              </a:solidFill>
+              <a:hlinkClick r:id="rId6">
+                <a:extLst>
+                  <a:ext uri="{A12FA001-AC4F-418D-AE19-62706E023703}">
+                    <ahyp:hlinkClr xmlns:ahyp="http://schemas.microsoft.com/office/drawing/2018/hyperlinkcolor" val="tx"/>
+                  </a:ext>
+                </a:extLst>
+              </a:hlinkClick>
+            </a:endParaRPr>
+          </a:p>
+          <a:p>
+            <a:r>
+              <a:rPr lang="pt-BR" sz="2000" b="1" dirty="0">
+                <a:solidFill>
+                  <a:schemeClr val="tx1"/>
+                </a:solidFill>
+              </a:rPr>
+              <a:t>-- Tools </a:t>
+            </a:r>
+            <a:r>
+              <a:rPr lang="pt-BR" sz="2000" b="1" dirty="0">
+                <a:solidFill>
+                  <a:srgbClr val="FF0000"/>
+                </a:solidFill>
+              </a:rPr>
+              <a:t>MER/DER</a:t>
+            </a:r>
+          </a:p>
+          <a:p>
+            <a:r>
+              <a:rPr lang="pt-BR" sz="2000" dirty="0">
+                <a:solidFill>
+                  <a:srgbClr val="FF0000"/>
+                </a:solidFill>
+                <a:hlinkClick r:id="rId6"/>
+              </a:rPr>
+              <a:t>           </a:t>
+            </a:r>
+          </a:p>
+          <a:p>
+            <a:r>
+              <a:rPr lang="pt-BR" sz="2000" dirty="0">
+                <a:solidFill>
+                  <a:srgbClr val="FF0000"/>
+                </a:solidFill>
+              </a:rPr>
+              <a:t>	MySQL Community Downloads - </a:t>
+            </a:r>
+            <a:r>
+              <a:rPr lang="pt-BR" sz="2000" dirty="0">
+                <a:solidFill>
+                  <a:srgbClr val="FF0000"/>
+                </a:solidFill>
+                <a:hlinkClick r:id="rId7"/>
+              </a:rPr>
+              <a:t>https://dev.mysql.com/downloads/workbench/</a:t>
+            </a:r>
+            <a:r>
+              <a:rPr lang="pt-BR" sz="2000" dirty="0">
+                <a:solidFill>
+                  <a:srgbClr val="FF0000"/>
+                </a:solidFill>
+              </a:rPr>
+              <a:t> </a:t>
+            </a:r>
+          </a:p>
+          <a:p>
+            <a:r>
+              <a:rPr lang="pt-BR" sz="2000" dirty="0">
+                <a:solidFill>
+                  <a:srgbClr val="FF0000"/>
+                </a:solidFill>
+              </a:rPr>
+              <a:t>	</a:t>
+            </a:r>
+            <a:r>
+              <a:rPr lang="pt-BR" sz="2000" dirty="0" err="1">
+                <a:solidFill>
+                  <a:srgbClr val="FF0000"/>
+                </a:solidFill>
+              </a:rPr>
+              <a:t>Lucid</a:t>
+            </a:r>
+            <a:r>
+              <a:rPr lang="pt-BR" sz="2000" dirty="0">
+                <a:solidFill>
+                  <a:srgbClr val="FF0000"/>
+                </a:solidFill>
+              </a:rPr>
+              <a:t> - </a:t>
+            </a:r>
+            <a:r>
+              <a:rPr lang="pt-BR" sz="2000" dirty="0">
+                <a:solidFill>
+                  <a:srgbClr val="FF0000"/>
+                </a:solidFill>
+                <a:hlinkClick r:id="rId6"/>
+              </a:rPr>
+              <a:t>https://lucid.app</a:t>
+            </a:r>
+            <a:endParaRPr lang="pt-BR" sz="2000" dirty="0">
+              <a:solidFill>
+                <a:srgbClr val="FF0000"/>
+              </a:solidFill>
+            </a:endParaRPr>
+          </a:p>
+          <a:p>
+            <a:r>
+              <a:rPr lang="pt-BR" sz="2000" dirty="0">
+                <a:solidFill>
+                  <a:srgbClr val="FF0000"/>
+                </a:solidFill>
+              </a:rPr>
+              <a:t>	Br Modelo - </a:t>
+            </a:r>
+            <a:r>
+              <a:rPr lang="pt-BR" sz="2000" dirty="0">
+                <a:solidFill>
+                  <a:srgbClr val="FF0000"/>
+                </a:solidFill>
+                <a:hlinkClick r:id="rId8"/>
+              </a:rPr>
+              <a:t>https://www.brmodeloweb.com/lang/pt-br/index.html</a:t>
+            </a:r>
+            <a:endParaRPr lang="pt-BR" sz="2000" dirty="0">
+              <a:solidFill>
+                <a:srgbClr val="FF0000"/>
+              </a:solidFill>
+            </a:endParaRPr>
+          </a:p>
+          <a:p>
+            <a:r>
+              <a:rPr lang="pt-BR" sz="2000" dirty="0">
+                <a:solidFill>
+                  <a:srgbClr val="FF0000"/>
+                </a:solidFill>
+              </a:rPr>
+              <a:t>	Draw.io - </a:t>
+            </a:r>
+            <a:r>
+              <a:rPr lang="pt-BR" sz="2000" dirty="0">
+                <a:solidFill>
+                  <a:srgbClr val="FF0000"/>
+                </a:solidFill>
+                <a:hlinkClick r:id="rId9"/>
+              </a:rPr>
+              <a:t>https://app.diagrams.net/</a:t>
+            </a:r>
+            <a:endParaRPr lang="pt-BR" sz="2000" dirty="0">
+              <a:solidFill>
+                <a:srgbClr val="FF0000"/>
+              </a:solidFill>
+            </a:endParaRPr>
+          </a:p>
+          <a:p>
+            <a:endParaRPr lang="pt-BR" sz="2000" dirty="0">
+              <a:solidFill>
+                <a:srgbClr val="FF0000"/>
+              </a:solidFill>
+            </a:endParaRPr>
+          </a:p>
+          <a:p>
+            <a:r>
+              <a:rPr lang="pt-BR" sz="2000" b="1" dirty="0">
+                <a:solidFill>
+                  <a:schemeClr val="tx1"/>
+                </a:solidFill>
+              </a:rPr>
+              <a:t>-- Vídeo Complementar </a:t>
+            </a:r>
+            <a:r>
+              <a:rPr lang="pt-BR" sz="2000" b="1" dirty="0">
+                <a:solidFill>
+                  <a:srgbClr val="FF0000"/>
+                </a:solidFill>
+              </a:rPr>
+              <a:t>MER/DER</a:t>
+            </a:r>
+            <a:endParaRPr lang="pt-BR" sz="2000" b="1" dirty="0">
+              <a:solidFill>
+                <a:schemeClr val="tx1"/>
+              </a:solidFill>
+            </a:endParaRPr>
+          </a:p>
+          <a:p>
+            <a:endParaRPr lang="pt-BR" sz="2000" b="1" dirty="0">
+              <a:solidFill>
+                <a:schemeClr val="tx1"/>
+              </a:solidFill>
+            </a:endParaRPr>
+          </a:p>
+          <a:p>
+            <a:r>
+              <a:rPr lang="pt-BR" sz="2000" dirty="0">
+                <a:solidFill>
+                  <a:srgbClr val="FF0000"/>
+                </a:solidFill>
+              </a:rPr>
+              <a:t>	</a:t>
+            </a:r>
+            <a:r>
+              <a:rPr lang="pt-BR" sz="2000" dirty="0">
+                <a:solidFill>
+                  <a:srgbClr val="FF0000"/>
+                </a:solidFill>
+                <a:hlinkClick r:id="rId10"/>
+              </a:rPr>
+              <a:t>https://www.youtube.com/watch?v=JepxObKT324</a:t>
+            </a:r>
+            <a:r>
+              <a:rPr lang="pt-BR" sz="2000" dirty="0">
+                <a:solidFill>
+                  <a:srgbClr val="FF0000"/>
+                </a:solidFill>
+              </a:rPr>
+              <a:t> </a:t>
+            </a:r>
+          </a:p>
+          <a:p>
+            <a:endParaRPr lang="pt-BR" sz="2000" dirty="0">
+              <a:solidFill>
+                <a:srgbClr val="FF0000"/>
+              </a:solidFill>
+            </a:endParaRPr>
           </a:p>
         </p:txBody>
       </p:sp>
@@ -22331,6 +23745,447 @@
           <a:xfrm>
             <a:off x="409754" y="1605781"/>
             <a:ext cx="10988700" cy="4869970"/>
+          </a:xfrm>
+          <a:prstGeom prst="rect">
+            <a:avLst/>
+          </a:prstGeom>
+          <a:noFill/>
+          <a:ln>
+            <a:noFill/>
+          </a:ln>
+        </p:spPr>
+        <p:txBody>
+          <a:bodyPr spcFirstLastPara="1" wrap="square" lIns="91425" tIns="45700" rIns="91425" bIns="45700" anchor="t" anchorCtr="0">
+            <a:noAutofit/>
+          </a:bodyPr>
+          <a:lstStyle/>
+          <a:p>
+            <a:pPr marL="0" marR="0" lvl="0" indent="0" algn="just" rtl="0">
+              <a:lnSpc>
+                <a:spcPct val="150000"/>
+              </a:lnSpc>
+              <a:spcBef>
+                <a:spcPts val="0"/>
+              </a:spcBef>
+              <a:spcAft>
+                <a:spcPts val="0"/>
+              </a:spcAft>
+              <a:buNone/>
+            </a:pPr>
+            <a:endParaRPr sz="1800" dirty="0">
+              <a:solidFill>
+                <a:schemeClr val="dk1"/>
+              </a:solidFill>
+            </a:endParaRPr>
+          </a:p>
+        </p:txBody>
+      </p:sp>
+      <p:sp>
+        <p:nvSpPr>
+          <p:cNvPr id="101" name="Google Shape;101;g1df91a3117e_0_0"/>
+          <p:cNvSpPr/>
+          <p:nvPr/>
+        </p:nvSpPr>
+        <p:spPr>
+          <a:xfrm>
+            <a:off x="279120" y="581548"/>
+            <a:ext cx="8321263" cy="584700"/>
+          </a:xfrm>
+          <a:prstGeom prst="rect">
+            <a:avLst/>
+          </a:prstGeom>
+          <a:noFill/>
+          <a:ln>
+            <a:noFill/>
+          </a:ln>
+        </p:spPr>
+        <p:txBody>
+          <a:bodyPr spcFirstLastPara="1" wrap="square" lIns="91425" tIns="45700" rIns="91425" bIns="45700" anchor="t" anchorCtr="0">
+            <a:noAutofit/>
+          </a:bodyPr>
+          <a:lstStyle/>
+          <a:p>
+            <a:pPr marL="0" marR="0" lvl="0" indent="0" algn="l" rtl="0">
+              <a:lnSpc>
+                <a:spcPct val="100000"/>
+              </a:lnSpc>
+              <a:spcBef>
+                <a:spcPts val="0"/>
+              </a:spcBef>
+              <a:spcAft>
+                <a:spcPts val="0"/>
+              </a:spcAft>
+              <a:buClr>
+                <a:srgbClr val="000000"/>
+              </a:buClr>
+              <a:buSzPts val="3200"/>
+              <a:buFont typeface="Arial"/>
+              <a:buNone/>
+            </a:pPr>
+            <a:r>
+              <a:rPr lang="pt-BR" sz="3200" b="1" dirty="0">
+                <a:solidFill>
+                  <a:srgbClr val="FF0000"/>
+                </a:solidFill>
+                <a:latin typeface="Century Schoolbook"/>
+                <a:ea typeface="Century Schoolbook"/>
+                <a:cs typeface="Century Schoolbook"/>
+                <a:sym typeface="Century Schoolbook"/>
+              </a:rPr>
+              <a:t>Modelo Lógico – Paradigma OO (UML)</a:t>
+            </a:r>
+            <a:endParaRPr sz="3200" b="1" i="0" u="none" strike="noStrike" cap="none" dirty="0">
+              <a:solidFill>
+                <a:srgbClr val="000000"/>
+              </a:solidFill>
+              <a:latin typeface="Century Schoolbook"/>
+              <a:ea typeface="Century Schoolbook"/>
+              <a:cs typeface="Century Schoolbook"/>
+              <a:sym typeface="Century Schoolbook"/>
+            </a:endParaRPr>
+          </a:p>
+        </p:txBody>
+      </p:sp>
+      <p:pic>
+        <p:nvPicPr>
+          <p:cNvPr id="5" name="Imagem 4">
+            <a:extLst>
+              <a:ext uri="{FF2B5EF4-FFF2-40B4-BE49-F238E27FC236}">
+                <a16:creationId xmlns:a16="http://schemas.microsoft.com/office/drawing/2014/main" id="{61EC921F-D17E-B2C3-6BB3-A6FC3D257A23}"/>
+              </a:ext>
+            </a:extLst>
+          </p:cNvPr>
+          <p:cNvPicPr>
+            <a:picLocks noChangeAspect="1"/>
+          </p:cNvPicPr>
+          <p:nvPr/>
+        </p:nvPicPr>
+        <p:blipFill>
+          <a:blip r:embed="rId4"/>
+          <a:stretch>
+            <a:fillRect/>
+          </a:stretch>
+        </p:blipFill>
+        <p:spPr>
+          <a:xfrm>
+            <a:off x="409754" y="1360081"/>
+            <a:ext cx="10967686" cy="5115670"/>
+          </a:xfrm>
+          <a:prstGeom prst="rect">
+            <a:avLst/>
+          </a:prstGeom>
+        </p:spPr>
+      </p:pic>
+      <p:sp>
+        <p:nvSpPr>
+          <p:cNvPr id="6" name="CaixaDeTexto 5">
+            <a:extLst>
+              <a:ext uri="{FF2B5EF4-FFF2-40B4-BE49-F238E27FC236}">
+                <a16:creationId xmlns:a16="http://schemas.microsoft.com/office/drawing/2014/main" id="{5104056A-2D45-7A35-C142-D2A9296CE29F}"/>
+              </a:ext>
+            </a:extLst>
+          </p:cNvPr>
+          <p:cNvSpPr txBox="1"/>
+          <p:nvPr/>
+        </p:nvSpPr>
+        <p:spPr>
+          <a:xfrm>
+            <a:off x="3396742" y="3308980"/>
+            <a:ext cx="3483647" cy="954107"/>
+          </a:xfrm>
+          <a:prstGeom prst="rect">
+            <a:avLst/>
+          </a:prstGeom>
+          <a:noFill/>
+        </p:spPr>
+        <p:txBody>
+          <a:bodyPr wrap="square" rtlCol="0">
+            <a:spAutoFit/>
+          </a:bodyPr>
+          <a:lstStyle/>
+          <a:p>
+            <a:r>
+              <a:rPr lang="pt-BR" sz="2800" b="1" dirty="0">
+                <a:solidFill>
+                  <a:srgbClr val="FF0000"/>
+                </a:solidFill>
+              </a:rPr>
+              <a:t>Exemplo Diagrama de Classe (UML)</a:t>
+            </a:r>
+          </a:p>
+        </p:txBody>
+      </p:sp>
+    </p:spTree>
+    <p:extLst>
+      <p:ext uri="{BB962C8B-B14F-4D97-AF65-F5344CB8AC3E}">
+        <p14:creationId xmlns:p14="http://schemas.microsoft.com/office/powerpoint/2010/main" val="2838296500"/>
+      </p:ext>
+    </p:extLst>
+  </p:cSld>
+  <p:clrMapOvr>
+    <a:masterClrMapping/>
+  </p:clrMapOvr>
+  <p:timing>
+    <p:tnLst>
+      <p:par>
+        <p:cTn id="1" dur="indefinite" restart="never" nodeType="tmRoot">
+          <p:childTnLst>
+            <p:seq concurrent="1" nextAc="seek">
+              <p:cTn id="2" dur="indefinite" nodeType="mainSeq">
+                <p:childTnLst>
+                  <p:par>
+                    <p:cTn id="3" fill="hold">
+                      <p:stCondLst>
+                        <p:cond delay="indefinite"/>
+                      </p:stCondLst>
+                      <p:childTnLst>
+                        <p:par>
+                          <p:cTn id="4" fill="hold">
+                            <p:stCondLst>
+                              <p:cond delay="0"/>
+                            </p:stCondLst>
+                            <p:childTnLst>
+                              <p:par>
+                                <p:cTn id="5" presetID="10" presetClass="entr" presetSubtype="0" fill="hold" nodeType="clickEffect" nodePh="1">
+                                  <p:stCondLst>
+                                    <p:cond delay="0"/>
+                                  </p:stCondLst>
+                                  <p:endCondLst>
+                                    <p:cond evt="begin" delay="0">
+                                      <p:tn val="5"/>
+                                    </p:cond>
+                                  </p:endCondLst>
+                                  <p:childTnLst>
+                                    <p:set>
+                                      <p:cBhvr>
+                                        <p:cTn id="6" dur="1" fill="hold">
+                                          <p:stCondLst>
+                                            <p:cond delay="0"/>
+                                          </p:stCondLst>
+                                        </p:cTn>
+                                        <p:tgtEl>
+                                          <p:spTgt spid="100">
+                                            <p:txEl>
+                                              <p:pRg st="0" end="0"/>
+                                            </p:txEl>
+                                          </p:spTgt>
+                                        </p:tgtEl>
+                                        <p:attrNameLst>
+                                          <p:attrName>style.visibility</p:attrName>
+                                        </p:attrNameLst>
+                                      </p:cBhvr>
+                                      <p:to>
+                                        <p:strVal val="visible"/>
+                                      </p:to>
+                                    </p:set>
+                                    <p:animEffect transition="in" filter="fade">
+                                      <p:cBhvr>
+                                        <p:cTn id="7" dur="500"/>
+                                        <p:tgtEl>
+                                          <p:spTgt spid="100">
+                                            <p:txEl>
+                                              <p:pRg st="0" end="0"/>
+                                            </p:txEl>
+                                          </p:spTgt>
+                                        </p:tgtEl>
+                                      </p:cBhvr>
+                                    </p:animEffect>
+                                  </p:childTnLst>
+                                </p:cTn>
+                              </p:par>
+                            </p:childTnLst>
+                          </p:cTn>
+                        </p:par>
+                      </p:childTnLst>
+                    </p:cTn>
+                  </p:par>
+                </p:childTnLst>
+              </p:cTn>
+              <p:prevCondLst>
+                <p:cond evt="onPrev" delay="0">
+                  <p:tgtEl>
+                    <p:sldTgt/>
+                  </p:tgtEl>
+                </p:cond>
+              </p:prevCondLst>
+              <p:nextCondLst>
+                <p:cond evt="onNext" delay="0">
+                  <p:tgtEl>
+                    <p:sldTgt/>
+                  </p:tgtEl>
+                </p:cond>
+              </p:nextCondLst>
+            </p:seq>
+          </p:childTnLst>
+        </p:cTn>
+      </p:par>
+    </p:tnLst>
+  </p:timing>
+</p:sld>
+</file>
+
+<file path=ppt/slides/slide4.xml><?xml version="1.0" encoding="utf-8"?>
+<p:sld xmlns:a="http://schemas.openxmlformats.org/drawingml/2006/main" xmlns:r="http://schemas.openxmlformats.org/officeDocument/2006/relationships" xmlns:p="http://schemas.openxmlformats.org/presentationml/2006/main">
+  <p:cSld>
+    <p:spTree>
+      <p:nvGrpSpPr>
+        <p:cNvPr id="1" name="Shape 96"/>
+        <p:cNvGrpSpPr/>
+        <p:nvPr/>
+      </p:nvGrpSpPr>
+      <p:grpSpPr>
+        <a:xfrm>
+          <a:off x="0" y="0"/>
+          <a:ext cx="0" cy="0"/>
+          <a:chOff x="0" y="0"/>
+          <a:chExt cx="0" cy="0"/>
+        </a:xfrm>
+      </p:grpSpPr>
+      <p:sp>
+        <p:nvSpPr>
+          <p:cNvPr id="97" name="Google Shape;97;g1df91a3117e_0_0"/>
+          <p:cNvSpPr/>
+          <p:nvPr/>
+        </p:nvSpPr>
+        <p:spPr>
+          <a:xfrm>
+            <a:off x="0" y="0"/>
+            <a:ext cx="12192000" cy="1747800"/>
+          </a:xfrm>
+          <a:prstGeom prst="rect">
+            <a:avLst/>
+          </a:prstGeom>
+          <a:noFill/>
+          <a:ln>
+            <a:noFill/>
+          </a:ln>
+        </p:spPr>
+        <p:txBody>
+          <a:bodyPr spcFirstLastPara="1" wrap="square" lIns="91425" tIns="45700" rIns="91425" bIns="45700" anchor="ctr" anchorCtr="0">
+            <a:noAutofit/>
+          </a:bodyPr>
+          <a:lstStyle/>
+          <a:p>
+            <a:pPr marL="0" marR="0" lvl="0" indent="0" algn="ctr" rtl="0">
+              <a:lnSpc>
+                <a:spcPct val="100000"/>
+              </a:lnSpc>
+              <a:spcBef>
+                <a:spcPts val="0"/>
+              </a:spcBef>
+              <a:spcAft>
+                <a:spcPts val="0"/>
+              </a:spcAft>
+              <a:buClr>
+                <a:srgbClr val="000000"/>
+              </a:buClr>
+              <a:buSzPts val="1800"/>
+              <a:buFont typeface="Arial"/>
+              <a:buNone/>
+            </a:pPr>
+            <a:endParaRPr sz="1800" b="0" i="0" u="none" strike="noStrike" cap="none">
+              <a:solidFill>
+                <a:schemeClr val="lt1"/>
+              </a:solidFill>
+              <a:latin typeface="Arial"/>
+              <a:ea typeface="Arial"/>
+              <a:cs typeface="Arial"/>
+              <a:sym typeface="Arial"/>
+            </a:endParaRPr>
+          </a:p>
+        </p:txBody>
+      </p:sp>
+      <p:sp>
+        <p:nvSpPr>
+          <p:cNvPr id="98" name="Google Shape;98;g1df91a3117e_0_0"/>
+          <p:cNvSpPr txBox="1">
+            <a:spLocks noGrp="1"/>
+          </p:cNvSpPr>
+          <p:nvPr>
+            <p:ph type="sldNum" idx="12"/>
+          </p:nvPr>
+        </p:nvSpPr>
+        <p:spPr>
+          <a:xfrm>
+            <a:off x="8737600" y="6356351"/>
+            <a:ext cx="2844900" cy="365100"/>
+          </a:xfrm>
+          <a:prstGeom prst="rect">
+            <a:avLst/>
+          </a:prstGeom>
+          <a:noFill/>
+          <a:ln>
+            <a:noFill/>
+          </a:ln>
+        </p:spPr>
+        <p:txBody>
+          <a:bodyPr spcFirstLastPara="1" wrap="square" lIns="91425" tIns="45700" rIns="91425" bIns="45700" anchor="ctr" anchorCtr="0">
+            <a:noAutofit/>
+          </a:bodyPr>
+          <a:lstStyle/>
+          <a:p>
+            <a:pPr marL="0" lvl="0" indent="0" algn="r" rtl="0">
+              <a:lnSpc>
+                <a:spcPct val="100000"/>
+              </a:lnSpc>
+              <a:spcBef>
+                <a:spcPts val="0"/>
+              </a:spcBef>
+              <a:spcAft>
+                <a:spcPts val="0"/>
+              </a:spcAft>
+              <a:buClr>
+                <a:srgbClr val="000000"/>
+              </a:buClr>
+              <a:buSzPts val="1200"/>
+              <a:buFont typeface="Arial"/>
+              <a:buNone/>
+            </a:pPr>
+            <a:fld id="{00000000-1234-1234-1234-123412341234}" type="slidenum">
+              <a:rPr lang="pt-BR"/>
+              <a:t>4</a:t>
+            </a:fld>
+            <a:endParaRPr/>
+          </a:p>
+        </p:txBody>
+      </p:sp>
+      <p:pic>
+        <p:nvPicPr>
+          <p:cNvPr id="99" name="Google Shape;99;g1df91a3117e_0_0"/>
+          <p:cNvPicPr preferRelativeResize="0"/>
+          <p:nvPr/>
+        </p:nvPicPr>
+        <p:blipFill rotWithShape="1">
+          <a:blip r:embed="rId3">
+            <a:alphaModFix/>
+          </a:blip>
+          <a:srcRect/>
+          <a:stretch/>
+        </p:blipFill>
+        <p:spPr>
+          <a:xfrm>
+            <a:off x="9206151" y="0"/>
+            <a:ext cx="2380082" cy="1371599"/>
+          </a:xfrm>
+          <a:prstGeom prst="rect">
+            <a:avLst/>
+          </a:prstGeom>
+          <a:noFill/>
+          <a:ln>
+            <a:noFill/>
+          </a:ln>
+        </p:spPr>
+      </p:pic>
+      <p:sp>
+        <p:nvSpPr>
+          <p:cNvPr id="100" name="Google Shape;100;g1df91a3117e_0_0"/>
+          <p:cNvSpPr/>
+          <p:nvPr/>
+        </p:nvSpPr>
+        <p:spPr>
+          <a:xfrm>
+            <a:off x="409754" y="1365940"/>
+            <a:ext cx="10988700" cy="5244721"/>
           </a:xfrm>
           <a:prstGeom prst="rect">
             <a:avLst/>
@@ -23236,7 +25091,7 @@
 </p:sld>
 </file>
 
-<file path=ppt/slides/slide4.xml><?xml version="1.0" encoding="utf-8"?>
+<file path=ppt/slides/slide5.xml><?xml version="1.0" encoding="utf-8"?>
 <p:sld xmlns:a="http://schemas.openxmlformats.org/drawingml/2006/main" xmlns:r="http://schemas.openxmlformats.org/officeDocument/2006/relationships" xmlns:p="http://schemas.openxmlformats.org/presentationml/2006/main">
   <p:cSld>
     <p:spTree>
@@ -23355,7 +25210,7 @@
             </a:pPr>
             <a:fld id="{00000000-1234-1234-1234-123412341234}" type="slidenum">
               <a:rPr lang="pt-BR"/>
-              <a:t>4</a:t>
+              <a:t>5</a:t>
             </a:fld>
             <a:endParaRPr/>
           </a:p>
@@ -23803,7 +25658,7 @@
 </p:sld>
 </file>
 
-<file path=ppt/slides/slide5.xml><?xml version="1.0" encoding="utf-8"?>
+<file path=ppt/slides/slide6.xml><?xml version="1.0" encoding="utf-8"?>
 <p:sld xmlns:a="http://schemas.openxmlformats.org/drawingml/2006/main" xmlns:r="http://schemas.openxmlformats.org/officeDocument/2006/relationships" xmlns:p="http://schemas.openxmlformats.org/presentationml/2006/main">
   <p:cSld>
     <p:spTree>
@@ -23922,7 +25777,7 @@
             </a:pPr>
             <a:fld id="{00000000-1234-1234-1234-123412341234}" type="slidenum">
               <a:rPr lang="pt-BR"/>
-              <a:t>5</a:t>
+              <a:t>6</a:t>
             </a:fld>
             <a:endParaRPr/>
           </a:p>
@@ -24708,7 +26563,7 @@
 </p:sld>
 </file>
 
-<file path=ppt/slides/slide6.xml><?xml version="1.0" encoding="utf-8"?>
+<file path=ppt/slides/slide7.xml><?xml version="1.0" encoding="utf-8"?>
 <p:sld xmlns:a="http://schemas.openxmlformats.org/drawingml/2006/main" xmlns:r="http://schemas.openxmlformats.org/officeDocument/2006/relationships" xmlns:p="http://schemas.openxmlformats.org/presentationml/2006/main">
   <p:cSld>
     <p:spTree>
@@ -24827,7 +26682,7 @@
             </a:pPr>
             <a:fld id="{00000000-1234-1234-1234-123412341234}" type="slidenum">
               <a:rPr lang="pt-BR"/>
-              <a:t>6</a:t>
+              <a:t>7</a:t>
             </a:fld>
             <a:endParaRPr/>
           </a:p>
@@ -24868,8 +26723,8 @@
         </p:nvSpPr>
         <p:spPr>
           <a:xfrm>
-            <a:off x="409754" y="1905582"/>
-            <a:ext cx="10988700" cy="3525600"/>
+            <a:off x="316396" y="1171063"/>
+            <a:ext cx="10988700" cy="4989893"/>
           </a:xfrm>
           <a:prstGeom prst="rect">
             <a:avLst/>
@@ -24903,18 +26758,30 @@
               <a:buNone/>
             </a:pPr>
             <a:r>
-              <a:rPr lang="pt-BR" sz="1800" b="0" i="0" u="none" strike="noStrike" cap="none" dirty="0">
-                <a:solidFill>
-                  <a:schemeClr val="dk1"/>
+              <a:rPr lang="pt-BR" sz="2400" b="1" i="0" u="none" strike="noStrike" cap="none" dirty="0">
+                <a:solidFill>
+                  <a:srgbClr val="FF0000"/>
                 </a:solidFill>
                 <a:latin typeface="Arial"/>
                 <a:ea typeface="Arial"/>
                 <a:cs typeface="Arial"/>
                 <a:sym typeface="Arial"/>
               </a:rPr>
-              <a:t>Realização das atividades práticas da disciplina.</a:t>
+              <a:t>Realização das atividades práticas da disciplina</a:t>
             </a:r>
-            <a:endParaRPr sz="1400" b="0" i="0" u="none" strike="noStrike" cap="none" dirty="0">
+            <a:r>
+              <a:rPr lang="pt-BR" sz="2400" b="0" i="0" u="none" strike="noStrike" cap="none" dirty="0">
+                <a:solidFill>
+                  <a:schemeClr val="dk1"/>
+                </a:solidFill>
+                <a:latin typeface="Arial"/>
+                <a:ea typeface="Arial"/>
+                <a:cs typeface="Arial"/>
+                <a:sym typeface="Arial"/>
+              </a:rPr>
+              <a:t>.</a:t>
+            </a:r>
+            <a:endParaRPr sz="2400" b="0" i="0" u="none" strike="noStrike" cap="none" dirty="0">
               <a:solidFill>
                 <a:schemeClr val="dk1"/>
               </a:solidFill>
@@ -24942,7 +26809,7 @@
               <a:buFont typeface="Arial"/>
               <a:buNone/>
             </a:pPr>
-            <a:endParaRPr sz="1800" b="0" i="0" u="none" strike="noStrike" cap="none" dirty="0">
+            <a:endParaRPr sz="2400" b="0" i="0" u="none" strike="noStrike" cap="none" dirty="0">
               <a:solidFill>
                 <a:schemeClr val="dk1"/>
               </a:solidFill>
@@ -24971,7 +26838,7 @@
               <a:buNone/>
             </a:pPr>
             <a:r>
-              <a:rPr lang="pt-BR" sz="1800" b="0" i="0" u="none" strike="noStrike" cap="none" dirty="0">
+              <a:rPr lang="pt-BR" sz="2400" b="0" i="0" u="none" strike="noStrike" cap="none" dirty="0">
                 <a:solidFill>
                   <a:schemeClr val="dk1"/>
                 </a:solidFill>
@@ -24983,7 +26850,7 @@
               <a:t>- Pensem em um ambiente para projetar um Banco de Dados (</a:t>
             </a:r>
             <a:r>
-              <a:rPr lang="pt-BR" sz="1800" b="0" i="0" u="none" strike="noStrike" cap="none" dirty="0" err="1">
+              <a:rPr lang="pt-BR" sz="2400" b="0" i="0" u="none" strike="noStrike" cap="none" dirty="0" err="1">
                 <a:solidFill>
                   <a:schemeClr val="dk1"/>
                 </a:solidFill>
@@ -24995,7 +26862,7 @@
               <a:t>ex</a:t>
             </a:r>
             <a:r>
-              <a:rPr lang="pt-BR" sz="1800" b="0" i="0" u="none" strike="noStrike" cap="none" dirty="0">
+              <a:rPr lang="pt-BR" sz="2400" b="0" i="0" u="none" strike="noStrike" cap="none" dirty="0">
                 <a:solidFill>
                   <a:schemeClr val="dk1"/>
                 </a:solidFill>
@@ -25007,7 +26874,7 @@
               <a:t>: supermercado, farmácia, biblioteca, restaurante, loja, aluguel de carros, food </a:t>
             </a:r>
             <a:r>
-              <a:rPr lang="pt-BR" sz="1800" b="0" i="0" u="none" strike="noStrike" cap="none" dirty="0" err="1">
+              <a:rPr lang="pt-BR" sz="2400" b="0" i="0" u="none" strike="noStrike" cap="none" dirty="0" err="1">
                 <a:solidFill>
                   <a:schemeClr val="dk1"/>
                 </a:solidFill>
@@ -25019,7 +26886,7 @@
               <a:t>truck</a:t>
             </a:r>
             <a:r>
-              <a:rPr lang="pt-BR" sz="1800" b="0" i="0" u="none" strike="noStrike" cap="none" dirty="0">
+              <a:rPr lang="pt-BR" sz="2400" b="0" i="0" u="none" strike="noStrike" cap="none" dirty="0">
                 <a:solidFill>
                   <a:schemeClr val="dk1"/>
                 </a:solidFill>
@@ -25030,7 +26897,7 @@
               </a:rPr>
               <a:t>, etc.);</a:t>
             </a:r>
-            <a:endParaRPr sz="1400" b="0" i="0" u="none" strike="noStrike" cap="none" dirty="0">
+            <a:endParaRPr sz="2400" b="0" i="0" u="none" strike="noStrike" cap="none" dirty="0">
               <a:solidFill>
                 <a:srgbClr val="000000"/>
               </a:solidFill>
@@ -25058,7 +26925,7 @@
               <a:buFont typeface="Arial"/>
               <a:buNone/>
             </a:pPr>
-            <a:endParaRPr sz="1800" b="0" i="0" u="none" strike="noStrike" cap="none" dirty="0">
+            <a:endParaRPr sz="2400" b="0" i="0" u="none" strike="noStrike" cap="none" dirty="0">
               <a:solidFill>
                 <a:schemeClr val="dk1"/>
               </a:solidFill>
@@ -25087,7 +26954,7 @@
               <a:buNone/>
             </a:pPr>
             <a:r>
-              <a:rPr lang="pt-BR" sz="1800" b="0" i="0" u="none" strike="noStrike" cap="none" dirty="0">
+              <a:rPr lang="pt-BR" sz="2400" b="0" i="0" u="none" strike="noStrike" cap="none" dirty="0">
                 <a:solidFill>
                   <a:schemeClr val="dk1"/>
                 </a:solidFill>
@@ -25098,7 +26965,7 @@
               </a:rPr>
               <a:t>- Analise o ambiente escolhido para coleta e levantamento de requisitos;</a:t>
             </a:r>
-            <a:endParaRPr sz="1400" b="0" i="0" u="none" strike="noStrike" cap="none" dirty="0">
+            <a:endParaRPr sz="2400" b="0" i="0" u="none" strike="noStrike" cap="none" dirty="0">
               <a:solidFill>
                 <a:srgbClr val="000000"/>
               </a:solidFill>
@@ -25126,7 +26993,7 @@
               <a:buFont typeface="Arial"/>
               <a:buNone/>
             </a:pPr>
-            <a:endParaRPr sz="1800" b="0" i="0" u="none" strike="noStrike" cap="none" dirty="0">
+            <a:endParaRPr sz="2400" b="0" i="0" u="none" strike="noStrike" cap="none" dirty="0">
               <a:solidFill>
                 <a:schemeClr val="dk1"/>
               </a:solidFill>
@@ -25155,7 +27022,7 @@
               <a:buNone/>
             </a:pPr>
             <a:r>
-              <a:rPr lang="pt-BR" sz="1800" b="0" i="0" u="none" strike="noStrike" cap="none" dirty="0">
+              <a:rPr lang="pt-BR" sz="2400" b="0" i="0" u="none" strike="noStrike" cap="none" dirty="0">
                 <a:solidFill>
                   <a:schemeClr val="dk1"/>
                 </a:solidFill>
@@ -25167,7 +27034,7 @@
               <a:t>- Crie o modelo conceitual </a:t>
             </a:r>
             <a:r>
-              <a:rPr lang="pt-BR" sz="1800" b="1" i="0" u="none" strike="noStrike" cap="none" dirty="0">
+              <a:rPr lang="pt-BR" sz="2400" b="1" i="0" u="none" strike="noStrike" cap="none" dirty="0">
                 <a:solidFill>
                   <a:schemeClr val="dk1"/>
                 </a:solidFill>
@@ -25179,7 +27046,7 @@
               <a:t>textual </a:t>
             </a:r>
             <a:r>
-              <a:rPr lang="pt-BR" sz="1800" b="0" i="0" u="none" strike="noStrike" cap="none" dirty="0">
+              <a:rPr lang="pt-BR" sz="2400" b="0" i="0" u="none" strike="noStrike" cap="none" dirty="0">
                 <a:solidFill>
                   <a:schemeClr val="dk1"/>
                 </a:solidFill>
@@ -25190,7 +27057,7 @@
               </a:rPr>
               <a:t>do banco de dados apresentando quais dados irão aparecer no banco de dados. </a:t>
             </a:r>
-            <a:endParaRPr sz="1400" b="0" i="0" u="none" strike="noStrike" cap="none" dirty="0">
+            <a:endParaRPr sz="2400" b="0" i="0" u="none" strike="noStrike" cap="none" dirty="0">
               <a:solidFill>
                 <a:srgbClr val="000000"/>
               </a:solidFill>
@@ -25750,7 +27617,7 @@
 </p:sld>
 </file>
 
-<file path=ppt/slides/slide7.xml><?xml version="1.0" encoding="utf-8"?>
+<file path=ppt/slides/slide8.xml><?xml version="1.0" encoding="utf-8"?>
 <p:sld xmlns:a="http://schemas.openxmlformats.org/drawingml/2006/main" xmlns:r="http://schemas.openxmlformats.org/officeDocument/2006/relationships" xmlns:p="http://schemas.openxmlformats.org/presentationml/2006/main">
   <p:cSld>
     <p:spTree>
@@ -25869,7 +27736,7 @@
             </a:pPr>
             <a:fld id="{00000000-1234-1234-1234-123412341234}" type="slidenum">
               <a:rPr lang="pt-BR"/>
-              <a:t>7</a:t>
+              <a:t>8</a:t>
             </a:fld>
             <a:endParaRPr/>
           </a:p>
@@ -25985,8 +27852,8 @@
         </p:nvSpPr>
         <p:spPr>
           <a:xfrm>
-            <a:off x="493310" y="1163874"/>
-            <a:ext cx="11089200" cy="3525600"/>
+            <a:off x="493310" y="1163873"/>
+            <a:ext cx="11089200" cy="4562369"/>
           </a:xfrm>
           <a:prstGeom prst="rect">
             <a:avLst/>
@@ -26020,19 +27887,16 @@
               <a:buNone/>
             </a:pPr>
             <a:r>
-              <a:rPr lang="pt-BR" sz="1800" b="0" i="0" u="none" strike="noStrike" cap="none">
-                <a:solidFill>
-                  <a:schemeClr val="dk1"/>
-                </a:solidFill>
-                <a:latin typeface="Arial"/>
-                <a:ea typeface="Arial"/>
-                <a:cs typeface="Arial"/>
+              <a:rPr lang="pt-BR" sz="2400" b="0" i="0" u="none" strike="noStrike" cap="none" dirty="0">
+                <a:solidFill>
+                  <a:schemeClr val="dk1"/>
+                </a:solidFill>
                 <a:sym typeface="Arial"/>
               </a:rPr>
               <a:t>- Após a criação do Modelo conceitual textual feito anteriormente, desenvolva </a:t>
             </a:r>
             <a:r>
-              <a:rPr lang="pt-BR" sz="1800">
+              <a:rPr lang="pt-BR" sz="2400" dirty="0">
                 <a:solidFill>
                   <a:schemeClr val="dk1"/>
                 </a:solidFill>
@@ -26040,24 +27904,18 @@
               <a:t>o</a:t>
             </a:r>
             <a:r>
-              <a:rPr lang="pt-BR" sz="1800" b="0" i="0" u="none" strike="noStrike" cap="none">
-                <a:solidFill>
-                  <a:schemeClr val="dk1"/>
-                </a:solidFill>
-                <a:latin typeface="Arial"/>
-                <a:ea typeface="Arial"/>
-                <a:cs typeface="Arial"/>
+              <a:rPr lang="pt-BR" sz="2400" b="0" i="0" u="none" strike="noStrike" cap="none" dirty="0">
+                <a:solidFill>
+                  <a:schemeClr val="dk1"/>
+                </a:solidFill>
                 <a:sym typeface="Arial"/>
               </a:rPr>
               <a:t> diagrama Entidade-Relacionamento de uma maneira lógica, inclusive nomeando os componentes e ações que exercem uns sobre os outros.</a:t>
             </a:r>
-            <a:endParaRPr sz="1800" b="0" i="0" u="none" strike="noStrike" cap="none">
+            <a:endParaRPr sz="2400" b="0" i="0" u="none" strike="noStrike" cap="none" dirty="0">
               <a:solidFill>
                 <a:schemeClr val="dk1"/>
               </a:solidFill>
-              <a:latin typeface="Arial"/>
-              <a:ea typeface="Arial"/>
-              <a:cs typeface="Arial"/>
               <a:sym typeface="Arial"/>
             </a:endParaRPr>
           </a:p>
@@ -26079,13 +27937,10 @@
               <a:buFont typeface="Arial"/>
               <a:buNone/>
             </a:pPr>
-            <a:endParaRPr sz="1800" b="0" i="0" u="none" strike="noStrike" cap="none">
+            <a:endParaRPr sz="2400" b="0" i="0" u="none" strike="noStrike" cap="none" dirty="0">
               <a:solidFill>
                 <a:schemeClr val="dk1"/>
               </a:solidFill>
-              <a:latin typeface="Arial"/>
-              <a:ea typeface="Arial"/>
-              <a:cs typeface="Arial"/>
               <a:sym typeface="Arial"/>
             </a:endParaRPr>
           </a:p>
@@ -26108,24 +27963,18 @@
               <a:buNone/>
             </a:pPr>
             <a:r>
-              <a:rPr lang="pt-BR" sz="1800" b="0" i="0" u="none" strike="noStrike" cap="none">
-                <a:solidFill>
-                  <a:schemeClr val="dk1"/>
-                </a:solidFill>
-                <a:latin typeface="Arial"/>
-                <a:ea typeface="Arial"/>
-                <a:cs typeface="Arial"/>
+              <a:rPr lang="pt-BR" sz="2400" b="0" i="0" u="none" strike="noStrike" cap="none" dirty="0">
+                <a:solidFill>
+                  <a:schemeClr val="dk1"/>
+                </a:solidFill>
                 <a:sym typeface="Arial"/>
               </a:rPr>
               <a:t>- Nesta etapa identifique apenas as entidades e os relacionamentos entre elas. Não se faz necessário ainda inserir os atributos neste diagrama.</a:t>
             </a:r>
-            <a:endParaRPr sz="1800" b="0" i="0" u="none" strike="noStrike" cap="none">
+            <a:endParaRPr sz="2400" b="0" i="0" u="none" strike="noStrike" cap="none" dirty="0">
               <a:solidFill>
                 <a:schemeClr val="dk1"/>
               </a:solidFill>
-              <a:latin typeface="Arial"/>
-              <a:ea typeface="Arial"/>
-              <a:cs typeface="Arial"/>
               <a:sym typeface="Arial"/>
             </a:endParaRPr>
           </a:p>
@@ -26147,7 +27996,7 @@
               <a:buFont typeface="Arial"/>
               <a:buNone/>
             </a:pPr>
-            <a:endParaRPr sz="1800">
+            <a:endParaRPr sz="2400" dirty="0">
               <a:solidFill>
                 <a:schemeClr val="dk1"/>
               </a:solidFill>
@@ -26166,7 +28015,7 @@
               </a:spcAft>
               <a:buNone/>
             </a:pPr>
-            <a:endParaRPr sz="1800">
+            <a:endParaRPr sz="2400" dirty="0">
               <a:solidFill>
                 <a:schemeClr val="dk1"/>
               </a:solidFill>
@@ -26517,7 +28366,7 @@
 </p:sld>
 </file>
 
-<file path=ppt/slides/slide8.xml><?xml version="1.0" encoding="utf-8"?>
+<file path=ppt/slides/slide9.xml><?xml version="1.0" encoding="utf-8"?>
 <p:sld xmlns:a="http://schemas.openxmlformats.org/drawingml/2006/main" xmlns:r="http://schemas.openxmlformats.org/officeDocument/2006/relationships" xmlns:p="http://schemas.openxmlformats.org/presentationml/2006/main">
   <p:cSld>
     <p:spTree>
@@ -26636,7 +28485,7 @@
             </a:pPr>
             <a:fld id="{00000000-1234-1234-1234-123412341234}" type="slidenum">
               <a:rPr lang="pt-BR"/>
-              <a:t>8</a:t>
+              <a:t>9</a:t>
             </a:fld>
             <a:endParaRPr/>
           </a:p>
@@ -26744,7 +28593,7 @@
         <p:spPr>
           <a:xfrm>
             <a:off x="493235" y="1225072"/>
-            <a:ext cx="11089200" cy="4471189"/>
+            <a:ext cx="11089200" cy="5412678"/>
           </a:xfrm>
           <a:prstGeom prst="rect">
             <a:avLst/>
@@ -26852,7 +28701,7 @@
             </a:endParaRPr>
           </a:p>
           <a:p>
-            <a:pPr marL="0" marR="0" lvl="0" indent="0" algn="just" rtl="0">
+            <a:pPr marL="285750" marR="0" lvl="0" indent="-285750" algn="just" rtl="0">
               <a:lnSpc>
                 <a:spcPct val="150000"/>
               </a:lnSpc>
@@ -26866,8 +28715,8 @@
                 <a:srgbClr val="000000"/>
               </a:buClr>
               <a:buSzPts val="1800"/>
-              <a:buFont typeface="Arial"/>
-              <a:buNone/>
+              <a:buFontTx/>
+              <a:buChar char="-"/>
             </a:pPr>
             <a:r>
               <a:rPr lang="pt-BR" sz="1800" b="0" i="0" u="none" strike="noStrike" cap="none" dirty="0">
@@ -26879,7 +28728,7 @@
                 <a:cs typeface="Arial"/>
                 <a:sym typeface="Arial"/>
               </a:rPr>
-              <a:t>- Para cada uma das entidades envolvidas no </a:t>
+              <a:t>Para cada uma das entidades envolvidas no </a:t>
             </a:r>
             <a:r>
               <a:rPr lang="pt-BR" sz="1800" b="1" i="0" u="none" strike="noStrike" cap="none" dirty="0">
@@ -26905,7 +28754,45 @@
               </a:rPr>
               <a:t>, defina a chave primária e estrangeira (se houver). </a:t>
             </a:r>
-            <a:endParaRPr sz="1800" b="0" i="0" u="none" strike="noStrike" cap="none" dirty="0">
+          </a:p>
+          <a:p>
+            <a:pPr marL="285750" indent="-285750" algn="just">
+              <a:lnSpc>
+                <a:spcPct val="150000"/>
+              </a:lnSpc>
+              <a:buSzPts val="1800"/>
+              <a:buFontTx/>
+              <a:buChar char="-"/>
+            </a:pPr>
+            <a:r>
+              <a:rPr lang="pt-BR" sz="1800" dirty="0">
+                <a:solidFill>
+                  <a:schemeClr val="dk1"/>
+                </a:solidFill>
+              </a:rPr>
+              <a:t>Apresente o modelo lógico feito explicando as cardinalidades e definições de chaves.</a:t>
+            </a:r>
+            <a:endParaRPr lang="pt-BR" dirty="0"/>
+          </a:p>
+          <a:p>
+            <a:pPr marL="285750" marR="0" lvl="0" indent="-285750" algn="just" rtl="0">
+              <a:lnSpc>
+                <a:spcPct val="150000"/>
+              </a:lnSpc>
+              <a:spcBef>
+                <a:spcPts val="0"/>
+              </a:spcBef>
+              <a:spcAft>
+                <a:spcPts val="0"/>
+              </a:spcAft>
+              <a:buClr>
+                <a:srgbClr val="000000"/>
+              </a:buClr>
+              <a:buSzPts val="1800"/>
+              <a:buFontTx/>
+              <a:buChar char="-"/>
+            </a:pPr>
+            <a:endParaRPr lang="pt-BR" sz="1800" b="0" i="0" u="none" strike="noStrike" cap="none" dirty="0">
               <a:solidFill>
                 <a:schemeClr val="dk1"/>
               </a:solidFill>
@@ -26916,52 +28803,24 @@
             </a:endParaRPr>
           </a:p>
           <a:p>
-            <a:pPr marL="0" marR="0" lvl="0" indent="0" algn="just" rtl="0">
-              <a:lnSpc>
-                <a:spcPct val="100000"/>
-              </a:lnSpc>
-              <a:spcBef>
-                <a:spcPts val="0"/>
-              </a:spcBef>
-              <a:spcAft>
-                <a:spcPts val="0"/>
-              </a:spcAft>
-              <a:buClr>
-                <a:srgbClr val="000000"/>
-              </a:buClr>
-              <a:buSzPts val="1400"/>
-              <a:buFont typeface="Arial"/>
-              <a:buNone/>
+            <a:pPr marL="285750" marR="0" lvl="0" indent="-285750" algn="just" rtl="0">
+              <a:lnSpc>
+                <a:spcPct val="150000"/>
+              </a:lnSpc>
+              <a:spcBef>
+                <a:spcPts val="0"/>
+              </a:spcBef>
+              <a:spcAft>
+                <a:spcPts val="0"/>
+              </a:spcAft>
+              <a:buClr>
+                <a:srgbClr val="000000"/>
+              </a:buClr>
+              <a:buSzPts val="1800"/>
+              <a:buFontTx/>
+              <a:buChar char="-"/>
             </a:pPr>
-            <a:endParaRPr sz="1400" b="1" i="0" u="none" strike="noStrike" cap="none" dirty="0">
-              <a:solidFill>
-                <a:schemeClr val="dk1"/>
-              </a:solidFill>
-              <a:latin typeface="Arial"/>
-              <a:ea typeface="Arial"/>
-              <a:cs typeface="Arial"/>
-              <a:sym typeface="Arial"/>
-            </a:endParaRPr>
-          </a:p>
-          <a:p>
-            <a:pPr marL="0" marR="0" lvl="0" indent="0" algn="just" rtl="0">
-              <a:lnSpc>
-                <a:spcPct val="100000"/>
-              </a:lnSpc>
-              <a:spcBef>
-                <a:spcPts val="0"/>
-              </a:spcBef>
-              <a:spcAft>
-                <a:spcPts val="0"/>
-              </a:spcAft>
-              <a:buClr>
-                <a:srgbClr val="000000"/>
-              </a:buClr>
-              <a:buSzPts val="1800"/>
-              <a:buFont typeface="Arial"/>
-              <a:buNone/>
-            </a:pPr>
-            <a:endParaRPr sz="1800" b="0" i="0" u="none" strike="noStrike" cap="none" dirty="0">
+            <a:endParaRPr lang="pt-BR" sz="1800" b="0" i="0" u="none" strike="noStrike" cap="none" dirty="0">
               <a:solidFill>
                 <a:schemeClr val="dk1"/>
               </a:solidFill>
@@ -27016,8 +28875,8 @@
         </p:blipFill>
         <p:spPr>
           <a:xfrm>
-            <a:off x="1270600" y="3429006"/>
-            <a:ext cx="5380546" cy="2078606"/>
+            <a:off x="4753007" y="4277744"/>
+            <a:ext cx="5440304" cy="2360006"/>
           </a:xfrm>
           <a:prstGeom prst="rect">
             <a:avLst/>
@@ -27043,7 +28902,7 @@
         </p:blipFill>
         <p:spPr>
           <a:xfrm>
-            <a:off x="7582511" y="3429004"/>
+            <a:off x="886986" y="4689262"/>
             <a:ext cx="2743200" cy="1667089"/>
           </a:xfrm>
           <a:prstGeom prst="rect">
@@ -27063,8 +28922,8 @@
         </p:nvSpPr>
         <p:spPr>
           <a:xfrm>
-            <a:off x="493225" y="5894650"/>
-            <a:ext cx="11471100" cy="461700"/>
+            <a:off x="609565" y="4009493"/>
+            <a:ext cx="11292625" cy="646300"/>
           </a:xfrm>
           <a:prstGeom prst="rect">
             <a:avLst/>
@@ -27098,1147 +28957,20 @@
               <a:buNone/>
             </a:pPr>
             <a:r>
-              <a:rPr lang="pt-BR" sz="1800" b="0" i="0" u="none" strike="noStrike" cap="none">
-                <a:solidFill>
-                  <a:schemeClr val="dk1"/>
+              <a:rPr lang="pt-BR" sz="2000" b="1" i="0" u="none" strike="noStrike" cap="none" dirty="0">
+                <a:solidFill>
+                  <a:srgbClr val="000000"/>
                 </a:solidFill>
                 <a:latin typeface="Arial"/>
                 <a:ea typeface="Arial"/>
                 <a:cs typeface="Arial"/>
                 <a:sym typeface="Arial"/>
               </a:rPr>
-              <a:t>- Apresente o modelo lógico feito explicando as cardinalidades e definições de chaves.</a:t>
+              <a:t>Exemplo de Modelo Lógico:</a:t>
             </a:r>
-            <a:endParaRPr sz="1400" b="0" i="0" u="none" strike="noStrike" cap="none">
+            <a:endParaRPr sz="2000" b="1" i="0" u="none" strike="noStrike" cap="none" dirty="0">
               <a:solidFill>
                 <a:srgbClr val="000000"/>
-              </a:solidFill>
-              <a:latin typeface="Arial"/>
-              <a:ea typeface="Arial"/>
-              <a:cs typeface="Arial"/>
-              <a:sym typeface="Arial"/>
-            </a:endParaRPr>
-          </a:p>
-        </p:txBody>
-      </p:sp>
-    </p:spTree>
-  </p:cSld>
-  <p:clrMapOvr>
-    <a:masterClrMapping/>
-  </p:clrMapOvr>
-  <p:timing>
-    <p:tnLst>
-      <p:par>
-        <p:cTn id="1" dur="indefinite" restart="never" nodeType="tmRoot">
-          <p:childTnLst>
-            <p:seq concurrent="1" nextAc="seek">
-              <p:cTn id="2" dur="indefinite" nodeType="mainSeq">
-                <p:childTnLst>
-                  <p:par>
-                    <p:cTn id="3" fill="hold">
-                      <p:stCondLst>
-                        <p:cond delay="indefinite"/>
-                      </p:stCondLst>
-                      <p:childTnLst>
-                        <p:par>
-                          <p:cTn id="4" fill="hold">
-                            <p:stCondLst>
-                              <p:cond delay="0"/>
-                            </p:stCondLst>
-                            <p:childTnLst>
-                              <p:par>
-                                <p:cTn id="5" presetID="10" presetClass="entr" presetSubtype="0" fill="hold" nodeType="clickEffect">
-                                  <p:stCondLst>
-                                    <p:cond delay="0"/>
-                                  </p:stCondLst>
-                                  <p:childTnLst>
-                                    <p:set>
-                                      <p:cBhvr>
-                                        <p:cTn id="6" dur="1" fill="hold">
-                                          <p:stCondLst>
-                                            <p:cond delay="0"/>
-                                          </p:stCondLst>
-                                        </p:cTn>
-                                        <p:tgtEl>
-                                          <p:spTgt spid="131">
-                                            <p:txEl>
-                                              <p:pRg st="0" end="0"/>
-                                            </p:txEl>
-                                          </p:spTgt>
-                                        </p:tgtEl>
-                                        <p:attrNameLst>
-                                          <p:attrName>style.visibility</p:attrName>
-                                        </p:attrNameLst>
-                                      </p:cBhvr>
-                                      <p:to>
-                                        <p:strVal val="visible"/>
-                                      </p:to>
-                                    </p:set>
-                                    <p:animEffect transition="in" filter="fade">
-                                      <p:cBhvr>
-                                        <p:cTn id="7" dur="500"/>
-                                        <p:tgtEl>
-                                          <p:spTgt spid="131">
-                                            <p:txEl>
-                                              <p:pRg st="0" end="0"/>
-                                            </p:txEl>
-                                          </p:spTgt>
-                                        </p:tgtEl>
-                                      </p:cBhvr>
-                                    </p:animEffect>
-                                  </p:childTnLst>
-                                </p:cTn>
-                              </p:par>
-                            </p:childTnLst>
-                          </p:cTn>
-                        </p:par>
-                      </p:childTnLst>
-                    </p:cTn>
-                  </p:par>
-                  <p:par>
-                    <p:cTn id="8" fill="hold">
-                      <p:stCondLst>
-                        <p:cond delay="indefinite"/>
-                      </p:stCondLst>
-                      <p:childTnLst>
-                        <p:par>
-                          <p:cTn id="9" fill="hold">
-                            <p:stCondLst>
-                              <p:cond delay="0"/>
-                            </p:stCondLst>
-                            <p:childTnLst>
-                              <p:par>
-                                <p:cTn id="10" presetID="10" presetClass="entr" presetSubtype="0" fill="hold" nodeType="clickEffect">
-                                  <p:stCondLst>
-                                    <p:cond delay="0"/>
-                                  </p:stCondLst>
-                                  <p:childTnLst>
-                                    <p:set>
-                                      <p:cBhvr>
-                                        <p:cTn id="11" dur="1" fill="hold">
-                                          <p:stCondLst>
-                                            <p:cond delay="0"/>
-                                          </p:stCondLst>
-                                        </p:cTn>
-                                        <p:tgtEl>
-                                          <p:spTgt spid="131">
-                                            <p:txEl>
-                                              <p:pRg st="1" end="1"/>
-                                            </p:txEl>
-                                          </p:spTgt>
-                                        </p:tgtEl>
-                                        <p:attrNameLst>
-                                          <p:attrName>style.visibility</p:attrName>
-                                        </p:attrNameLst>
-                                      </p:cBhvr>
-                                      <p:to>
-                                        <p:strVal val="visible"/>
-                                      </p:to>
-                                    </p:set>
-                                    <p:animEffect transition="in" filter="fade">
-                                      <p:cBhvr>
-                                        <p:cTn id="12" dur="500"/>
-                                        <p:tgtEl>
-                                          <p:spTgt spid="131">
-                                            <p:txEl>
-                                              <p:pRg st="1" end="1"/>
-                                            </p:txEl>
-                                          </p:spTgt>
-                                        </p:tgtEl>
-                                      </p:cBhvr>
-                                    </p:animEffect>
-                                  </p:childTnLst>
-                                </p:cTn>
-                              </p:par>
-                            </p:childTnLst>
-                          </p:cTn>
-                        </p:par>
-                      </p:childTnLst>
-                    </p:cTn>
-                  </p:par>
-                  <p:par>
-                    <p:cTn id="13" fill="hold">
-                      <p:stCondLst>
-                        <p:cond delay="indefinite"/>
-                      </p:stCondLst>
-                      <p:childTnLst>
-                        <p:par>
-                          <p:cTn id="14" fill="hold">
-                            <p:stCondLst>
-                              <p:cond delay="0"/>
-                            </p:stCondLst>
-                            <p:childTnLst>
-                              <p:par>
-                                <p:cTn id="15" presetID="10" presetClass="entr" presetSubtype="0" fill="hold" nodeType="clickEffect">
-                                  <p:stCondLst>
-                                    <p:cond delay="0"/>
-                                  </p:stCondLst>
-                                  <p:childTnLst>
-                                    <p:set>
-                                      <p:cBhvr>
-                                        <p:cTn id="16" dur="1" fill="hold">
-                                          <p:stCondLst>
-                                            <p:cond delay="0"/>
-                                          </p:stCondLst>
-                                        </p:cTn>
-                                        <p:tgtEl>
-                                          <p:spTgt spid="131">
-                                            <p:txEl>
-                                              <p:pRg st="2" end="2"/>
-                                            </p:txEl>
-                                          </p:spTgt>
-                                        </p:tgtEl>
-                                        <p:attrNameLst>
-                                          <p:attrName>style.visibility</p:attrName>
-                                        </p:attrNameLst>
-                                      </p:cBhvr>
-                                      <p:to>
-                                        <p:strVal val="visible"/>
-                                      </p:to>
-                                    </p:set>
-                                    <p:animEffect transition="in" filter="fade">
-                                      <p:cBhvr>
-                                        <p:cTn id="17" dur="500"/>
-                                        <p:tgtEl>
-                                          <p:spTgt spid="131">
-                                            <p:txEl>
-                                              <p:pRg st="2" end="2"/>
-                                            </p:txEl>
-                                          </p:spTgt>
-                                        </p:tgtEl>
-                                      </p:cBhvr>
-                                    </p:animEffect>
-                                  </p:childTnLst>
-                                </p:cTn>
-                              </p:par>
-                            </p:childTnLst>
-                          </p:cTn>
-                        </p:par>
-                      </p:childTnLst>
-                    </p:cTn>
-                  </p:par>
-                  <p:par>
-                    <p:cTn id="18" fill="hold">
-                      <p:stCondLst>
-                        <p:cond delay="indefinite"/>
-                      </p:stCondLst>
-                      <p:childTnLst>
-                        <p:par>
-                          <p:cTn id="19" fill="hold">
-                            <p:stCondLst>
-                              <p:cond delay="0"/>
-                            </p:stCondLst>
-                            <p:childTnLst>
-                              <p:par>
-                                <p:cTn id="20" presetID="10" presetClass="entr" presetSubtype="0" fill="hold" nodeType="clickEffect">
-                                  <p:stCondLst>
-                                    <p:cond delay="0"/>
-                                  </p:stCondLst>
-                                  <p:childTnLst>
-                                    <p:set>
-                                      <p:cBhvr>
-                                        <p:cTn id="21" dur="1" fill="hold">
-                                          <p:stCondLst>
-                                            <p:cond delay="0"/>
-                                          </p:stCondLst>
-                                        </p:cTn>
-                                        <p:tgtEl>
-                                          <p:spTgt spid="131">
-                                            <p:txEl>
-                                              <p:pRg st="3" end="3"/>
-                                            </p:txEl>
-                                          </p:spTgt>
-                                        </p:tgtEl>
-                                        <p:attrNameLst>
-                                          <p:attrName>style.visibility</p:attrName>
-                                        </p:attrNameLst>
-                                      </p:cBhvr>
-                                      <p:to>
-                                        <p:strVal val="visible"/>
-                                      </p:to>
-                                    </p:set>
-                                    <p:animEffect transition="in" filter="fade">
-                                      <p:cBhvr>
-                                        <p:cTn id="22" dur="500"/>
-                                        <p:tgtEl>
-                                          <p:spTgt spid="131">
-                                            <p:txEl>
-                                              <p:pRg st="3" end="3"/>
-                                            </p:txEl>
-                                          </p:spTgt>
-                                        </p:tgtEl>
-                                      </p:cBhvr>
-                                    </p:animEffect>
-                                  </p:childTnLst>
-                                </p:cTn>
-                              </p:par>
-                            </p:childTnLst>
-                          </p:cTn>
-                        </p:par>
-                      </p:childTnLst>
-                    </p:cTn>
-                  </p:par>
-                  <p:par>
-                    <p:cTn id="23" fill="hold">
-                      <p:stCondLst>
-                        <p:cond delay="indefinite"/>
-                      </p:stCondLst>
-                      <p:childTnLst>
-                        <p:par>
-                          <p:cTn id="24" fill="hold">
-                            <p:stCondLst>
-                              <p:cond delay="0"/>
-                            </p:stCondLst>
-                            <p:childTnLst>
-                              <p:par>
-                                <p:cTn id="25" presetID="10" presetClass="entr" presetSubtype="0" fill="hold" nodeType="clickEffect">
-                                  <p:stCondLst>
-                                    <p:cond delay="0"/>
-                                  </p:stCondLst>
-                                  <p:childTnLst>
-                                    <p:set>
-                                      <p:cBhvr>
-                                        <p:cTn id="26" dur="1" fill="hold">
-                                          <p:stCondLst>
-                                            <p:cond delay="0"/>
-                                          </p:stCondLst>
-                                        </p:cTn>
-                                        <p:tgtEl>
-                                          <p:spTgt spid="131">
-                                            <p:txEl>
-                                              <p:pRg st="4" end="4"/>
-                                            </p:txEl>
-                                          </p:spTgt>
-                                        </p:tgtEl>
-                                        <p:attrNameLst>
-                                          <p:attrName>style.visibility</p:attrName>
-                                        </p:attrNameLst>
-                                      </p:cBhvr>
-                                      <p:to>
-                                        <p:strVal val="visible"/>
-                                      </p:to>
-                                    </p:set>
-                                    <p:animEffect transition="in" filter="fade">
-                                      <p:cBhvr>
-                                        <p:cTn id="27" dur="500"/>
-                                        <p:tgtEl>
-                                          <p:spTgt spid="131">
-                                            <p:txEl>
-                                              <p:pRg st="4" end="4"/>
-                                            </p:txEl>
-                                          </p:spTgt>
-                                        </p:tgtEl>
-                                      </p:cBhvr>
-                                    </p:animEffect>
-                                  </p:childTnLst>
-                                </p:cTn>
-                              </p:par>
-                            </p:childTnLst>
-                          </p:cTn>
-                        </p:par>
-                      </p:childTnLst>
-                    </p:cTn>
-                  </p:par>
-                  <p:par>
-                    <p:cTn id="28" fill="hold">
-                      <p:stCondLst>
-                        <p:cond delay="indefinite"/>
-                      </p:stCondLst>
-                      <p:childTnLst>
-                        <p:par>
-                          <p:cTn id="29" fill="hold">
-                            <p:stCondLst>
-                              <p:cond delay="0"/>
-                            </p:stCondLst>
-                            <p:childTnLst>
-                              <p:par>
-                                <p:cTn id="30" presetID="10" presetClass="entr" presetSubtype="0" fill="hold" nodeType="clickEffect">
-                                  <p:stCondLst>
-                                    <p:cond delay="0"/>
-                                  </p:stCondLst>
-                                  <p:childTnLst>
-                                    <p:set>
-                                      <p:cBhvr>
-                                        <p:cTn id="31" dur="1" fill="hold">
-                                          <p:stCondLst>
-                                            <p:cond delay="0"/>
-                                          </p:stCondLst>
-                                        </p:cTn>
-                                        <p:tgtEl>
-                                          <p:spTgt spid="131">
-                                            <p:txEl>
-                                              <p:pRg st="5" end="5"/>
-                                            </p:txEl>
-                                          </p:spTgt>
-                                        </p:tgtEl>
-                                        <p:attrNameLst>
-                                          <p:attrName>style.visibility</p:attrName>
-                                        </p:attrNameLst>
-                                      </p:cBhvr>
-                                      <p:to>
-                                        <p:strVal val="visible"/>
-                                      </p:to>
-                                    </p:set>
-                                    <p:animEffect transition="in" filter="fade">
-                                      <p:cBhvr>
-                                        <p:cTn id="32" dur="500"/>
-                                        <p:tgtEl>
-                                          <p:spTgt spid="131">
-                                            <p:txEl>
-                                              <p:pRg st="5" end="5"/>
-                                            </p:txEl>
-                                          </p:spTgt>
-                                        </p:tgtEl>
-                                      </p:cBhvr>
-                                    </p:animEffect>
-                                  </p:childTnLst>
-                                </p:cTn>
-                              </p:par>
-                            </p:childTnLst>
-                          </p:cTn>
-                        </p:par>
-                      </p:childTnLst>
-                    </p:cTn>
-                  </p:par>
-                  <p:par>
-                    <p:cTn id="33" fill="hold">
-                      <p:stCondLst>
-                        <p:cond delay="indefinite"/>
-                      </p:stCondLst>
-                      <p:childTnLst>
-                        <p:par>
-                          <p:cTn id="34" fill="hold">
-                            <p:stCondLst>
-                              <p:cond delay="0"/>
-                            </p:stCondLst>
-                            <p:childTnLst>
-                              <p:par>
-                                <p:cTn id="35" presetID="1" presetClass="entr" presetSubtype="0" fill="hold" nodeType="clickEffect">
-                                  <p:stCondLst>
-                                    <p:cond delay="0"/>
-                                  </p:stCondLst>
-                                  <p:childTnLst>
-                                    <p:set>
-                                      <p:cBhvr>
-                                        <p:cTn id="36" dur="1" fill="hold">
-                                          <p:stCondLst>
-                                            <p:cond delay="0"/>
-                                          </p:stCondLst>
-                                        </p:cTn>
-                                        <p:tgtEl>
-                                          <p:spTgt spid="132"/>
-                                        </p:tgtEl>
-                                        <p:attrNameLst>
-                                          <p:attrName>style.visibility</p:attrName>
-                                        </p:attrNameLst>
-                                      </p:cBhvr>
-                                      <p:to>
-                                        <p:strVal val="visible"/>
-                                      </p:to>
-                                    </p:set>
-                                  </p:childTnLst>
-                                </p:cTn>
-                              </p:par>
-                            </p:childTnLst>
-                          </p:cTn>
-                        </p:par>
-                      </p:childTnLst>
-                    </p:cTn>
-                  </p:par>
-                  <p:par>
-                    <p:cTn id="37" fill="hold">
-                      <p:stCondLst>
-                        <p:cond delay="indefinite"/>
-                      </p:stCondLst>
-                      <p:childTnLst>
-                        <p:par>
-                          <p:cTn id="38" fill="hold">
-                            <p:stCondLst>
-                              <p:cond delay="0"/>
-                            </p:stCondLst>
-                            <p:childTnLst>
-                              <p:par>
-                                <p:cTn id="39" presetID="1" presetClass="entr" presetSubtype="0" fill="hold" nodeType="clickEffect">
-                                  <p:stCondLst>
-                                    <p:cond delay="0"/>
-                                  </p:stCondLst>
-                                  <p:childTnLst>
-                                    <p:set>
-                                      <p:cBhvr>
-                                        <p:cTn id="40" dur="1" fill="hold">
-                                          <p:stCondLst>
-                                            <p:cond delay="0"/>
-                                          </p:stCondLst>
-                                        </p:cTn>
-                                        <p:tgtEl>
-                                          <p:spTgt spid="133"/>
-                                        </p:tgtEl>
-                                        <p:attrNameLst>
-                                          <p:attrName>style.visibility</p:attrName>
-                                        </p:attrNameLst>
-                                      </p:cBhvr>
-                                      <p:to>
-                                        <p:strVal val="visible"/>
-                                      </p:to>
-                                    </p:set>
-                                  </p:childTnLst>
-                                </p:cTn>
-                              </p:par>
-                            </p:childTnLst>
-                          </p:cTn>
-                        </p:par>
-                      </p:childTnLst>
-                    </p:cTn>
-                  </p:par>
-                </p:childTnLst>
-              </p:cTn>
-              <p:prevCondLst>
-                <p:cond evt="onPrev" delay="0">
-                  <p:tgtEl>
-                    <p:sldTgt/>
-                  </p:tgtEl>
-                </p:cond>
-              </p:prevCondLst>
-              <p:nextCondLst>
-                <p:cond evt="onNext" delay="0">
-                  <p:tgtEl>
-                    <p:sldTgt/>
-                  </p:tgtEl>
-                </p:cond>
-              </p:nextCondLst>
-            </p:seq>
-          </p:childTnLst>
-        </p:cTn>
-      </p:par>
-    </p:tnLst>
-  </p:timing>
-</p:sld>
-</file>
-
-<file path=ppt/slides/slide9.xml><?xml version="1.0" encoding="utf-8"?>
-<p:sld xmlns:a="http://schemas.openxmlformats.org/drawingml/2006/main" xmlns:r="http://schemas.openxmlformats.org/officeDocument/2006/relationships" xmlns:p="http://schemas.openxmlformats.org/presentationml/2006/main">
-  <p:cSld>
-    <p:spTree>
-      <p:nvGrpSpPr>
-        <p:cNvPr id="1" name="Shape 126"/>
-        <p:cNvGrpSpPr/>
-        <p:nvPr/>
-      </p:nvGrpSpPr>
-      <p:grpSpPr>
-        <a:xfrm>
-          <a:off x="0" y="0"/>
-          <a:ext cx="0" cy="0"/>
-          <a:chOff x="0" y="0"/>
-          <a:chExt cx="0" cy="0"/>
-        </a:xfrm>
-      </p:grpSpPr>
-      <p:sp>
-        <p:nvSpPr>
-          <p:cNvPr id="127" name="Google Shape;127;gc6d6ded6e2_0_0"/>
-          <p:cNvSpPr/>
-          <p:nvPr/>
-        </p:nvSpPr>
-        <p:spPr>
-          <a:xfrm>
-            <a:off x="0" y="0"/>
-            <a:ext cx="12192000" cy="1747800"/>
-          </a:xfrm>
-          <a:prstGeom prst="rect">
-            <a:avLst/>
-          </a:prstGeom>
-          <a:noFill/>
-          <a:ln>
-            <a:noFill/>
-          </a:ln>
-        </p:spPr>
-        <p:txBody>
-          <a:bodyPr spcFirstLastPara="1" wrap="square" lIns="91425" tIns="45700" rIns="91425" bIns="45700" anchor="ctr" anchorCtr="0">
-            <a:noAutofit/>
-          </a:bodyPr>
-          <a:lstStyle/>
-          <a:p>
-            <a:pPr marL="0" marR="0" lvl="0" indent="0" algn="ctr" rtl="0">
-              <a:lnSpc>
-                <a:spcPct val="100000"/>
-              </a:lnSpc>
-              <a:spcBef>
-                <a:spcPts val="0"/>
-              </a:spcBef>
-              <a:spcAft>
-                <a:spcPts val="0"/>
-              </a:spcAft>
-              <a:buClr>
-                <a:srgbClr val="000000"/>
-              </a:buClr>
-              <a:buSzPts val="1800"/>
-              <a:buFont typeface="Arial"/>
-              <a:buNone/>
-            </a:pPr>
-            <a:endParaRPr sz="1800" b="0" i="0" u="none" strike="noStrike" cap="none">
-              <a:solidFill>
-                <a:schemeClr val="lt1"/>
-              </a:solidFill>
-              <a:latin typeface="Arial"/>
-              <a:ea typeface="Arial"/>
-              <a:cs typeface="Arial"/>
-              <a:sym typeface="Arial"/>
-            </a:endParaRPr>
-          </a:p>
-        </p:txBody>
-      </p:sp>
-      <p:sp>
-        <p:nvSpPr>
-          <p:cNvPr id="128" name="Google Shape;128;gc6d6ded6e2_0_0"/>
-          <p:cNvSpPr txBox="1">
-            <a:spLocks noGrp="1"/>
-          </p:cNvSpPr>
-          <p:nvPr>
-            <p:ph type="sldNum" idx="12"/>
-          </p:nvPr>
-        </p:nvSpPr>
-        <p:spPr>
-          <a:xfrm>
-            <a:off x="8737600" y="6356351"/>
-            <a:ext cx="2844900" cy="365100"/>
-          </a:xfrm>
-          <a:prstGeom prst="rect">
-            <a:avLst/>
-          </a:prstGeom>
-          <a:noFill/>
-          <a:ln>
-            <a:noFill/>
-          </a:ln>
-        </p:spPr>
-        <p:txBody>
-          <a:bodyPr spcFirstLastPara="1" wrap="square" lIns="91425" tIns="45700" rIns="91425" bIns="45700" anchor="ctr" anchorCtr="0">
-            <a:noAutofit/>
-          </a:bodyPr>
-          <a:lstStyle/>
-          <a:p>
-            <a:pPr marL="0" lvl="0" indent="0" algn="r" rtl="0">
-              <a:lnSpc>
-                <a:spcPct val="100000"/>
-              </a:lnSpc>
-              <a:spcBef>
-                <a:spcPts val="0"/>
-              </a:spcBef>
-              <a:spcAft>
-                <a:spcPts val="0"/>
-              </a:spcAft>
-              <a:buClr>
-                <a:srgbClr val="000000"/>
-              </a:buClr>
-              <a:buSzPts val="1200"/>
-              <a:buFont typeface="Arial"/>
-              <a:buNone/>
-            </a:pPr>
-            <a:fld id="{00000000-1234-1234-1234-123412341234}" type="slidenum">
-              <a:rPr lang="pt-BR"/>
-              <a:t>9</a:t>
-            </a:fld>
-            <a:endParaRPr/>
-          </a:p>
-        </p:txBody>
-      </p:sp>
-      <p:sp>
-        <p:nvSpPr>
-          <p:cNvPr id="129" name="Google Shape;129;gc6d6ded6e2_0_0"/>
-          <p:cNvSpPr/>
-          <p:nvPr/>
-        </p:nvSpPr>
-        <p:spPr>
-          <a:xfrm>
-            <a:off x="316395" y="220248"/>
-            <a:ext cx="9007488" cy="584700"/>
-          </a:xfrm>
-          <a:prstGeom prst="rect">
-            <a:avLst/>
-          </a:prstGeom>
-          <a:noFill/>
-          <a:ln>
-            <a:noFill/>
-          </a:ln>
-        </p:spPr>
-        <p:txBody>
-          <a:bodyPr spcFirstLastPara="1" wrap="square" lIns="91425" tIns="45700" rIns="91425" bIns="45700" anchor="t" anchorCtr="0">
-            <a:noAutofit/>
-          </a:bodyPr>
-          <a:lstStyle/>
-          <a:p>
-            <a:pPr marL="0" marR="0" lvl="0" indent="0" algn="l" rtl="0">
-              <a:lnSpc>
-                <a:spcPct val="100000"/>
-              </a:lnSpc>
-              <a:spcBef>
-                <a:spcPts val="0"/>
-              </a:spcBef>
-              <a:spcAft>
-                <a:spcPts val="0"/>
-              </a:spcAft>
-              <a:buClr>
-                <a:srgbClr val="000000"/>
-              </a:buClr>
-              <a:buSzPts val="3200"/>
-              <a:buFont typeface="Arial"/>
-              <a:buNone/>
-            </a:pPr>
-            <a:r>
-              <a:rPr lang="pt-BR" sz="3200" b="1" i="0" u="none" strike="noStrike" cap="none" dirty="0">
-                <a:solidFill>
-                  <a:srgbClr val="FF0000"/>
-                </a:solidFill>
-                <a:latin typeface="Century Schoolbook"/>
-                <a:ea typeface="Century Schoolbook"/>
-                <a:cs typeface="Century Schoolbook"/>
-                <a:sym typeface="Century Schoolbook"/>
-              </a:rPr>
-              <a:t>Atividade: </a:t>
-            </a:r>
-            <a:r>
-              <a:rPr lang="pt-BR" sz="2800" b="1" i="0" u="none" strike="noStrike" cap="none" dirty="0">
-                <a:solidFill>
-                  <a:srgbClr val="FF0000"/>
-                </a:solidFill>
-                <a:latin typeface="Century Schoolbook"/>
-                <a:ea typeface="Century Schoolbook"/>
-                <a:cs typeface="Century Schoolbook"/>
-                <a:sym typeface="Century Schoolbook"/>
-              </a:rPr>
-              <a:t>Modelo Lógico DER</a:t>
-            </a:r>
-            <a:r>
-              <a:rPr lang="pt-BR" sz="2800" b="1" dirty="0">
-                <a:solidFill>
-                  <a:srgbClr val="FF0000"/>
-                </a:solidFill>
-                <a:latin typeface="Century Schoolbook"/>
-                <a:ea typeface="Century Schoolbook"/>
-                <a:cs typeface="Century Schoolbook"/>
-                <a:sym typeface="Century Schoolbook"/>
-              </a:rPr>
-              <a:t> Cardinalidade</a:t>
-            </a:r>
-          </a:p>
-          <a:p>
-            <a:pPr marL="0" marR="0" lvl="0" indent="0" algn="l" rtl="0">
-              <a:lnSpc>
-                <a:spcPct val="100000"/>
-              </a:lnSpc>
-              <a:spcBef>
-                <a:spcPts val="0"/>
-              </a:spcBef>
-              <a:spcAft>
-                <a:spcPts val="0"/>
-              </a:spcAft>
-              <a:buClr>
-                <a:srgbClr val="000000"/>
-              </a:buClr>
-              <a:buSzPts val="3200"/>
-              <a:buFont typeface="Arial"/>
-              <a:buNone/>
-            </a:pPr>
-            <a:endParaRPr lang="pt-BR" sz="1400" b="0" i="0" u="none" strike="noStrike" cap="none" dirty="0">
-              <a:solidFill>
-                <a:srgbClr val="000000"/>
-              </a:solidFill>
-              <a:latin typeface="Arial"/>
-              <a:ea typeface="Arial"/>
-              <a:cs typeface="Arial"/>
-              <a:sym typeface="Arial"/>
-            </a:endParaRPr>
-          </a:p>
-        </p:txBody>
-      </p:sp>
-      <p:pic>
-        <p:nvPicPr>
-          <p:cNvPr id="130" name="Google Shape;130;gc6d6ded6e2_0_0"/>
-          <p:cNvPicPr preferRelativeResize="0"/>
-          <p:nvPr/>
-        </p:nvPicPr>
-        <p:blipFill rotWithShape="1">
-          <a:blip r:embed="rId3">
-            <a:alphaModFix/>
-          </a:blip>
-          <a:srcRect/>
-          <a:stretch/>
-        </p:blipFill>
-        <p:spPr>
-          <a:xfrm>
-            <a:off x="9206151" y="0"/>
-            <a:ext cx="2380082" cy="1371599"/>
-          </a:xfrm>
-          <a:prstGeom prst="rect">
-            <a:avLst/>
-          </a:prstGeom>
-          <a:noFill/>
-          <a:ln>
-            <a:noFill/>
-          </a:ln>
-        </p:spPr>
-      </p:pic>
-      <p:sp>
-        <p:nvSpPr>
-          <p:cNvPr id="131" name="Google Shape;131;gc6d6ded6e2_0_0"/>
-          <p:cNvSpPr/>
-          <p:nvPr/>
-        </p:nvSpPr>
-        <p:spPr>
-          <a:xfrm>
-            <a:off x="452885" y="1704298"/>
-            <a:ext cx="11089200" cy="3525600"/>
-          </a:xfrm>
-          <a:prstGeom prst="rect">
-            <a:avLst/>
-          </a:prstGeom>
-          <a:noFill/>
-          <a:ln>
-            <a:noFill/>
-          </a:ln>
-        </p:spPr>
-        <p:txBody>
-          <a:bodyPr spcFirstLastPara="1" wrap="square" lIns="91425" tIns="45700" rIns="91425" bIns="45700" anchor="t" anchorCtr="0">
-            <a:noAutofit/>
-          </a:bodyPr>
-          <a:lstStyle/>
-          <a:p>
-            <a:pPr marL="285750" marR="0" lvl="0" indent="-285750" algn="just" rtl="0">
-              <a:lnSpc>
-                <a:spcPct val="150000"/>
-              </a:lnSpc>
-              <a:spcBef>
-                <a:spcPts val="0"/>
-              </a:spcBef>
-              <a:spcAft>
-                <a:spcPts val="0"/>
-              </a:spcAft>
-              <a:buClr>
-                <a:srgbClr val="000000"/>
-              </a:buClr>
-              <a:buSzPts val="1800"/>
-              <a:buFontTx/>
-              <a:buChar char="-"/>
-            </a:pPr>
-            <a:r>
-              <a:rPr lang="pt-BR" sz="1800" b="0" i="0" u="none" strike="noStrike" cap="none" dirty="0">
-                <a:solidFill>
-                  <a:schemeClr val="dk1"/>
-                </a:solidFill>
-                <a:latin typeface="Arial"/>
-                <a:ea typeface="Arial"/>
-                <a:cs typeface="Arial"/>
-                <a:sym typeface="Arial"/>
-              </a:rPr>
-              <a:t>Insira</a:t>
-            </a:r>
-            <a:r>
-              <a:rPr lang="pt-BR" sz="1800" dirty="0">
-                <a:solidFill>
-                  <a:schemeClr val="dk1"/>
-                </a:solidFill>
-              </a:rPr>
-              <a:t>, </a:t>
-            </a:r>
-            <a:r>
-              <a:rPr lang="pt-BR" sz="1800" b="0" i="0" u="none" strike="noStrike" cap="none" dirty="0">
-                <a:solidFill>
-                  <a:schemeClr val="dk1"/>
-                </a:solidFill>
-                <a:latin typeface="Arial"/>
-                <a:ea typeface="Arial"/>
-                <a:cs typeface="Arial"/>
-                <a:sym typeface="Arial"/>
-              </a:rPr>
-              <a:t>no modelo ER elaborado, a cardinalidade (</a:t>
-            </a:r>
-            <a:r>
-              <a:rPr lang="pt-BR" sz="1800" b="1" i="0" u="none" strike="noStrike" cap="none" dirty="0">
-                <a:solidFill>
-                  <a:schemeClr val="dk1"/>
-                </a:solidFill>
-                <a:latin typeface="Arial"/>
-                <a:ea typeface="Arial"/>
-                <a:cs typeface="Arial"/>
-                <a:sym typeface="Arial"/>
-              </a:rPr>
-              <a:t>Máxima e Mínima</a:t>
-            </a:r>
-            <a:r>
-              <a:rPr lang="pt-BR" sz="1800" b="0" i="0" u="none" strike="noStrike" cap="none" dirty="0">
-                <a:solidFill>
-                  <a:schemeClr val="dk1"/>
-                </a:solidFill>
-                <a:latin typeface="Arial"/>
-                <a:ea typeface="Arial"/>
-                <a:cs typeface="Arial"/>
-                <a:sym typeface="Arial"/>
-              </a:rPr>
-              <a:t>) das entidades presentes.</a:t>
-            </a:r>
-          </a:p>
-          <a:p>
-            <a:pPr marR="0" lvl="0" algn="just" rtl="0">
-              <a:lnSpc>
-                <a:spcPct val="150000"/>
-              </a:lnSpc>
-              <a:spcBef>
-                <a:spcPts val="0"/>
-              </a:spcBef>
-              <a:spcAft>
-                <a:spcPts val="0"/>
-              </a:spcAft>
-              <a:buClr>
-                <a:srgbClr val="000000"/>
-              </a:buClr>
-              <a:buSzPts val="1800"/>
-            </a:pPr>
-            <a:endParaRPr lang="pt-BR" sz="1800" dirty="0">
-              <a:solidFill>
-                <a:schemeClr val="dk1"/>
-              </a:solidFill>
-            </a:endParaRPr>
-          </a:p>
-          <a:p>
-            <a:pPr marR="0" lvl="0" algn="just" rtl="0">
-              <a:lnSpc>
-                <a:spcPct val="150000"/>
-              </a:lnSpc>
-              <a:spcBef>
-                <a:spcPts val="0"/>
-              </a:spcBef>
-              <a:spcAft>
-                <a:spcPts val="0"/>
-              </a:spcAft>
-              <a:buClr>
-                <a:srgbClr val="000000"/>
-              </a:buClr>
-              <a:buSzPts val="1800"/>
-            </a:pPr>
-            <a:r>
-              <a:rPr lang="pt-BR" sz="1800" dirty="0">
-                <a:solidFill>
-                  <a:schemeClr val="dk1"/>
-                </a:solidFill>
-              </a:rPr>
-              <a:t>	-- </a:t>
-            </a:r>
-            <a:r>
-              <a:rPr lang="pt-BR" sz="1800" b="1" dirty="0">
-                <a:solidFill>
-                  <a:schemeClr val="dk1"/>
-                </a:solidFill>
-              </a:rPr>
-              <a:t>Vídeo Aula Complementar</a:t>
-            </a:r>
-          </a:p>
-          <a:p>
-            <a:pPr lvl="0" algn="just">
-              <a:lnSpc>
-                <a:spcPct val="150000"/>
-              </a:lnSpc>
-              <a:buSzPts val="1800"/>
-            </a:pPr>
-            <a:r>
-              <a:rPr lang="pt-BR" sz="1800" dirty="0">
-                <a:solidFill>
-                  <a:schemeClr val="dk1"/>
-                </a:solidFill>
-              </a:rPr>
-              <a:t>	https://repositorio.imd.ufrn.br/videos/banco-de-dados/02-04-cardinalidade.mp4</a:t>
-            </a:r>
-          </a:p>
-          <a:p>
-            <a:pPr marR="0" lvl="0" algn="just" rtl="0">
-              <a:lnSpc>
-                <a:spcPct val="150000"/>
-              </a:lnSpc>
-              <a:spcBef>
-                <a:spcPts val="0"/>
-              </a:spcBef>
-              <a:spcAft>
-                <a:spcPts val="0"/>
-              </a:spcAft>
-              <a:buClr>
-                <a:srgbClr val="000000"/>
-              </a:buClr>
-              <a:buSzPts val="1800"/>
-            </a:pPr>
-            <a:endParaRPr lang="pt-BR" sz="1800" dirty="0">
-              <a:solidFill>
-                <a:schemeClr val="dk1"/>
-              </a:solidFill>
-            </a:endParaRPr>
-          </a:p>
-          <a:p>
-            <a:pPr algn="just">
-              <a:lnSpc>
-                <a:spcPct val="150000"/>
-              </a:lnSpc>
-              <a:buSzPts val="1800"/>
-            </a:pPr>
-            <a:r>
-              <a:rPr lang="pt-BR" dirty="0">
-                <a:solidFill>
-                  <a:schemeClr val="dk1"/>
-                </a:solidFill>
-              </a:rPr>
-              <a:t>	</a:t>
-            </a:r>
-            <a:r>
-              <a:rPr lang="pt-BR" dirty="0">
-                <a:solidFill>
-                  <a:schemeClr val="dk1"/>
-                </a:solidFill>
-                <a:hlinkClick r:id="rId4"/>
-              </a:rPr>
-              <a:t>http://www.uel.br/pessoal/valerio/Lista%20de%20exercicios%20Resolvido%2001%20-%20MC%20-%206%20folhas.pdf</a:t>
-            </a:r>
-            <a:r>
-              <a:rPr lang="pt-BR" dirty="0">
-                <a:solidFill>
-                  <a:schemeClr val="dk1"/>
-                </a:solidFill>
-              </a:rPr>
-              <a:t> </a:t>
-            </a:r>
-            <a:endParaRPr lang="pt-BR" sz="1100" dirty="0">
-              <a:solidFill>
-                <a:schemeClr val="dk1"/>
-              </a:solidFill>
-            </a:endParaRPr>
-          </a:p>
-          <a:p>
-            <a:pPr marL="285750" marR="0" lvl="0" indent="-285750" algn="just" rtl="0">
-              <a:lnSpc>
-                <a:spcPct val="150000"/>
-              </a:lnSpc>
-              <a:spcBef>
-                <a:spcPts val="0"/>
-              </a:spcBef>
-              <a:spcAft>
-                <a:spcPts val="0"/>
-              </a:spcAft>
-              <a:buClr>
-                <a:srgbClr val="000000"/>
-              </a:buClr>
-              <a:buSzPts val="1800"/>
-              <a:buFontTx/>
-              <a:buChar char="-"/>
-            </a:pPr>
-            <a:endParaRPr sz="1400" b="0" i="0" u="none" strike="noStrike" cap="none" dirty="0">
-              <a:solidFill>
-                <a:schemeClr val="dk1"/>
-              </a:solidFill>
-              <a:latin typeface="Arial"/>
-              <a:ea typeface="Arial"/>
-              <a:cs typeface="Arial"/>
-              <a:sym typeface="Arial"/>
-            </a:endParaRPr>
-          </a:p>
-          <a:p>
-            <a:pPr marL="0" marR="0" lvl="0" indent="0" algn="just" rtl="0">
-              <a:lnSpc>
-                <a:spcPct val="100000"/>
-              </a:lnSpc>
-              <a:spcBef>
-                <a:spcPts val="0"/>
-              </a:spcBef>
-              <a:spcAft>
-                <a:spcPts val="0"/>
-              </a:spcAft>
-              <a:buClr>
-                <a:srgbClr val="000000"/>
-              </a:buClr>
-              <a:buSzPts val="1800"/>
-              <a:buFont typeface="Arial"/>
-              <a:buNone/>
-            </a:pPr>
-            <a:endParaRPr sz="1800" b="0" i="0" u="none" strike="noStrike" cap="none" dirty="0">
-              <a:solidFill>
-                <a:schemeClr val="dk1"/>
-              </a:solidFill>
-              <a:latin typeface="Arial"/>
-              <a:ea typeface="Arial"/>
-              <a:cs typeface="Arial"/>
-              <a:sym typeface="Arial"/>
-            </a:endParaRPr>
-          </a:p>
-          <a:p>
-            <a:pPr marL="0" marR="0" lvl="0" indent="0" algn="just" rtl="0">
-              <a:lnSpc>
-                <a:spcPct val="100000"/>
-              </a:lnSpc>
-              <a:spcBef>
-                <a:spcPts val="0"/>
-              </a:spcBef>
-              <a:spcAft>
-                <a:spcPts val="0"/>
-              </a:spcAft>
-              <a:buClr>
-                <a:srgbClr val="000000"/>
-              </a:buClr>
-              <a:buSzPts val="1800"/>
-              <a:buFont typeface="Arial"/>
-              <a:buNone/>
-            </a:pPr>
-            <a:endParaRPr sz="1800" b="1" i="0" u="none" strike="noStrike" cap="none" dirty="0">
-              <a:solidFill>
-                <a:schemeClr val="dk1"/>
-              </a:solidFill>
-              <a:latin typeface="Arial"/>
-              <a:ea typeface="Arial"/>
-              <a:cs typeface="Arial"/>
-              <a:sym typeface="Arial"/>
-            </a:endParaRPr>
-          </a:p>
-          <a:p>
-            <a:pPr marL="0" marR="0" lvl="0" indent="0" algn="just" rtl="0">
-              <a:lnSpc>
-                <a:spcPct val="100000"/>
-              </a:lnSpc>
-              <a:spcBef>
-                <a:spcPts val="0"/>
-              </a:spcBef>
-              <a:spcAft>
-                <a:spcPts val="0"/>
-              </a:spcAft>
-              <a:buClr>
-                <a:srgbClr val="000000"/>
-              </a:buClr>
-              <a:buSzPts val="1800"/>
-              <a:buFont typeface="Arial"/>
-              <a:buNone/>
-            </a:pPr>
-            <a:endParaRPr sz="1800" b="0" i="0" u="none" strike="noStrike" cap="none" dirty="0">
-              <a:solidFill>
-                <a:schemeClr val="dk1"/>
-              </a:solidFill>
-              <a:latin typeface="Arial"/>
-              <a:ea typeface="Arial"/>
-              <a:cs typeface="Arial"/>
-              <a:sym typeface="Arial"/>
-            </a:endParaRPr>
-          </a:p>
-          <a:p>
-            <a:pPr marL="0" marR="0" lvl="0" indent="0" algn="just" rtl="0">
-              <a:lnSpc>
-                <a:spcPct val="150000"/>
-              </a:lnSpc>
-              <a:spcBef>
-                <a:spcPts val="0"/>
-              </a:spcBef>
-              <a:spcAft>
-                <a:spcPts val="0"/>
-              </a:spcAft>
-              <a:buClr>
-                <a:srgbClr val="000000"/>
-              </a:buClr>
-              <a:buSzPts val="1800"/>
-              <a:buFont typeface="Arial"/>
-              <a:buNone/>
-            </a:pPr>
-            <a:endParaRPr sz="1800" b="0" i="0" u="none" strike="noStrike" cap="none" dirty="0">
-              <a:solidFill>
-                <a:schemeClr val="dk1"/>
               </a:solidFill>
               <a:latin typeface="Arial"/>
               <a:ea typeface="Arial"/>
@@ -28457,7 +29189,7 @@
                             </p:stCondLst>
                             <p:childTnLst>
                               <p:par>
-                                <p:cTn id="20" presetID="10" presetClass="entr" presetSubtype="0" fill="hold" nodeType="clickEffect">
+                                <p:cTn id="20" presetID="1" presetClass="entr" presetSubtype="0" fill="hold" nodeType="clickEffect">
                                   <p:stCondLst>
                                     <p:cond delay="0"/>
                                   </p:stCondLst>
@@ -28470,11 +29202,7 @@
                                           </p:stCondLst>
                                         </p:cTn>
                                         <p:tgtEl>
-                                          <p:spTgt spid="131">
-                                            <p:txEl>
-                                              <p:pRg st="5" end="5"/>
-                                            </p:txEl>
-                                          </p:spTgt>
+                                          <p:spTgt spid="132"/>
                                         </p:tgtEl>
                                         <p:attrNameLst>
                                           <p:attrName>style.visibility</p:attrName>
@@ -28484,18 +29212,51 @@
                                         <p:strVal val="visible"/>
                                       </p:to>
                                     </p:set>
-                                    <p:animEffect transition="in" filter="fade">
+                                  </p:childTnLst>
+                                </p:cTn>
+                              </p:par>
+                            </p:childTnLst>
+                          </p:cTn>
+                        </p:par>
+                      </p:childTnLst>
+                    </p:cTn>
+                  </p:par>
+                  <p:par>
+                    <p:cTn id="22" fill="hold">
+                      <p:stCondLst>
+                        <p:cond delay="indefinite"/>
+                      </p:stCondLst>
+                      <p:childTnLst>
+                        <p:par>
+                          <p:cTn id="23" fill="hold">
+                            <p:stCondLst>
+                              <p:cond delay="0"/>
+                            </p:stCondLst>
+                            <p:childTnLst>
+                              <p:par>
+                                <p:cTn id="24" presetID="1" presetClass="entr" presetSubtype="0" fill="hold" nodeType="clickEffect">
+                                  <p:stCondLst>
+                                    <p:cond delay="0"/>
+                                  </p:stCondLst>
+                                  <p:childTnLst>
+                                    <p:set>
                                       <p:cBhvr>
-                                        <p:cTn id="22" dur="500"/>
+                                        <p:cTn id="25" dur="1" fill="hold">
+                                          <p:stCondLst>
+                                            <p:cond delay="0"/>
+                                          </p:stCondLst>
+                                        </p:cTn>
                                         <p:tgtEl>
-                                          <p:spTgt spid="131">
-                                            <p:txEl>
-                                              <p:pRg st="5" end="5"/>
-                                            </p:txEl>
-                                          </p:spTgt>
+                                          <p:spTgt spid="133"/>
                                         </p:tgtEl>
+                                        <p:attrNameLst>
+                                          <p:attrName>style.visibility</p:attrName>
+                                        </p:attrNameLst>
                                       </p:cBhvr>
-                                    </p:animEffect>
+                                      <p:to>
+                                        <p:strVal val="visible"/>
+                                      </p:to>
+                                    </p:set>
                                   </p:childTnLst>
                                 </p:cTn>
                               </p:par>

</xml_diff>

<commit_message>
atualização slides de aulass 31Ago2023
</commit_message>
<xml_diff>
--- a/01 Classes/Aula03- BD Dinâmica Modelo de Domínio.pptx
+++ b/01 Classes/Aula03- BD Dinâmica Modelo de Domínio.pptx
@@ -282,7 +282,7 @@
       </p15:sldGuideLst>
     </p:ext>
     <p:ext uri="http://customooxmlschemas.google.com/">
-      <go:slidesCustomData xmlns="" xmlns:mc="http://schemas.openxmlformats.org/markup-compatibility/2006" xmlns:mv="urn:schemas-microsoft-com:mac:vml" xmlns:c="http://schemas.openxmlformats.org/drawingml/2006/chart" xmlns:dgm="http://schemas.openxmlformats.org/drawingml/2006/diagram" xmlns:o="urn:schemas-microsoft-com:office:office" xmlns:v="urn:schemas-microsoft-com:vml" xmlns:pvml="urn:schemas-microsoft-com:office:powerpoint" xmlns:com="http://schemas.openxmlformats.org/drawingml/2006/compatibility" xmlns:p14="http://schemas.microsoft.com/office/powerpoint/2010/main" xmlns:p15="http://schemas.microsoft.com/office/powerpoint/2012/main" xmlns:ahyp="http://schemas.microsoft.com/office/drawing/2018/hyperlinkcolor" xmlns:go="http://customooxmlschemas.google.com/" r:id="rId21" roundtripDataSignature="AMtx7mijM5gPELxtLrcASW3xn+zmCa30EQ=="/>
+      <go:slidesCustomData xmlns:go="http://customooxmlschemas.google.com/" xmlns:ahyp="http://schemas.microsoft.com/office/drawing/2018/hyperlinkcolor" xmlns:p15="http://schemas.microsoft.com/office/powerpoint/2012/main" xmlns:p14="http://schemas.microsoft.com/office/powerpoint/2010/main" xmlns:com="http://schemas.openxmlformats.org/drawingml/2006/compatibility" xmlns:pvml="urn:schemas-microsoft-com:office:powerpoint" xmlns:v="urn:schemas-microsoft-com:vml" xmlns:o="urn:schemas-microsoft-com:office:office" xmlns:dgm="http://schemas.openxmlformats.org/drawingml/2006/diagram" xmlns:c="http://schemas.openxmlformats.org/drawingml/2006/chart" xmlns:mv="urn:schemas-microsoft-com:mac:vml" xmlns:mc="http://schemas.openxmlformats.org/markup-compatibility/2006" xmlns="" r:id="rId21" roundtripDataSignature="AMtx7mijM5gPELxtLrcASW3xn+zmCa30EQ=="/>
     </p:ext>
   </p:extLst>
 </p:presentation>
@@ -25490,7 +25490,7 @@
         </p:blipFill>
         <p:spPr>
           <a:xfrm>
-            <a:off x="2175604" y="2120915"/>
+            <a:off x="1635960" y="2120915"/>
             <a:ext cx="5700663" cy="4600535"/>
           </a:xfrm>
           <a:prstGeom prst="rect">
@@ -25498,6 +25498,146 @@
           </a:prstGeom>
         </p:spPr>
       </p:pic>
+      <p:sp>
+        <p:nvSpPr>
+          <p:cNvPr id="2" name="CaixaDeTexto 1">
+            <a:extLst>
+              <a:ext uri="{FF2B5EF4-FFF2-40B4-BE49-F238E27FC236}">
+                <a16:creationId xmlns:a16="http://schemas.microsoft.com/office/drawing/2014/main" id="{D0CA3420-3E52-9B7A-3628-93EEF06ECD4E}"/>
+              </a:ext>
+            </a:extLst>
+          </p:cNvPr>
+          <p:cNvSpPr txBox="1"/>
+          <p:nvPr/>
+        </p:nvSpPr>
+        <p:spPr>
+          <a:xfrm>
+            <a:off x="7472499" y="2690336"/>
+            <a:ext cx="4564601" cy="4093428"/>
+          </a:xfrm>
+          <a:prstGeom prst="rect">
+            <a:avLst/>
+          </a:prstGeom>
+          <a:noFill/>
+        </p:spPr>
+        <p:txBody>
+          <a:bodyPr wrap="square" rtlCol="0">
+            <a:spAutoFit/>
+          </a:bodyPr>
+          <a:lstStyle/>
+          <a:p>
+            <a:r>
+              <a:rPr lang="pt-BR" sz="2000" dirty="0"/>
+              <a:t>Tabela não normalizada</a:t>
+            </a:r>
+          </a:p>
+          <a:p>
+            <a:pPr marL="342900" indent="-342900">
+              <a:buAutoNum type="arabicPeriod"/>
+            </a:pPr>
+            <a:r>
+              <a:rPr lang="pt-BR" sz="2000" b="1" dirty="0">
+                <a:solidFill>
+                  <a:srgbClr val="FF0000"/>
+                </a:solidFill>
+              </a:rPr>
+              <a:t>1FN</a:t>
+            </a:r>
+            <a:r>
+              <a:rPr lang="pt-BR" sz="2000" dirty="0"/>
+              <a:t> (remover atributos multivalorados e compostos)</a:t>
+            </a:r>
+          </a:p>
+          <a:p>
+            <a:pPr marL="342900" indent="-342900">
+              <a:buAutoNum type="arabicPeriod"/>
+            </a:pPr>
+            <a:r>
+              <a:rPr lang="pt-BR" sz="2000" b="1" dirty="0">
+                <a:solidFill>
+                  <a:srgbClr val="FF0000"/>
+                </a:solidFill>
+              </a:rPr>
+              <a:t>2FN</a:t>
+            </a:r>
+            <a:r>
+              <a:rPr lang="pt-BR" sz="2000" dirty="0"/>
+              <a:t> (Remover dependências parciais</a:t>
+            </a:r>
+          </a:p>
+          <a:p>
+            <a:pPr marL="342900" indent="-342900">
+              <a:buAutoNum type="arabicPeriod"/>
+            </a:pPr>
+            <a:r>
+              <a:rPr lang="pt-BR" sz="2000" b="1" dirty="0">
+                <a:solidFill>
+                  <a:srgbClr val="FF0000"/>
+                </a:solidFill>
+              </a:rPr>
+              <a:t>3FN</a:t>
+            </a:r>
+            <a:r>
+              <a:rPr lang="pt-BR" sz="2000" dirty="0"/>
+              <a:t> (Remover Dependências transitivas)</a:t>
+            </a:r>
+          </a:p>
+          <a:p>
+            <a:pPr marL="342900" indent="-342900">
+              <a:buAutoNum type="arabicPeriod"/>
+            </a:pPr>
+            <a:r>
+              <a:rPr lang="pt-BR" sz="2000" b="1" dirty="0"/>
+              <a:t>4FN </a:t>
+            </a:r>
+            <a:r>
+              <a:rPr lang="pt-BR" sz="2000" dirty="0"/>
+              <a:t>(Remover fatos multivalorados)</a:t>
+            </a:r>
+          </a:p>
+          <a:p>
+            <a:pPr marL="342900" indent="-342900">
+              <a:buAutoNum type="arabicPeriod"/>
+            </a:pPr>
+            <a:r>
+              <a:rPr lang="pt-BR" sz="2000" b="1" dirty="0"/>
+              <a:t>5FN</a:t>
+            </a:r>
+            <a:r>
+              <a:rPr lang="pt-BR" sz="2000" dirty="0"/>
+              <a:t> (Remover FK secundária)</a:t>
+            </a:r>
+          </a:p>
+          <a:p>
+            <a:r>
+              <a:rPr lang="pt-BR" sz="2000" b="1" dirty="0">
+                <a:solidFill>
+                  <a:srgbClr val="FF0000"/>
+                </a:solidFill>
+              </a:rPr>
+              <a:t>Nota</a:t>
+            </a:r>
+            <a:r>
+              <a:rPr lang="pt-BR" sz="2000" dirty="0"/>
+              <a:t>: 4FN e 5FN – FNBC (</a:t>
+            </a:r>
+            <a:r>
+              <a:rPr lang="pt-BR" sz="2000" b="1" dirty="0" err="1"/>
+              <a:t>Boyce-Codd</a:t>
+            </a:r>
+            <a:r>
+              <a:rPr lang="pt-BR" sz="2000" dirty="0"/>
+              <a:t>)</a:t>
+            </a:r>
+          </a:p>
+          <a:p>
+            <a:pPr marL="342900" indent="-342900">
+              <a:buAutoNum type="arabicPeriod"/>
+            </a:pPr>
+            <a:endParaRPr lang="pt-BR" sz="2000" dirty="0"/>
+          </a:p>
+        </p:txBody>
+      </p:sp>
     </p:spTree>
   </p:cSld>
   <p:clrMapOvr>
@@ -29567,7 +29707,21 @@
       </a:bgFillStyleLst>
     </a:fmtScheme>
   </a:themeElements>
-  <a:objectDefaults/>
+  <a:objectDefaults>
+    <a:txDef>
+      <a:spPr>
+        <a:noFill/>
+      </a:spPr>
+      <a:bodyPr wrap="none" rtlCol="0">
+        <a:spAutoFit/>
+      </a:bodyPr>
+      <a:lstStyle>
+        <a:defPPr algn="l">
+          <a:defRPr dirty="0" smtClean="0"/>
+        </a:defPPr>
+      </a:lstStyle>
+    </a:txDef>
+  </a:objectDefaults>
   <a:extraClrSchemeLst/>
 </a:theme>
 </file>

</xml_diff>

<commit_message>
atualização slides de aulass 01Set2023
</commit_message>
<xml_diff>
--- a/01 Classes/Aula03- BD Dinâmica Modelo de Domínio.pptx
+++ b/01 Classes/Aula03- BD Dinâmica Modelo de Domínio.pptx
@@ -5,36 +5,37 @@
     <p:sldMasterId id="2147483648" r:id="rId1"/>
   </p:sldMasterIdLst>
   <p:notesMasterIdLst>
-    <p:notesMasterId r:id="rId12"/>
+    <p:notesMasterId r:id="rId13"/>
   </p:notesMasterIdLst>
   <p:sldIdLst>
     <p:sldId id="256" r:id="rId2"/>
     <p:sldId id="257" r:id="rId3"/>
     <p:sldId id="265" r:id="rId4"/>
-    <p:sldId id="264" r:id="rId5"/>
-    <p:sldId id="258" r:id="rId6"/>
-    <p:sldId id="262" r:id="rId7"/>
-    <p:sldId id="261" r:id="rId8"/>
-    <p:sldId id="259" r:id="rId9"/>
-    <p:sldId id="263" r:id="rId10"/>
-    <p:sldId id="260" r:id="rId11"/>
+    <p:sldId id="266" r:id="rId5"/>
+    <p:sldId id="264" r:id="rId6"/>
+    <p:sldId id="258" r:id="rId7"/>
+    <p:sldId id="262" r:id="rId8"/>
+    <p:sldId id="261" r:id="rId9"/>
+    <p:sldId id="259" r:id="rId10"/>
+    <p:sldId id="263" r:id="rId11"/>
+    <p:sldId id="260" r:id="rId12"/>
   </p:sldIdLst>
   <p:sldSz cx="12192000" cy="6858000"/>
   <p:notesSz cx="6858000" cy="9144000"/>
   <p:embeddedFontLst>
     <p:embeddedFont>
       <p:font typeface="Calibri" panose="020F0502020204030204" pitchFamily="34" charset="0"/>
-      <p:regular r:id="rId13"/>
-      <p:bold r:id="rId14"/>
-      <p:italic r:id="rId15"/>
-      <p:boldItalic r:id="rId16"/>
+      <p:regular r:id="rId14"/>
+      <p:bold r:id="rId15"/>
+      <p:italic r:id="rId16"/>
+      <p:boldItalic r:id="rId17"/>
     </p:embeddedFont>
     <p:embeddedFont>
       <p:font typeface="Century Schoolbook" panose="02040604050505020304" pitchFamily="18" charset="0"/>
-      <p:regular r:id="rId17"/>
-      <p:bold r:id="rId18"/>
-      <p:italic r:id="rId19"/>
-      <p:boldItalic r:id="rId20"/>
+      <p:regular r:id="rId18"/>
+      <p:bold r:id="rId19"/>
+      <p:italic r:id="rId20"/>
+      <p:boldItalic r:id="rId21"/>
     </p:embeddedFont>
   </p:embeddedFontLst>
   <p:defaultTextStyle>
@@ -282,7 +283,7 @@
       </p15:sldGuideLst>
     </p:ext>
     <p:ext uri="http://customooxmlschemas.google.com/">
-      <go:slidesCustomData xmlns:go="http://customooxmlschemas.google.com/" xmlns:ahyp="http://schemas.microsoft.com/office/drawing/2018/hyperlinkcolor" xmlns:p15="http://schemas.microsoft.com/office/powerpoint/2012/main" xmlns:p14="http://schemas.microsoft.com/office/powerpoint/2010/main" xmlns:com="http://schemas.openxmlformats.org/drawingml/2006/compatibility" xmlns:pvml="urn:schemas-microsoft-com:office:powerpoint" xmlns:v="urn:schemas-microsoft-com:vml" xmlns:o="urn:schemas-microsoft-com:office:office" xmlns:dgm="http://schemas.openxmlformats.org/drawingml/2006/diagram" xmlns:c="http://schemas.openxmlformats.org/drawingml/2006/chart" xmlns:mv="urn:schemas-microsoft-com:mac:vml" xmlns:mc="http://schemas.openxmlformats.org/markup-compatibility/2006" xmlns="" r:id="rId21" roundtripDataSignature="AMtx7mijM5gPELxtLrcASW3xn+zmCa30EQ=="/>
+      <go:slidesCustomData xmlns="" xmlns:mc="http://schemas.openxmlformats.org/markup-compatibility/2006" xmlns:mv="urn:schemas-microsoft-com:mac:vml" xmlns:c="http://schemas.openxmlformats.org/drawingml/2006/chart" xmlns:dgm="http://schemas.openxmlformats.org/drawingml/2006/diagram" xmlns:o="urn:schemas-microsoft-com:office:office" xmlns:v="urn:schemas-microsoft-com:vml" xmlns:pvml="urn:schemas-microsoft-com:office:powerpoint" xmlns:com="http://schemas.openxmlformats.org/drawingml/2006/compatibility" xmlns:p14="http://schemas.microsoft.com/office/powerpoint/2010/main" xmlns:p15="http://schemas.microsoft.com/office/powerpoint/2012/main" xmlns:ahyp="http://schemas.microsoft.com/office/drawing/2018/hyperlinkcolor" xmlns:go="http://customooxmlschemas.google.com/" r:id="rId22" roundtripDataSignature="AMtx7mijM5gPELxtLrcASW3xn+zmCa30EQ=="/>
     </p:ext>
   </p:extLst>
 </p:presentation>
@@ -1964,6 +1965,202 @@
       </p:grpSpPr>
       <p:sp>
         <p:nvSpPr>
+          <p:cNvPr id="123" name="Google Shape;123;gc6d6ded6e2_0_9:notes"/>
+          <p:cNvSpPr>
+            <a:spLocks noGrp="1" noRot="1" noChangeAspect="1"/>
+          </p:cNvSpPr>
+          <p:nvPr>
+            <p:ph type="sldImg" idx="2"/>
+          </p:nvPr>
+        </p:nvSpPr>
+        <p:spPr>
+          <a:xfrm>
+            <a:off x="685800" y="1143000"/>
+            <a:ext cx="5486400" cy="3086100"/>
+          </a:xfrm>
+          <a:custGeom>
+            <a:avLst/>
+            <a:gdLst/>
+            <a:ahLst/>
+            <a:cxnLst/>
+            <a:rect l="l" t="t" r="r" b="b"/>
+            <a:pathLst>
+              <a:path w="120000" h="120000" extrusionOk="0">
+                <a:moveTo>
+                  <a:pt x="0" y="0"/>
+                </a:moveTo>
+                <a:lnTo>
+                  <a:pt x="120000" y="0"/>
+                </a:lnTo>
+                <a:lnTo>
+                  <a:pt x="120000" y="120000"/>
+                </a:lnTo>
+                <a:lnTo>
+                  <a:pt x="0" y="120000"/>
+                </a:lnTo>
+                <a:close/>
+              </a:path>
+            </a:pathLst>
+          </a:custGeom>
+          <a:noFill/>
+          <a:ln w="9525" cap="flat" cmpd="sng">
+            <a:solidFill>
+              <a:srgbClr val="000000"/>
+            </a:solidFill>
+            <a:prstDash val="solid"/>
+            <a:miter lim="800000"/>
+            <a:headEnd type="none" w="sm" len="sm"/>
+            <a:tailEnd type="none" w="sm" len="sm"/>
+          </a:ln>
+        </p:spPr>
+      </p:sp>
+      <p:sp>
+        <p:nvSpPr>
+          <p:cNvPr id="124" name="Google Shape;124;gc6d6ded6e2_0_9:notes"/>
+          <p:cNvSpPr txBox="1">
+            <a:spLocks noGrp="1"/>
+          </p:cNvSpPr>
+          <p:nvPr>
+            <p:ph type="body" idx="1"/>
+          </p:nvPr>
+        </p:nvSpPr>
+        <p:spPr>
+          <a:xfrm>
+            <a:off x="685800" y="4400550"/>
+            <a:ext cx="5486400" cy="3600600"/>
+          </a:xfrm>
+          <a:prstGeom prst="rect">
+            <a:avLst/>
+          </a:prstGeom>
+          <a:noFill/>
+          <a:ln>
+            <a:noFill/>
+          </a:ln>
+        </p:spPr>
+        <p:txBody>
+          <a:bodyPr spcFirstLastPara="1" wrap="square" lIns="91425" tIns="45700" rIns="91425" bIns="45700" anchor="t" anchorCtr="0">
+            <a:noAutofit/>
+          </a:bodyPr>
+          <a:lstStyle/>
+          <a:p>
+            <a:pPr marL="0" marR="0" lvl="0" indent="0" algn="l" rtl="0">
+              <a:lnSpc>
+                <a:spcPct val="100000"/>
+              </a:lnSpc>
+              <a:spcBef>
+                <a:spcPts val="0"/>
+              </a:spcBef>
+              <a:spcAft>
+                <a:spcPts val="0"/>
+              </a:spcAft>
+              <a:buSzPts val="1400"/>
+              <a:buNone/>
+            </a:pPr>
+            <a:endParaRPr sz="1200" b="0" i="0" u="none" strike="noStrike" cap="none">
+              <a:solidFill>
+                <a:schemeClr val="dk1"/>
+              </a:solidFill>
+              <a:latin typeface="Calibri"/>
+              <a:ea typeface="Calibri"/>
+              <a:cs typeface="Calibri"/>
+              <a:sym typeface="Calibri"/>
+            </a:endParaRPr>
+          </a:p>
+        </p:txBody>
+      </p:sp>
+      <p:sp>
+        <p:nvSpPr>
+          <p:cNvPr id="125" name="Google Shape;125;gc6d6ded6e2_0_9:notes"/>
+          <p:cNvSpPr txBox="1">
+            <a:spLocks noGrp="1"/>
+          </p:cNvSpPr>
+          <p:nvPr>
+            <p:ph type="sldNum" idx="12"/>
+          </p:nvPr>
+        </p:nvSpPr>
+        <p:spPr>
+          <a:xfrm>
+            <a:off x="3884613" y="8685213"/>
+            <a:ext cx="2971800" cy="458700"/>
+          </a:xfrm>
+          <a:prstGeom prst="rect">
+            <a:avLst/>
+          </a:prstGeom>
+          <a:noFill/>
+          <a:ln>
+            <a:noFill/>
+          </a:ln>
+        </p:spPr>
+        <p:txBody>
+          <a:bodyPr spcFirstLastPara="1" wrap="square" lIns="91425" tIns="45700" rIns="91425" bIns="45700" anchor="b" anchorCtr="0">
+            <a:noAutofit/>
+          </a:bodyPr>
+          <a:lstStyle/>
+          <a:p>
+            <a:pPr marL="0" marR="0" lvl="0" indent="0" algn="r" rtl="0">
+              <a:lnSpc>
+                <a:spcPct val="100000"/>
+              </a:lnSpc>
+              <a:spcBef>
+                <a:spcPts val="0"/>
+              </a:spcBef>
+              <a:spcAft>
+                <a:spcPts val="0"/>
+              </a:spcAft>
+              <a:buSzPts val="1200"/>
+              <a:buNone/>
+            </a:pPr>
+            <a:fld id="{00000000-1234-1234-1234-123412341234}" type="slidenum">
+              <a:rPr lang="pt-BR" sz="1200">
+                <a:solidFill>
+                  <a:schemeClr val="dk1"/>
+                </a:solidFill>
+                <a:latin typeface="Calibri"/>
+                <a:ea typeface="Calibri"/>
+                <a:cs typeface="Calibri"/>
+                <a:sym typeface="Calibri"/>
+              </a:rPr>
+              <a:t>10</a:t>
+            </a:fld>
+            <a:endParaRPr sz="1200">
+              <a:solidFill>
+                <a:schemeClr val="dk1"/>
+              </a:solidFill>
+              <a:latin typeface="Calibri"/>
+              <a:ea typeface="Calibri"/>
+              <a:cs typeface="Calibri"/>
+              <a:sym typeface="Calibri"/>
+            </a:endParaRPr>
+          </a:p>
+        </p:txBody>
+      </p:sp>
+    </p:spTree>
+  </p:cSld>
+  <p:clrMapOvr>
+    <a:masterClrMapping/>
+  </p:clrMapOvr>
+</p:notes>
+</file>
+
+<file path=ppt/notesSlides/notesSlide11.xml><?xml version="1.0" encoding="utf-8"?>
+<p:notes xmlns:a="http://schemas.openxmlformats.org/drawingml/2006/main" xmlns:r="http://schemas.openxmlformats.org/officeDocument/2006/relationships" xmlns:p="http://schemas.openxmlformats.org/presentationml/2006/main" showMasterSp="0" showMasterPhAnim="0">
+  <p:cSld>
+    <p:spTree>
+      <p:nvGrpSpPr>
+        <p:cNvPr id="1" name="Shape 122"/>
+        <p:cNvGrpSpPr/>
+        <p:nvPr/>
+      </p:nvGrpSpPr>
+      <p:grpSpPr>
+        <a:xfrm>
+          <a:off x="0" y="0"/>
+          <a:ext cx="0" cy="0"/>
+          <a:chOff x="0" y="0"/>
+          <a:chExt cx="0" cy="0"/>
+        </a:xfrm>
+      </p:grpSpPr>
+      <p:sp>
+        <p:nvSpPr>
           <p:cNvPr id="123" name="Google Shape;123;gc6d6ded6e2_0_0:notes"/>
           <p:cNvSpPr>
             <a:spLocks noGrp="1" noRot="1" noChangeAspect="1"/>
@@ -2119,7 +2316,7 @@
                 <a:cs typeface="Calibri"/>
                 <a:sym typeface="Calibri"/>
               </a:rPr>
-              <a:t>10</a:t>
+              <a:t>11</a:t>
             </a:fld>
             <a:endParaRPr sz="1200">
               <a:solidFill>
@@ -2729,7 +2926,7 @@
     </p:spTree>
     <p:extLst>
       <p:ext uri="{BB962C8B-B14F-4D97-AF65-F5344CB8AC3E}">
-        <p14:creationId xmlns:p14="http://schemas.microsoft.com/office/powerpoint/2010/main" val="3697241894"/>
+        <p14:creationId xmlns:p14="http://schemas.microsoft.com/office/powerpoint/2010/main" val="764459541"/>
       </p:ext>
     </p:extLst>
   </p:cSld>
@@ -2744,7 +2941,7 @@
   <p:cSld>
     <p:spTree>
       <p:nvGrpSpPr>
-        <p:cNvPr id="1" name="Shape 102"/>
+        <p:cNvPr id="1" name="Shape 92"/>
         <p:cNvGrpSpPr/>
         <p:nvPr/>
       </p:nvGrpSpPr>
@@ -2758,7 +2955,7 @@
       </p:grpSpPr>
       <p:sp>
         <p:nvSpPr>
-          <p:cNvPr id="103" name="Google Shape;103;gc6d6ded6e2_0_96:notes"/>
+          <p:cNvPr id="93" name="Google Shape;93;g1df91a3117e_0_0:notes"/>
           <p:cNvSpPr>
             <a:spLocks noGrp="1" noRot="1" noChangeAspect="1"/>
           </p:cNvSpPr>
@@ -2809,7 +3006,7 @@
       </p:sp>
       <p:sp>
         <p:nvSpPr>
-          <p:cNvPr id="104" name="Google Shape;104;gc6d6ded6e2_0_96:notes"/>
+          <p:cNvPr id="94" name="Google Shape;94;g1df91a3117e_0_0:notes"/>
           <p:cNvSpPr txBox="1">
             <a:spLocks noGrp="1"/>
           </p:cNvSpPr>
@@ -2863,7 +3060,7 @@
       </p:sp>
       <p:sp>
         <p:nvSpPr>
-          <p:cNvPr id="105" name="Google Shape;105;gc6d6ded6e2_0_96:notes"/>
+          <p:cNvPr id="95" name="Google Shape;95;g1df91a3117e_0_0:notes"/>
           <p:cNvSpPr txBox="1">
             <a:spLocks noGrp="1"/>
           </p:cNvSpPr>
@@ -2928,6 +3125,11 @@
         </p:txBody>
       </p:sp>
     </p:spTree>
+    <p:extLst>
+      <p:ext uri="{BB962C8B-B14F-4D97-AF65-F5344CB8AC3E}">
+        <p14:creationId xmlns:p14="http://schemas.microsoft.com/office/powerpoint/2010/main" val="3697241894"/>
+      </p:ext>
+    </p:extLst>
   </p:cSld>
   <p:clrMapOvr>
     <a:masterClrMapping/>
@@ -3124,11 +3326,6 @@
         </p:txBody>
       </p:sp>
     </p:spTree>
-    <p:extLst>
-      <p:ext uri="{BB962C8B-B14F-4D97-AF65-F5344CB8AC3E}">
-        <p14:creationId xmlns:p14="http://schemas.microsoft.com/office/powerpoint/2010/main" val="3501810081"/>
-      </p:ext>
-    </p:extLst>
   </p:cSld>
   <p:clrMapOvr>
     <a:masterClrMapping/>
@@ -3327,6 +3524,207 @@
     </p:spTree>
     <p:extLst>
       <p:ext uri="{BB962C8B-B14F-4D97-AF65-F5344CB8AC3E}">
+        <p14:creationId xmlns:p14="http://schemas.microsoft.com/office/powerpoint/2010/main" val="3501810081"/>
+      </p:ext>
+    </p:extLst>
+  </p:cSld>
+  <p:clrMapOvr>
+    <a:masterClrMapping/>
+  </p:clrMapOvr>
+</p:notes>
+</file>
+
+<file path=ppt/notesSlides/notesSlide8.xml><?xml version="1.0" encoding="utf-8"?>
+<p:notes xmlns:a="http://schemas.openxmlformats.org/drawingml/2006/main" xmlns:r="http://schemas.openxmlformats.org/officeDocument/2006/relationships" xmlns:p="http://schemas.openxmlformats.org/presentationml/2006/main" showMasterSp="0" showMasterPhAnim="0">
+  <p:cSld>
+    <p:spTree>
+      <p:nvGrpSpPr>
+        <p:cNvPr id="1" name="Shape 102"/>
+        <p:cNvGrpSpPr/>
+        <p:nvPr/>
+      </p:nvGrpSpPr>
+      <p:grpSpPr>
+        <a:xfrm>
+          <a:off x="0" y="0"/>
+          <a:ext cx="0" cy="0"/>
+          <a:chOff x="0" y="0"/>
+          <a:chExt cx="0" cy="0"/>
+        </a:xfrm>
+      </p:grpSpPr>
+      <p:sp>
+        <p:nvSpPr>
+          <p:cNvPr id="103" name="Google Shape;103;gc6d6ded6e2_0_96:notes"/>
+          <p:cNvSpPr>
+            <a:spLocks noGrp="1" noRot="1" noChangeAspect="1"/>
+          </p:cNvSpPr>
+          <p:nvPr>
+            <p:ph type="sldImg" idx="2"/>
+          </p:nvPr>
+        </p:nvSpPr>
+        <p:spPr>
+          <a:xfrm>
+            <a:off x="685800" y="1143000"/>
+            <a:ext cx="5486400" cy="3086100"/>
+          </a:xfrm>
+          <a:custGeom>
+            <a:avLst/>
+            <a:gdLst/>
+            <a:ahLst/>
+            <a:cxnLst/>
+            <a:rect l="l" t="t" r="r" b="b"/>
+            <a:pathLst>
+              <a:path w="120000" h="120000" extrusionOk="0">
+                <a:moveTo>
+                  <a:pt x="0" y="0"/>
+                </a:moveTo>
+                <a:lnTo>
+                  <a:pt x="120000" y="0"/>
+                </a:lnTo>
+                <a:lnTo>
+                  <a:pt x="120000" y="120000"/>
+                </a:lnTo>
+                <a:lnTo>
+                  <a:pt x="0" y="120000"/>
+                </a:lnTo>
+                <a:close/>
+              </a:path>
+            </a:pathLst>
+          </a:custGeom>
+          <a:noFill/>
+          <a:ln w="9525" cap="flat" cmpd="sng">
+            <a:solidFill>
+              <a:srgbClr val="000000"/>
+            </a:solidFill>
+            <a:prstDash val="solid"/>
+            <a:miter lim="800000"/>
+            <a:headEnd type="none" w="sm" len="sm"/>
+            <a:tailEnd type="none" w="sm" len="sm"/>
+          </a:ln>
+        </p:spPr>
+      </p:sp>
+      <p:sp>
+        <p:nvSpPr>
+          <p:cNvPr id="104" name="Google Shape;104;gc6d6ded6e2_0_96:notes"/>
+          <p:cNvSpPr txBox="1">
+            <a:spLocks noGrp="1"/>
+          </p:cNvSpPr>
+          <p:nvPr>
+            <p:ph type="body" idx="1"/>
+          </p:nvPr>
+        </p:nvSpPr>
+        <p:spPr>
+          <a:xfrm>
+            <a:off x="685800" y="4400550"/>
+            <a:ext cx="5486400" cy="3600600"/>
+          </a:xfrm>
+          <a:prstGeom prst="rect">
+            <a:avLst/>
+          </a:prstGeom>
+          <a:noFill/>
+          <a:ln>
+            <a:noFill/>
+          </a:ln>
+        </p:spPr>
+        <p:txBody>
+          <a:bodyPr spcFirstLastPara="1" wrap="square" lIns="91425" tIns="45700" rIns="91425" bIns="45700" anchor="t" anchorCtr="0">
+            <a:noAutofit/>
+          </a:bodyPr>
+          <a:lstStyle/>
+          <a:p>
+            <a:pPr marL="0" marR="0" lvl="0" indent="0" algn="l" rtl="0">
+              <a:lnSpc>
+                <a:spcPct val="100000"/>
+              </a:lnSpc>
+              <a:spcBef>
+                <a:spcPts val="0"/>
+              </a:spcBef>
+              <a:spcAft>
+                <a:spcPts val="0"/>
+              </a:spcAft>
+              <a:buSzPts val="1400"/>
+              <a:buNone/>
+            </a:pPr>
+            <a:endParaRPr sz="1200" b="0" i="0" u="none" strike="noStrike" cap="none">
+              <a:solidFill>
+                <a:schemeClr val="dk1"/>
+              </a:solidFill>
+              <a:latin typeface="Calibri"/>
+              <a:ea typeface="Calibri"/>
+              <a:cs typeface="Calibri"/>
+              <a:sym typeface="Calibri"/>
+            </a:endParaRPr>
+          </a:p>
+        </p:txBody>
+      </p:sp>
+      <p:sp>
+        <p:nvSpPr>
+          <p:cNvPr id="105" name="Google Shape;105;gc6d6ded6e2_0_96:notes"/>
+          <p:cNvSpPr txBox="1">
+            <a:spLocks noGrp="1"/>
+          </p:cNvSpPr>
+          <p:nvPr>
+            <p:ph type="sldNum" idx="12"/>
+          </p:nvPr>
+        </p:nvSpPr>
+        <p:spPr>
+          <a:xfrm>
+            <a:off x="3884613" y="8685213"/>
+            <a:ext cx="2971800" cy="458700"/>
+          </a:xfrm>
+          <a:prstGeom prst="rect">
+            <a:avLst/>
+          </a:prstGeom>
+          <a:noFill/>
+          <a:ln>
+            <a:noFill/>
+          </a:ln>
+        </p:spPr>
+        <p:txBody>
+          <a:bodyPr spcFirstLastPara="1" wrap="square" lIns="91425" tIns="45700" rIns="91425" bIns="45700" anchor="b" anchorCtr="0">
+            <a:noAutofit/>
+          </a:bodyPr>
+          <a:lstStyle/>
+          <a:p>
+            <a:pPr marL="0" marR="0" lvl="0" indent="0" algn="r" rtl="0">
+              <a:lnSpc>
+                <a:spcPct val="100000"/>
+              </a:lnSpc>
+              <a:spcBef>
+                <a:spcPts val="0"/>
+              </a:spcBef>
+              <a:spcAft>
+                <a:spcPts val="0"/>
+              </a:spcAft>
+              <a:buSzPts val="1200"/>
+              <a:buNone/>
+            </a:pPr>
+            <a:fld id="{00000000-1234-1234-1234-123412341234}" type="slidenum">
+              <a:rPr lang="pt-BR" sz="1200">
+                <a:solidFill>
+                  <a:schemeClr val="dk1"/>
+                </a:solidFill>
+                <a:latin typeface="Calibri"/>
+                <a:ea typeface="Calibri"/>
+                <a:cs typeface="Calibri"/>
+                <a:sym typeface="Calibri"/>
+              </a:rPr>
+              <a:t>8</a:t>
+            </a:fld>
+            <a:endParaRPr sz="1200">
+              <a:solidFill>
+                <a:schemeClr val="dk1"/>
+              </a:solidFill>
+              <a:latin typeface="Calibri"/>
+              <a:ea typeface="Calibri"/>
+              <a:cs typeface="Calibri"/>
+              <a:sym typeface="Calibri"/>
+            </a:endParaRPr>
+          </a:p>
+        </p:txBody>
+      </p:sp>
+    </p:spTree>
+    <p:extLst>
+      <p:ext uri="{BB962C8B-B14F-4D97-AF65-F5344CB8AC3E}">
         <p14:creationId xmlns:p14="http://schemas.microsoft.com/office/powerpoint/2010/main" val="1882581670"/>
       </p:ext>
     </p:extLst>
@@ -3337,7 +3735,7 @@
 </p:notes>
 </file>
 
-<file path=ppt/notesSlides/notesSlide8.xml><?xml version="1.0" encoding="utf-8"?>
+<file path=ppt/notesSlides/notesSlide9.xml><?xml version="1.0" encoding="utf-8"?>
 <p:notes xmlns:a="http://schemas.openxmlformats.org/drawingml/2006/main" xmlns:r="http://schemas.openxmlformats.org/officeDocument/2006/relationships" xmlns:p="http://schemas.openxmlformats.org/presentationml/2006/main" showMasterSp="0" showMasterPhAnim="0">
   <p:cSld>
     <p:spTree>
@@ -3462,202 +3860,6 @@
       <p:sp>
         <p:nvSpPr>
           <p:cNvPr id="115" name="Google Shape;115;gc6d6ded6e2_0_105:notes"/>
-          <p:cNvSpPr txBox="1">
-            <a:spLocks noGrp="1"/>
-          </p:cNvSpPr>
-          <p:nvPr>
-            <p:ph type="sldNum" idx="12"/>
-          </p:nvPr>
-        </p:nvSpPr>
-        <p:spPr>
-          <a:xfrm>
-            <a:off x="3884613" y="8685213"/>
-            <a:ext cx="2971800" cy="458700"/>
-          </a:xfrm>
-          <a:prstGeom prst="rect">
-            <a:avLst/>
-          </a:prstGeom>
-          <a:noFill/>
-          <a:ln>
-            <a:noFill/>
-          </a:ln>
-        </p:spPr>
-        <p:txBody>
-          <a:bodyPr spcFirstLastPara="1" wrap="square" lIns="91425" tIns="45700" rIns="91425" bIns="45700" anchor="b" anchorCtr="0">
-            <a:noAutofit/>
-          </a:bodyPr>
-          <a:lstStyle/>
-          <a:p>
-            <a:pPr marL="0" marR="0" lvl="0" indent="0" algn="r" rtl="0">
-              <a:lnSpc>
-                <a:spcPct val="100000"/>
-              </a:lnSpc>
-              <a:spcBef>
-                <a:spcPts val="0"/>
-              </a:spcBef>
-              <a:spcAft>
-                <a:spcPts val="0"/>
-              </a:spcAft>
-              <a:buSzPts val="1200"/>
-              <a:buNone/>
-            </a:pPr>
-            <a:fld id="{00000000-1234-1234-1234-123412341234}" type="slidenum">
-              <a:rPr lang="pt-BR" sz="1200">
-                <a:solidFill>
-                  <a:schemeClr val="dk1"/>
-                </a:solidFill>
-                <a:latin typeface="Calibri"/>
-                <a:ea typeface="Calibri"/>
-                <a:cs typeface="Calibri"/>
-                <a:sym typeface="Calibri"/>
-              </a:rPr>
-              <a:t>8</a:t>
-            </a:fld>
-            <a:endParaRPr sz="1200">
-              <a:solidFill>
-                <a:schemeClr val="dk1"/>
-              </a:solidFill>
-              <a:latin typeface="Calibri"/>
-              <a:ea typeface="Calibri"/>
-              <a:cs typeface="Calibri"/>
-              <a:sym typeface="Calibri"/>
-            </a:endParaRPr>
-          </a:p>
-        </p:txBody>
-      </p:sp>
-    </p:spTree>
-  </p:cSld>
-  <p:clrMapOvr>
-    <a:masterClrMapping/>
-  </p:clrMapOvr>
-</p:notes>
-</file>
-
-<file path=ppt/notesSlides/notesSlide9.xml><?xml version="1.0" encoding="utf-8"?>
-<p:notes xmlns:a="http://schemas.openxmlformats.org/drawingml/2006/main" xmlns:r="http://schemas.openxmlformats.org/officeDocument/2006/relationships" xmlns:p="http://schemas.openxmlformats.org/presentationml/2006/main" showMasterSp="0" showMasterPhAnim="0">
-  <p:cSld>
-    <p:spTree>
-      <p:nvGrpSpPr>
-        <p:cNvPr id="1" name="Shape 122"/>
-        <p:cNvGrpSpPr/>
-        <p:nvPr/>
-      </p:nvGrpSpPr>
-      <p:grpSpPr>
-        <a:xfrm>
-          <a:off x="0" y="0"/>
-          <a:ext cx="0" cy="0"/>
-          <a:chOff x="0" y="0"/>
-          <a:chExt cx="0" cy="0"/>
-        </a:xfrm>
-      </p:grpSpPr>
-      <p:sp>
-        <p:nvSpPr>
-          <p:cNvPr id="123" name="Google Shape;123;gc6d6ded6e2_0_9:notes"/>
-          <p:cNvSpPr>
-            <a:spLocks noGrp="1" noRot="1" noChangeAspect="1"/>
-          </p:cNvSpPr>
-          <p:nvPr>
-            <p:ph type="sldImg" idx="2"/>
-          </p:nvPr>
-        </p:nvSpPr>
-        <p:spPr>
-          <a:xfrm>
-            <a:off x="685800" y="1143000"/>
-            <a:ext cx="5486400" cy="3086100"/>
-          </a:xfrm>
-          <a:custGeom>
-            <a:avLst/>
-            <a:gdLst/>
-            <a:ahLst/>
-            <a:cxnLst/>
-            <a:rect l="l" t="t" r="r" b="b"/>
-            <a:pathLst>
-              <a:path w="120000" h="120000" extrusionOk="0">
-                <a:moveTo>
-                  <a:pt x="0" y="0"/>
-                </a:moveTo>
-                <a:lnTo>
-                  <a:pt x="120000" y="0"/>
-                </a:lnTo>
-                <a:lnTo>
-                  <a:pt x="120000" y="120000"/>
-                </a:lnTo>
-                <a:lnTo>
-                  <a:pt x="0" y="120000"/>
-                </a:lnTo>
-                <a:close/>
-              </a:path>
-            </a:pathLst>
-          </a:custGeom>
-          <a:noFill/>
-          <a:ln w="9525" cap="flat" cmpd="sng">
-            <a:solidFill>
-              <a:srgbClr val="000000"/>
-            </a:solidFill>
-            <a:prstDash val="solid"/>
-            <a:miter lim="800000"/>
-            <a:headEnd type="none" w="sm" len="sm"/>
-            <a:tailEnd type="none" w="sm" len="sm"/>
-          </a:ln>
-        </p:spPr>
-      </p:sp>
-      <p:sp>
-        <p:nvSpPr>
-          <p:cNvPr id="124" name="Google Shape;124;gc6d6ded6e2_0_9:notes"/>
-          <p:cNvSpPr txBox="1">
-            <a:spLocks noGrp="1"/>
-          </p:cNvSpPr>
-          <p:nvPr>
-            <p:ph type="body" idx="1"/>
-          </p:nvPr>
-        </p:nvSpPr>
-        <p:spPr>
-          <a:xfrm>
-            <a:off x="685800" y="4400550"/>
-            <a:ext cx="5486400" cy="3600600"/>
-          </a:xfrm>
-          <a:prstGeom prst="rect">
-            <a:avLst/>
-          </a:prstGeom>
-          <a:noFill/>
-          <a:ln>
-            <a:noFill/>
-          </a:ln>
-        </p:spPr>
-        <p:txBody>
-          <a:bodyPr spcFirstLastPara="1" wrap="square" lIns="91425" tIns="45700" rIns="91425" bIns="45700" anchor="t" anchorCtr="0">
-            <a:noAutofit/>
-          </a:bodyPr>
-          <a:lstStyle/>
-          <a:p>
-            <a:pPr marL="0" marR="0" lvl="0" indent="0" algn="l" rtl="0">
-              <a:lnSpc>
-                <a:spcPct val="100000"/>
-              </a:lnSpc>
-              <a:spcBef>
-                <a:spcPts val="0"/>
-              </a:spcBef>
-              <a:spcAft>
-                <a:spcPts val="0"/>
-              </a:spcAft>
-              <a:buSzPts val="1400"/>
-              <a:buNone/>
-            </a:pPr>
-            <a:endParaRPr sz="1200" b="0" i="0" u="none" strike="noStrike" cap="none">
-              <a:solidFill>
-                <a:schemeClr val="dk1"/>
-              </a:solidFill>
-              <a:latin typeface="Calibri"/>
-              <a:ea typeface="Calibri"/>
-              <a:cs typeface="Calibri"/>
-              <a:sym typeface="Calibri"/>
-            </a:endParaRPr>
-          </a:p>
-        </p:txBody>
-      </p:sp>
-      <p:sp>
-        <p:nvSpPr>
-          <p:cNvPr id="125" name="Google Shape;125;gc6d6ded6e2_0_9:notes"/>
           <p:cNvSpPr txBox="1">
             <a:spLocks noGrp="1"/>
           </p:cNvSpPr>
@@ -21954,6 +22156,931 @@
       </p:grpSpPr>
       <p:sp>
         <p:nvSpPr>
+          <p:cNvPr id="127" name="Google Shape;127;gc6d6ded6e2_0_9"/>
+          <p:cNvSpPr/>
+          <p:nvPr/>
+        </p:nvSpPr>
+        <p:spPr>
+          <a:xfrm>
+            <a:off x="0" y="0"/>
+            <a:ext cx="12192000" cy="1747800"/>
+          </a:xfrm>
+          <a:prstGeom prst="rect">
+            <a:avLst/>
+          </a:prstGeom>
+          <a:noFill/>
+          <a:ln>
+            <a:noFill/>
+          </a:ln>
+        </p:spPr>
+        <p:txBody>
+          <a:bodyPr spcFirstLastPara="1" wrap="square" lIns="91425" tIns="45700" rIns="91425" bIns="45700" anchor="ctr" anchorCtr="0">
+            <a:noAutofit/>
+          </a:bodyPr>
+          <a:lstStyle/>
+          <a:p>
+            <a:pPr marL="0" marR="0" lvl="0" indent="0" algn="ctr" rtl="0">
+              <a:lnSpc>
+                <a:spcPct val="100000"/>
+              </a:lnSpc>
+              <a:spcBef>
+                <a:spcPts val="0"/>
+              </a:spcBef>
+              <a:spcAft>
+                <a:spcPts val="0"/>
+              </a:spcAft>
+              <a:buClr>
+                <a:srgbClr val="000000"/>
+              </a:buClr>
+              <a:buSzPts val="1800"/>
+              <a:buFont typeface="Arial"/>
+              <a:buNone/>
+            </a:pPr>
+            <a:endParaRPr sz="1800" b="0" i="0" u="none" strike="noStrike" cap="none">
+              <a:solidFill>
+                <a:schemeClr val="lt1"/>
+              </a:solidFill>
+              <a:latin typeface="Arial"/>
+              <a:ea typeface="Arial"/>
+              <a:cs typeface="Arial"/>
+              <a:sym typeface="Arial"/>
+            </a:endParaRPr>
+          </a:p>
+        </p:txBody>
+      </p:sp>
+      <p:sp>
+        <p:nvSpPr>
+          <p:cNvPr id="128" name="Google Shape;128;gc6d6ded6e2_0_9"/>
+          <p:cNvSpPr txBox="1">
+            <a:spLocks noGrp="1"/>
+          </p:cNvSpPr>
+          <p:nvPr>
+            <p:ph type="sldNum" idx="12"/>
+          </p:nvPr>
+        </p:nvSpPr>
+        <p:spPr>
+          <a:xfrm>
+            <a:off x="8737600" y="6356351"/>
+            <a:ext cx="2844900" cy="365100"/>
+          </a:xfrm>
+          <a:prstGeom prst="rect">
+            <a:avLst/>
+          </a:prstGeom>
+          <a:noFill/>
+          <a:ln>
+            <a:noFill/>
+          </a:ln>
+        </p:spPr>
+        <p:txBody>
+          <a:bodyPr spcFirstLastPara="1" wrap="square" lIns="91425" tIns="45700" rIns="91425" bIns="45700" anchor="ctr" anchorCtr="0">
+            <a:noAutofit/>
+          </a:bodyPr>
+          <a:lstStyle/>
+          <a:p>
+            <a:pPr marL="0" lvl="0" indent="0" algn="r" rtl="0">
+              <a:lnSpc>
+                <a:spcPct val="100000"/>
+              </a:lnSpc>
+              <a:spcBef>
+                <a:spcPts val="0"/>
+              </a:spcBef>
+              <a:spcAft>
+                <a:spcPts val="0"/>
+              </a:spcAft>
+              <a:buClr>
+                <a:srgbClr val="000000"/>
+              </a:buClr>
+              <a:buSzPts val="1200"/>
+              <a:buFont typeface="Arial"/>
+              <a:buNone/>
+            </a:pPr>
+            <a:fld id="{00000000-1234-1234-1234-123412341234}" type="slidenum">
+              <a:rPr lang="pt-BR"/>
+              <a:t>10</a:t>
+            </a:fld>
+            <a:endParaRPr/>
+          </a:p>
+        </p:txBody>
+      </p:sp>
+      <p:sp>
+        <p:nvSpPr>
+          <p:cNvPr id="129" name="Google Shape;129;gc6d6ded6e2_0_9"/>
+          <p:cNvSpPr/>
+          <p:nvPr/>
+        </p:nvSpPr>
+        <p:spPr>
+          <a:xfrm>
+            <a:off x="316401" y="220250"/>
+            <a:ext cx="8960100" cy="584700"/>
+          </a:xfrm>
+          <a:prstGeom prst="rect">
+            <a:avLst/>
+          </a:prstGeom>
+          <a:noFill/>
+          <a:ln>
+            <a:noFill/>
+          </a:ln>
+        </p:spPr>
+        <p:txBody>
+          <a:bodyPr spcFirstLastPara="1" wrap="square" lIns="91425" tIns="45700" rIns="91425" bIns="45700" anchor="t" anchorCtr="0">
+            <a:noAutofit/>
+          </a:bodyPr>
+          <a:lstStyle/>
+          <a:p>
+            <a:pPr marL="0" marR="0" lvl="0" indent="0" algn="l" rtl="0">
+              <a:lnSpc>
+                <a:spcPct val="100000"/>
+              </a:lnSpc>
+              <a:spcBef>
+                <a:spcPts val="0"/>
+              </a:spcBef>
+              <a:spcAft>
+                <a:spcPts val="0"/>
+              </a:spcAft>
+              <a:buClr>
+                <a:srgbClr val="000000"/>
+              </a:buClr>
+              <a:buSzPts val="3200"/>
+              <a:buFont typeface="Arial"/>
+              <a:buNone/>
+            </a:pPr>
+            <a:r>
+              <a:rPr lang="pt-BR" sz="3200" b="1" i="0" u="none" strike="noStrike" cap="none">
+                <a:solidFill>
+                  <a:srgbClr val="FF0000"/>
+                </a:solidFill>
+                <a:latin typeface="Century Schoolbook"/>
+                <a:ea typeface="Century Schoolbook"/>
+                <a:cs typeface="Century Schoolbook"/>
+                <a:sym typeface="Century Schoolbook"/>
+              </a:rPr>
+              <a:t>Atividade Aula: Modelo Lógico</a:t>
+            </a:r>
+            <a:endParaRPr sz="3200" b="1" i="0" u="none" strike="noStrike" cap="none">
+              <a:solidFill>
+                <a:srgbClr val="FF0000"/>
+              </a:solidFill>
+              <a:latin typeface="Century Schoolbook"/>
+              <a:ea typeface="Century Schoolbook"/>
+              <a:cs typeface="Century Schoolbook"/>
+              <a:sym typeface="Century Schoolbook"/>
+            </a:endParaRPr>
+          </a:p>
+        </p:txBody>
+      </p:sp>
+      <p:pic>
+        <p:nvPicPr>
+          <p:cNvPr id="130" name="Google Shape;130;gc6d6ded6e2_0_9"/>
+          <p:cNvPicPr preferRelativeResize="0"/>
+          <p:nvPr/>
+        </p:nvPicPr>
+        <p:blipFill rotWithShape="1">
+          <a:blip r:embed="rId3">
+            <a:alphaModFix/>
+          </a:blip>
+          <a:srcRect/>
+          <a:stretch/>
+        </p:blipFill>
+        <p:spPr>
+          <a:xfrm>
+            <a:off x="9206151" y="0"/>
+            <a:ext cx="2380082" cy="1371599"/>
+          </a:xfrm>
+          <a:prstGeom prst="rect">
+            <a:avLst/>
+          </a:prstGeom>
+          <a:noFill/>
+          <a:ln>
+            <a:noFill/>
+          </a:ln>
+        </p:spPr>
+      </p:pic>
+      <p:sp>
+        <p:nvSpPr>
+          <p:cNvPr id="131" name="Google Shape;131;gc6d6ded6e2_0_9"/>
+          <p:cNvSpPr/>
+          <p:nvPr/>
+        </p:nvSpPr>
+        <p:spPr>
+          <a:xfrm>
+            <a:off x="493235" y="1225072"/>
+            <a:ext cx="11089200" cy="5412678"/>
+          </a:xfrm>
+          <a:prstGeom prst="rect">
+            <a:avLst/>
+          </a:prstGeom>
+          <a:noFill/>
+          <a:ln>
+            <a:noFill/>
+          </a:ln>
+        </p:spPr>
+        <p:txBody>
+          <a:bodyPr spcFirstLastPara="1" wrap="square" lIns="91425" tIns="45700" rIns="91425" bIns="45700" anchor="t" anchorCtr="0">
+            <a:noAutofit/>
+          </a:bodyPr>
+          <a:lstStyle/>
+          <a:p>
+            <a:pPr marL="0" marR="0" lvl="0" indent="0" algn="just" rtl="0">
+              <a:lnSpc>
+                <a:spcPct val="150000"/>
+              </a:lnSpc>
+              <a:spcBef>
+                <a:spcPts val="0"/>
+              </a:spcBef>
+              <a:spcAft>
+                <a:spcPts val="0"/>
+              </a:spcAft>
+              <a:buClr>
+                <a:srgbClr val="000000"/>
+              </a:buClr>
+              <a:buSzPts val="1800"/>
+              <a:buFont typeface="Arial"/>
+              <a:buNone/>
+            </a:pPr>
+            <a:r>
+              <a:rPr lang="pt-BR" sz="1800" b="0" i="0" u="none" strike="noStrike" cap="none" dirty="0">
+                <a:solidFill>
+                  <a:schemeClr val="dk1"/>
+                </a:solidFill>
+                <a:latin typeface="Arial"/>
+                <a:ea typeface="Arial"/>
+                <a:cs typeface="Arial"/>
+                <a:sym typeface="Arial"/>
+              </a:rPr>
+              <a:t>- Detalhe mais o diagrama criado transforma-o em um </a:t>
+            </a:r>
+            <a:r>
+              <a:rPr lang="pt-BR" sz="1800" b="1" i="0" u="none" strike="noStrike" cap="none" dirty="0">
+                <a:solidFill>
+                  <a:schemeClr val="dk1"/>
+                </a:solidFill>
+                <a:latin typeface="Arial"/>
+                <a:ea typeface="Arial"/>
+                <a:cs typeface="Arial"/>
+                <a:sym typeface="Arial"/>
+              </a:rPr>
+              <a:t>Modelo Lógico</a:t>
+            </a:r>
+            <a:r>
+              <a:rPr lang="pt-BR" sz="1800" b="0" i="0" u="none" strike="noStrike" cap="none" dirty="0">
+                <a:solidFill>
+                  <a:schemeClr val="dk1"/>
+                </a:solidFill>
+                <a:latin typeface="Arial"/>
+                <a:ea typeface="Arial"/>
+                <a:cs typeface="Arial"/>
+                <a:sym typeface="Arial"/>
+              </a:rPr>
+              <a:t>. Para isto, apresente os atributos e domínios das entidades definidas.</a:t>
+            </a:r>
+            <a:endParaRPr sz="1800" b="0" i="0" u="none" strike="noStrike" cap="none" dirty="0">
+              <a:solidFill>
+                <a:schemeClr val="dk1"/>
+              </a:solidFill>
+              <a:latin typeface="Arial"/>
+              <a:ea typeface="Arial"/>
+              <a:cs typeface="Arial"/>
+              <a:sym typeface="Arial"/>
+            </a:endParaRPr>
+          </a:p>
+          <a:p>
+            <a:pPr marL="0" marR="0" lvl="0" indent="0" algn="just" rtl="0">
+              <a:lnSpc>
+                <a:spcPct val="150000"/>
+              </a:lnSpc>
+              <a:spcBef>
+                <a:spcPts val="0"/>
+              </a:spcBef>
+              <a:spcAft>
+                <a:spcPts val="0"/>
+              </a:spcAft>
+              <a:buClr>
+                <a:srgbClr val="000000"/>
+              </a:buClr>
+              <a:buSzPts val="1800"/>
+              <a:buFont typeface="Arial"/>
+              <a:buNone/>
+            </a:pPr>
+            <a:endParaRPr sz="1800" b="0" i="0" u="none" strike="noStrike" cap="none" dirty="0">
+              <a:solidFill>
+                <a:schemeClr val="dk1"/>
+              </a:solidFill>
+              <a:latin typeface="Arial"/>
+              <a:ea typeface="Arial"/>
+              <a:cs typeface="Arial"/>
+              <a:sym typeface="Arial"/>
+            </a:endParaRPr>
+          </a:p>
+          <a:p>
+            <a:pPr marL="285750" marR="0" lvl="0" indent="-285750" algn="just" rtl="0">
+              <a:lnSpc>
+                <a:spcPct val="150000"/>
+              </a:lnSpc>
+              <a:spcBef>
+                <a:spcPts val="0"/>
+              </a:spcBef>
+              <a:spcAft>
+                <a:spcPts val="0"/>
+              </a:spcAft>
+              <a:buClr>
+                <a:srgbClr val="000000"/>
+              </a:buClr>
+              <a:buSzPts val="1800"/>
+              <a:buFontTx/>
+              <a:buChar char="-"/>
+            </a:pPr>
+            <a:r>
+              <a:rPr lang="pt-BR" sz="1800" b="0" i="0" u="none" strike="noStrike" cap="none" dirty="0">
+                <a:solidFill>
+                  <a:schemeClr val="dk1"/>
+                </a:solidFill>
+                <a:latin typeface="Arial"/>
+                <a:ea typeface="Arial"/>
+                <a:cs typeface="Arial"/>
+                <a:sym typeface="Arial"/>
+              </a:rPr>
+              <a:t>Para cada uma das entidades envolvidas no </a:t>
+            </a:r>
+            <a:r>
+              <a:rPr lang="pt-BR" sz="1800" b="1" i="0" u="none" strike="noStrike" cap="none" dirty="0">
+                <a:solidFill>
+                  <a:schemeClr val="dk1"/>
+                </a:solidFill>
+                <a:latin typeface="Arial"/>
+                <a:ea typeface="Arial"/>
+                <a:cs typeface="Arial"/>
+                <a:sym typeface="Arial"/>
+              </a:rPr>
+              <a:t>modelo lógico</a:t>
+            </a:r>
+            <a:r>
+              <a:rPr lang="pt-BR" sz="1800" b="0" i="0" u="none" strike="noStrike" cap="none" dirty="0">
+                <a:solidFill>
+                  <a:schemeClr val="dk1"/>
+                </a:solidFill>
+                <a:latin typeface="Arial"/>
+                <a:ea typeface="Arial"/>
+                <a:cs typeface="Arial"/>
+                <a:sym typeface="Arial"/>
+              </a:rPr>
+              <a:t>, defina a chave primária e estrangeira (se houver). </a:t>
+            </a:r>
+          </a:p>
+          <a:p>
+            <a:pPr marL="285750" indent="-285750" algn="just">
+              <a:lnSpc>
+                <a:spcPct val="150000"/>
+              </a:lnSpc>
+              <a:buSzPts val="1800"/>
+              <a:buFontTx/>
+              <a:buChar char="-"/>
+            </a:pPr>
+            <a:r>
+              <a:rPr lang="pt-BR" sz="1800" dirty="0">
+                <a:solidFill>
+                  <a:schemeClr val="dk1"/>
+                </a:solidFill>
+              </a:rPr>
+              <a:t>Apresente o modelo lógico feito explicando as cardinalidades e definições de chaves.</a:t>
+            </a:r>
+            <a:endParaRPr lang="pt-BR" dirty="0"/>
+          </a:p>
+          <a:p>
+            <a:pPr marL="285750" marR="0" lvl="0" indent="-285750" algn="just" rtl="0">
+              <a:lnSpc>
+                <a:spcPct val="150000"/>
+              </a:lnSpc>
+              <a:spcBef>
+                <a:spcPts val="0"/>
+              </a:spcBef>
+              <a:spcAft>
+                <a:spcPts val="0"/>
+              </a:spcAft>
+              <a:buClr>
+                <a:srgbClr val="000000"/>
+              </a:buClr>
+              <a:buSzPts val="1800"/>
+              <a:buFontTx/>
+              <a:buChar char="-"/>
+            </a:pPr>
+            <a:endParaRPr lang="pt-BR" sz="1800" b="0" i="0" u="none" strike="noStrike" cap="none" dirty="0">
+              <a:solidFill>
+                <a:schemeClr val="dk1"/>
+              </a:solidFill>
+              <a:latin typeface="Arial"/>
+              <a:ea typeface="Arial"/>
+              <a:cs typeface="Arial"/>
+              <a:sym typeface="Arial"/>
+            </a:endParaRPr>
+          </a:p>
+          <a:p>
+            <a:pPr marL="285750" marR="0" lvl="0" indent="-285750" algn="just" rtl="0">
+              <a:lnSpc>
+                <a:spcPct val="150000"/>
+              </a:lnSpc>
+              <a:spcBef>
+                <a:spcPts val="0"/>
+              </a:spcBef>
+              <a:spcAft>
+                <a:spcPts val="0"/>
+              </a:spcAft>
+              <a:buClr>
+                <a:srgbClr val="000000"/>
+              </a:buClr>
+              <a:buSzPts val="1800"/>
+              <a:buFontTx/>
+              <a:buChar char="-"/>
+            </a:pPr>
+            <a:endParaRPr lang="pt-BR" sz="1800" b="0" i="0" u="none" strike="noStrike" cap="none" dirty="0">
+              <a:solidFill>
+                <a:schemeClr val="dk1"/>
+              </a:solidFill>
+              <a:latin typeface="Arial"/>
+              <a:ea typeface="Arial"/>
+              <a:cs typeface="Arial"/>
+              <a:sym typeface="Arial"/>
+            </a:endParaRPr>
+          </a:p>
+          <a:p>
+            <a:pPr marL="0" marR="0" lvl="0" indent="0" algn="just" rtl="0">
+              <a:lnSpc>
+                <a:spcPct val="150000"/>
+              </a:lnSpc>
+              <a:spcBef>
+                <a:spcPts val="0"/>
+              </a:spcBef>
+              <a:spcAft>
+                <a:spcPts val="0"/>
+              </a:spcAft>
+              <a:buClr>
+                <a:srgbClr val="000000"/>
+              </a:buClr>
+              <a:buSzPts val="1800"/>
+              <a:buFont typeface="Arial"/>
+              <a:buNone/>
+            </a:pPr>
+            <a:endParaRPr sz="1800" b="0" i="0" u="none" strike="noStrike" cap="none" dirty="0">
+              <a:solidFill>
+                <a:schemeClr val="dk1"/>
+              </a:solidFill>
+              <a:latin typeface="Arial"/>
+              <a:ea typeface="Arial"/>
+              <a:cs typeface="Arial"/>
+              <a:sym typeface="Arial"/>
+            </a:endParaRPr>
+          </a:p>
+        </p:txBody>
+      </p:sp>
+      <p:pic>
+        <p:nvPicPr>
+          <p:cNvPr id="132" name="Google Shape;132;gc6d6ded6e2_0_9" descr="Uma imagem contendo captura de tela&#10;&#10;Descrição gerada com muito alta confiança"/>
+          <p:cNvPicPr preferRelativeResize="0"/>
+          <p:nvPr/>
+        </p:nvPicPr>
+        <p:blipFill rotWithShape="1">
+          <a:blip r:embed="rId4">
+            <a:alphaModFix/>
+          </a:blip>
+          <a:srcRect/>
+          <a:stretch/>
+        </p:blipFill>
+        <p:spPr>
+          <a:xfrm>
+            <a:off x="4753007" y="4277744"/>
+            <a:ext cx="5440304" cy="2360006"/>
+          </a:xfrm>
+          <a:prstGeom prst="rect">
+            <a:avLst/>
+          </a:prstGeom>
+          <a:noFill/>
+          <a:ln>
+            <a:noFill/>
+          </a:ln>
+        </p:spPr>
+      </p:pic>
+      <p:pic>
+        <p:nvPicPr>
+          <p:cNvPr id="133" name="Google Shape;133;gc6d6ded6e2_0_9" descr="Uma imagem contendo captura de tela&#10;&#10;Descrição gerada com muito alta confiança"/>
+          <p:cNvPicPr preferRelativeResize="0"/>
+          <p:nvPr/>
+        </p:nvPicPr>
+        <p:blipFill rotWithShape="1">
+          <a:blip r:embed="rId5">
+            <a:alphaModFix/>
+          </a:blip>
+          <a:srcRect/>
+          <a:stretch/>
+        </p:blipFill>
+        <p:spPr>
+          <a:xfrm>
+            <a:off x="886986" y="4689262"/>
+            <a:ext cx="2743200" cy="1667089"/>
+          </a:xfrm>
+          <a:prstGeom prst="rect">
+            <a:avLst/>
+          </a:prstGeom>
+          <a:noFill/>
+          <a:ln>
+            <a:noFill/>
+          </a:ln>
+        </p:spPr>
+      </p:pic>
+      <p:sp>
+        <p:nvSpPr>
+          <p:cNvPr id="134" name="Google Shape;134;gc6d6ded6e2_0_9"/>
+          <p:cNvSpPr txBox="1"/>
+          <p:nvPr/>
+        </p:nvSpPr>
+        <p:spPr>
+          <a:xfrm>
+            <a:off x="609565" y="4009493"/>
+            <a:ext cx="11292625" cy="646300"/>
+          </a:xfrm>
+          <a:prstGeom prst="rect">
+            <a:avLst/>
+          </a:prstGeom>
+          <a:noFill/>
+          <a:ln>
+            <a:noFill/>
+          </a:ln>
+        </p:spPr>
+        <p:txBody>
+          <a:bodyPr spcFirstLastPara="1" wrap="square" lIns="91425" tIns="91425" rIns="91425" bIns="91425" anchor="t" anchorCtr="0">
+            <a:spAutoFit/>
+          </a:bodyPr>
+          <a:lstStyle/>
+          <a:p>
+            <a:pPr marL="0" marR="0" lvl="0" indent="0" algn="just" rtl="0">
+              <a:lnSpc>
+                <a:spcPct val="150000"/>
+              </a:lnSpc>
+              <a:spcBef>
+                <a:spcPts val="0"/>
+              </a:spcBef>
+              <a:spcAft>
+                <a:spcPts val="0"/>
+              </a:spcAft>
+              <a:buClr>
+                <a:srgbClr val="000000"/>
+              </a:buClr>
+              <a:buSzPts val="1800"/>
+              <a:buFont typeface="Arial"/>
+              <a:buNone/>
+            </a:pPr>
+            <a:r>
+              <a:rPr lang="pt-BR" sz="2000" b="1" i="0" u="none" strike="noStrike" cap="none" dirty="0">
+                <a:solidFill>
+                  <a:srgbClr val="000000"/>
+                </a:solidFill>
+                <a:latin typeface="Arial"/>
+                <a:ea typeface="Arial"/>
+                <a:cs typeface="Arial"/>
+                <a:sym typeface="Arial"/>
+              </a:rPr>
+              <a:t>Exemplo de Modelo Lógico:</a:t>
+            </a:r>
+            <a:endParaRPr sz="2000" b="1" i="0" u="none" strike="noStrike" cap="none" dirty="0">
+              <a:solidFill>
+                <a:srgbClr val="000000"/>
+              </a:solidFill>
+              <a:latin typeface="Arial"/>
+              <a:ea typeface="Arial"/>
+              <a:cs typeface="Arial"/>
+              <a:sym typeface="Arial"/>
+            </a:endParaRPr>
+          </a:p>
+        </p:txBody>
+      </p:sp>
+    </p:spTree>
+  </p:cSld>
+  <p:clrMapOvr>
+    <a:masterClrMapping/>
+  </p:clrMapOvr>
+  <p:timing>
+    <p:tnLst>
+      <p:par>
+        <p:cTn id="1" dur="indefinite" restart="never" nodeType="tmRoot">
+          <p:childTnLst>
+            <p:seq concurrent="1" nextAc="seek">
+              <p:cTn id="2" dur="indefinite" nodeType="mainSeq">
+                <p:childTnLst>
+                  <p:par>
+                    <p:cTn id="3" fill="hold">
+                      <p:stCondLst>
+                        <p:cond delay="indefinite"/>
+                      </p:stCondLst>
+                      <p:childTnLst>
+                        <p:par>
+                          <p:cTn id="4" fill="hold">
+                            <p:stCondLst>
+                              <p:cond delay="0"/>
+                            </p:stCondLst>
+                            <p:childTnLst>
+                              <p:par>
+                                <p:cTn id="5" presetID="10" presetClass="entr" presetSubtype="0" fill="hold" nodeType="clickEffect">
+                                  <p:stCondLst>
+                                    <p:cond delay="0"/>
+                                  </p:stCondLst>
+                                  <p:childTnLst>
+                                    <p:set>
+                                      <p:cBhvr>
+                                        <p:cTn id="6" dur="1" fill="hold">
+                                          <p:stCondLst>
+                                            <p:cond delay="0"/>
+                                          </p:stCondLst>
+                                        </p:cTn>
+                                        <p:tgtEl>
+                                          <p:spTgt spid="131">
+                                            <p:txEl>
+                                              <p:pRg st="0" end="0"/>
+                                            </p:txEl>
+                                          </p:spTgt>
+                                        </p:tgtEl>
+                                        <p:attrNameLst>
+                                          <p:attrName>style.visibility</p:attrName>
+                                        </p:attrNameLst>
+                                      </p:cBhvr>
+                                      <p:to>
+                                        <p:strVal val="visible"/>
+                                      </p:to>
+                                    </p:set>
+                                    <p:animEffect transition="in" filter="fade">
+                                      <p:cBhvr>
+                                        <p:cTn id="7" dur="500"/>
+                                        <p:tgtEl>
+                                          <p:spTgt spid="131">
+                                            <p:txEl>
+                                              <p:pRg st="0" end="0"/>
+                                            </p:txEl>
+                                          </p:spTgt>
+                                        </p:tgtEl>
+                                      </p:cBhvr>
+                                    </p:animEffect>
+                                  </p:childTnLst>
+                                </p:cTn>
+                              </p:par>
+                            </p:childTnLst>
+                          </p:cTn>
+                        </p:par>
+                      </p:childTnLst>
+                    </p:cTn>
+                  </p:par>
+                  <p:par>
+                    <p:cTn id="8" fill="hold">
+                      <p:stCondLst>
+                        <p:cond delay="indefinite"/>
+                      </p:stCondLst>
+                      <p:childTnLst>
+                        <p:par>
+                          <p:cTn id="9" fill="hold">
+                            <p:stCondLst>
+                              <p:cond delay="0"/>
+                            </p:stCondLst>
+                            <p:childTnLst>
+                              <p:par>
+                                <p:cTn id="10" presetID="10" presetClass="entr" presetSubtype="0" fill="hold" nodeType="clickEffect">
+                                  <p:stCondLst>
+                                    <p:cond delay="0"/>
+                                  </p:stCondLst>
+                                  <p:childTnLst>
+                                    <p:set>
+                                      <p:cBhvr>
+                                        <p:cTn id="11" dur="1" fill="hold">
+                                          <p:stCondLst>
+                                            <p:cond delay="0"/>
+                                          </p:stCondLst>
+                                        </p:cTn>
+                                        <p:tgtEl>
+                                          <p:spTgt spid="131">
+                                            <p:txEl>
+                                              <p:pRg st="2" end="2"/>
+                                            </p:txEl>
+                                          </p:spTgt>
+                                        </p:tgtEl>
+                                        <p:attrNameLst>
+                                          <p:attrName>style.visibility</p:attrName>
+                                        </p:attrNameLst>
+                                      </p:cBhvr>
+                                      <p:to>
+                                        <p:strVal val="visible"/>
+                                      </p:to>
+                                    </p:set>
+                                    <p:animEffect transition="in" filter="fade">
+                                      <p:cBhvr>
+                                        <p:cTn id="12" dur="500"/>
+                                        <p:tgtEl>
+                                          <p:spTgt spid="131">
+                                            <p:txEl>
+                                              <p:pRg st="2" end="2"/>
+                                            </p:txEl>
+                                          </p:spTgt>
+                                        </p:tgtEl>
+                                      </p:cBhvr>
+                                    </p:animEffect>
+                                  </p:childTnLst>
+                                </p:cTn>
+                              </p:par>
+                            </p:childTnLst>
+                          </p:cTn>
+                        </p:par>
+                      </p:childTnLst>
+                    </p:cTn>
+                  </p:par>
+                  <p:par>
+                    <p:cTn id="13" fill="hold">
+                      <p:stCondLst>
+                        <p:cond delay="indefinite"/>
+                      </p:stCondLst>
+                      <p:childTnLst>
+                        <p:par>
+                          <p:cTn id="14" fill="hold">
+                            <p:stCondLst>
+                              <p:cond delay="0"/>
+                            </p:stCondLst>
+                            <p:childTnLst>
+                              <p:par>
+                                <p:cTn id="15" presetID="10" presetClass="entr" presetSubtype="0" fill="hold" nodeType="clickEffect">
+                                  <p:stCondLst>
+                                    <p:cond delay="0"/>
+                                  </p:stCondLst>
+                                  <p:childTnLst>
+                                    <p:set>
+                                      <p:cBhvr>
+                                        <p:cTn id="16" dur="1" fill="hold">
+                                          <p:stCondLst>
+                                            <p:cond delay="0"/>
+                                          </p:stCondLst>
+                                        </p:cTn>
+                                        <p:tgtEl>
+                                          <p:spTgt spid="131">
+                                            <p:txEl>
+                                              <p:pRg st="3" end="3"/>
+                                            </p:txEl>
+                                          </p:spTgt>
+                                        </p:tgtEl>
+                                        <p:attrNameLst>
+                                          <p:attrName>style.visibility</p:attrName>
+                                        </p:attrNameLst>
+                                      </p:cBhvr>
+                                      <p:to>
+                                        <p:strVal val="visible"/>
+                                      </p:to>
+                                    </p:set>
+                                    <p:animEffect transition="in" filter="fade">
+                                      <p:cBhvr>
+                                        <p:cTn id="17" dur="500"/>
+                                        <p:tgtEl>
+                                          <p:spTgt spid="131">
+                                            <p:txEl>
+                                              <p:pRg st="3" end="3"/>
+                                            </p:txEl>
+                                          </p:spTgt>
+                                        </p:tgtEl>
+                                      </p:cBhvr>
+                                    </p:animEffect>
+                                  </p:childTnLst>
+                                </p:cTn>
+                              </p:par>
+                            </p:childTnLst>
+                          </p:cTn>
+                        </p:par>
+                      </p:childTnLst>
+                    </p:cTn>
+                  </p:par>
+                  <p:par>
+                    <p:cTn id="18" fill="hold">
+                      <p:stCondLst>
+                        <p:cond delay="indefinite"/>
+                      </p:stCondLst>
+                      <p:childTnLst>
+                        <p:par>
+                          <p:cTn id="19" fill="hold">
+                            <p:stCondLst>
+                              <p:cond delay="0"/>
+                            </p:stCondLst>
+                            <p:childTnLst>
+                              <p:par>
+                                <p:cTn id="20" presetID="1" presetClass="entr" presetSubtype="0" fill="hold" nodeType="clickEffect">
+                                  <p:stCondLst>
+                                    <p:cond delay="0"/>
+                                  </p:stCondLst>
+                                  <p:childTnLst>
+                                    <p:set>
+                                      <p:cBhvr>
+                                        <p:cTn id="21" dur="1" fill="hold">
+                                          <p:stCondLst>
+                                            <p:cond delay="0"/>
+                                          </p:stCondLst>
+                                        </p:cTn>
+                                        <p:tgtEl>
+                                          <p:spTgt spid="132"/>
+                                        </p:tgtEl>
+                                        <p:attrNameLst>
+                                          <p:attrName>style.visibility</p:attrName>
+                                        </p:attrNameLst>
+                                      </p:cBhvr>
+                                      <p:to>
+                                        <p:strVal val="visible"/>
+                                      </p:to>
+                                    </p:set>
+                                  </p:childTnLst>
+                                </p:cTn>
+                              </p:par>
+                            </p:childTnLst>
+                          </p:cTn>
+                        </p:par>
+                      </p:childTnLst>
+                    </p:cTn>
+                  </p:par>
+                  <p:par>
+                    <p:cTn id="22" fill="hold">
+                      <p:stCondLst>
+                        <p:cond delay="indefinite"/>
+                      </p:stCondLst>
+                      <p:childTnLst>
+                        <p:par>
+                          <p:cTn id="23" fill="hold">
+                            <p:stCondLst>
+                              <p:cond delay="0"/>
+                            </p:stCondLst>
+                            <p:childTnLst>
+                              <p:par>
+                                <p:cTn id="24" presetID="1" presetClass="entr" presetSubtype="0" fill="hold" nodeType="clickEffect">
+                                  <p:stCondLst>
+                                    <p:cond delay="0"/>
+                                  </p:stCondLst>
+                                  <p:childTnLst>
+                                    <p:set>
+                                      <p:cBhvr>
+                                        <p:cTn id="25" dur="1" fill="hold">
+                                          <p:stCondLst>
+                                            <p:cond delay="0"/>
+                                          </p:stCondLst>
+                                        </p:cTn>
+                                        <p:tgtEl>
+                                          <p:spTgt spid="133"/>
+                                        </p:tgtEl>
+                                        <p:attrNameLst>
+                                          <p:attrName>style.visibility</p:attrName>
+                                        </p:attrNameLst>
+                                      </p:cBhvr>
+                                      <p:to>
+                                        <p:strVal val="visible"/>
+                                      </p:to>
+                                    </p:set>
+                                  </p:childTnLst>
+                                </p:cTn>
+                              </p:par>
+                            </p:childTnLst>
+                          </p:cTn>
+                        </p:par>
+                      </p:childTnLst>
+                    </p:cTn>
+                  </p:par>
+                </p:childTnLst>
+              </p:cTn>
+              <p:prevCondLst>
+                <p:cond evt="onPrev" delay="0">
+                  <p:tgtEl>
+                    <p:sldTgt/>
+                  </p:tgtEl>
+                </p:cond>
+              </p:prevCondLst>
+              <p:nextCondLst>
+                <p:cond evt="onNext" delay="0">
+                  <p:tgtEl>
+                    <p:sldTgt/>
+                  </p:tgtEl>
+                </p:cond>
+              </p:nextCondLst>
+            </p:seq>
+          </p:childTnLst>
+        </p:cTn>
+      </p:par>
+    </p:tnLst>
+  </p:timing>
+</p:sld>
+</file>
+
+<file path=ppt/slides/slide11.xml><?xml version="1.0" encoding="utf-8"?>
+<p:sld xmlns:a="http://schemas.openxmlformats.org/drawingml/2006/main" xmlns:r="http://schemas.openxmlformats.org/officeDocument/2006/relationships" xmlns:p="http://schemas.openxmlformats.org/presentationml/2006/main">
+  <p:cSld>
+    <p:spTree>
+      <p:nvGrpSpPr>
+        <p:cNvPr id="1" name="Shape 126"/>
+        <p:cNvGrpSpPr/>
+        <p:nvPr/>
+      </p:nvGrpSpPr>
+      <p:grpSpPr>
+        <a:xfrm>
+          <a:off x="0" y="0"/>
+          <a:ext cx="0" cy="0"/>
+          <a:chOff x="0" y="0"/>
+          <a:chExt cx="0" cy="0"/>
+        </a:xfrm>
+      </p:grpSpPr>
+      <p:sp>
+        <p:nvSpPr>
           <p:cNvPr id="127" name="Google Shape;127;gc6d6ded6e2_0_0"/>
           <p:cNvSpPr/>
           <p:nvPr/>
@@ -22054,7 +23181,7 @@
             </a:pPr>
             <a:fld id="{00000000-1234-1234-1234-123412341234}" type="slidenum">
               <a:rPr lang="pt-BR"/>
-              <a:t>10</a:t>
+              <a:t>11</a:t>
             </a:fld>
             <a:endParaRPr/>
           </a:p>
@@ -23091,7 +24218,7 @@
         <p:spPr>
           <a:xfrm>
             <a:off x="279120" y="581548"/>
-            <a:ext cx="8321263" cy="584700"/>
+            <a:ext cx="10004132" cy="584700"/>
           </a:xfrm>
           <a:prstGeom prst="rect">
             <a:avLst/>
@@ -23134,7 +24261,7 @@
                 <a:cs typeface="Century Schoolbook"/>
                 <a:sym typeface="Century Schoolbook"/>
               </a:rPr>
-              <a:t>Modelo Lógico – Paradigma OO (UML)</a:t>
+              <a:t>Modelo Lógico – Paradigma OO x Relacional </a:t>
             </a:r>
             <a:endParaRPr sz="3200" b="1" i="0" u="none" strike="noStrike" cap="none" dirty="0">
               <a:solidFill>
@@ -23182,7 +24309,7 @@
                   <a:schemeClr val="tx1"/>
                 </a:solidFill>
               </a:rPr>
-              <a:t>-- Conceito </a:t>
+              <a:t>-- Contextualização </a:t>
             </a:r>
             <a:r>
               <a:rPr lang="pt-BR" sz="2000" b="1" dirty="0">
@@ -23789,7 +24916,7 @@
         <p:spPr>
           <a:xfrm>
             <a:off x="279120" y="581548"/>
-            <a:ext cx="8321263" cy="584700"/>
+            <a:ext cx="9404526" cy="584700"/>
           </a:xfrm>
           <a:prstGeom prst="rect">
             <a:avLst/>
@@ -23832,7 +24959,7 @@
                 <a:cs typeface="Century Schoolbook"/>
                 <a:sym typeface="Century Schoolbook"/>
               </a:rPr>
-              <a:t>Modelo Lógico – Paradigma OO (UML)</a:t>
+              <a:t>Modelo Conceitual  – Paradigma OO (UML)</a:t>
             </a:r>
             <a:endParaRPr sz="3200" b="1" i="0" u="none" strike="noStrike" cap="none" dirty="0">
               <a:solidFill>
@@ -23848,10 +24975,10 @@
       </p:sp>
       <p:pic>
         <p:nvPicPr>
-          <p:cNvPr id="5" name="Imagem 4">
+          <p:cNvPr id="3" name="Imagem 2">
             <a:extLst>
               <a:ext uri="{FF2B5EF4-FFF2-40B4-BE49-F238E27FC236}">
-                <a16:creationId xmlns:a16="http://schemas.microsoft.com/office/drawing/2014/main" id="{61EC921F-D17E-B2C3-6BB3-A6FC3D257A23}"/>
+                <a16:creationId xmlns:a16="http://schemas.microsoft.com/office/drawing/2014/main" id="{E22A13AF-9AD1-21FB-A156-D12B50E12D56}"/>
               </a:ext>
             </a:extLst>
           </p:cNvPr>
@@ -23868,8 +24995,8 @@
         </p:blipFill>
         <p:spPr>
           <a:xfrm>
-            <a:off x="409754" y="1360081"/>
-            <a:ext cx="10967686" cy="5115670"/>
+            <a:off x="409753" y="1345031"/>
+            <a:ext cx="10023833" cy="5376420"/>
           </a:xfrm>
           <a:prstGeom prst="rect">
             <a:avLst/>
@@ -23878,10 +25005,10 @@
       </p:pic>
       <p:sp>
         <p:nvSpPr>
-          <p:cNvPr id="6" name="CaixaDeTexto 5">
+          <p:cNvPr id="4" name="CaixaDeTexto 3">
             <a:extLst>
               <a:ext uri="{FF2B5EF4-FFF2-40B4-BE49-F238E27FC236}">
-                <a16:creationId xmlns:a16="http://schemas.microsoft.com/office/drawing/2014/main" id="{5104056A-2D45-7A35-C142-D2A9296CE29F}"/>
+                <a16:creationId xmlns:a16="http://schemas.microsoft.com/office/drawing/2014/main" id="{7D48CA42-3CD2-52AF-7D14-A849957D3BB9}"/>
               </a:ext>
             </a:extLst>
           </p:cNvPr>
@@ -23890,8 +25017,8 @@
         </p:nvSpPr>
         <p:spPr>
           <a:xfrm>
-            <a:off x="3396742" y="3308980"/>
-            <a:ext cx="3483647" cy="954107"/>
+            <a:off x="3306828" y="5977264"/>
+            <a:ext cx="4937763" cy="523220"/>
           </a:xfrm>
           <a:prstGeom prst="rect">
             <a:avLst/>
@@ -23910,7 +25037,7 @@
                   <a:srgbClr val="FF0000"/>
                 </a:solidFill>
               </a:rPr>
-              <a:t>Exemplo Diagrama de Classe (UML)</a:t>
+              <a:t>Exemplo Modelo Conceitual</a:t>
             </a:r>
           </a:p>
         </p:txBody>
@@ -24144,6 +25271,447 @@
             <a:fld id="{00000000-1234-1234-1234-123412341234}" type="slidenum">
               <a:rPr lang="pt-BR"/>
               <a:t>4</a:t>
+            </a:fld>
+            <a:endParaRPr/>
+          </a:p>
+        </p:txBody>
+      </p:sp>
+      <p:pic>
+        <p:nvPicPr>
+          <p:cNvPr id="99" name="Google Shape;99;g1df91a3117e_0_0"/>
+          <p:cNvPicPr preferRelativeResize="0"/>
+          <p:nvPr/>
+        </p:nvPicPr>
+        <p:blipFill rotWithShape="1">
+          <a:blip r:embed="rId3">
+            <a:alphaModFix/>
+          </a:blip>
+          <a:srcRect/>
+          <a:stretch/>
+        </p:blipFill>
+        <p:spPr>
+          <a:xfrm>
+            <a:off x="9206151" y="0"/>
+            <a:ext cx="2380082" cy="1371599"/>
+          </a:xfrm>
+          <a:prstGeom prst="rect">
+            <a:avLst/>
+          </a:prstGeom>
+          <a:noFill/>
+          <a:ln>
+            <a:noFill/>
+          </a:ln>
+        </p:spPr>
+      </p:pic>
+      <p:sp>
+        <p:nvSpPr>
+          <p:cNvPr id="100" name="Google Shape;100;g1df91a3117e_0_0"/>
+          <p:cNvSpPr/>
+          <p:nvPr/>
+        </p:nvSpPr>
+        <p:spPr>
+          <a:xfrm>
+            <a:off x="409754" y="1605781"/>
+            <a:ext cx="10988700" cy="4869970"/>
+          </a:xfrm>
+          <a:prstGeom prst="rect">
+            <a:avLst/>
+          </a:prstGeom>
+          <a:noFill/>
+          <a:ln>
+            <a:noFill/>
+          </a:ln>
+        </p:spPr>
+        <p:txBody>
+          <a:bodyPr spcFirstLastPara="1" wrap="square" lIns="91425" tIns="45700" rIns="91425" bIns="45700" anchor="t" anchorCtr="0">
+            <a:noAutofit/>
+          </a:bodyPr>
+          <a:lstStyle/>
+          <a:p>
+            <a:pPr marL="0" marR="0" lvl="0" indent="0" algn="just" rtl="0">
+              <a:lnSpc>
+                <a:spcPct val="150000"/>
+              </a:lnSpc>
+              <a:spcBef>
+                <a:spcPts val="0"/>
+              </a:spcBef>
+              <a:spcAft>
+                <a:spcPts val="0"/>
+              </a:spcAft>
+              <a:buNone/>
+            </a:pPr>
+            <a:endParaRPr sz="1800" dirty="0">
+              <a:solidFill>
+                <a:schemeClr val="dk1"/>
+              </a:solidFill>
+            </a:endParaRPr>
+          </a:p>
+        </p:txBody>
+      </p:sp>
+      <p:sp>
+        <p:nvSpPr>
+          <p:cNvPr id="101" name="Google Shape;101;g1df91a3117e_0_0"/>
+          <p:cNvSpPr/>
+          <p:nvPr/>
+        </p:nvSpPr>
+        <p:spPr>
+          <a:xfrm>
+            <a:off x="279120" y="581548"/>
+            <a:ext cx="8321263" cy="584700"/>
+          </a:xfrm>
+          <a:prstGeom prst="rect">
+            <a:avLst/>
+          </a:prstGeom>
+          <a:noFill/>
+          <a:ln>
+            <a:noFill/>
+          </a:ln>
+        </p:spPr>
+        <p:txBody>
+          <a:bodyPr spcFirstLastPara="1" wrap="square" lIns="91425" tIns="45700" rIns="91425" bIns="45700" anchor="t" anchorCtr="0">
+            <a:noAutofit/>
+          </a:bodyPr>
+          <a:lstStyle/>
+          <a:p>
+            <a:pPr marL="0" marR="0" lvl="0" indent="0" algn="l" rtl="0">
+              <a:lnSpc>
+                <a:spcPct val="100000"/>
+              </a:lnSpc>
+              <a:spcBef>
+                <a:spcPts val="0"/>
+              </a:spcBef>
+              <a:spcAft>
+                <a:spcPts val="0"/>
+              </a:spcAft>
+              <a:buClr>
+                <a:srgbClr val="000000"/>
+              </a:buClr>
+              <a:buSzPts val="3200"/>
+              <a:buFont typeface="Arial"/>
+              <a:buNone/>
+            </a:pPr>
+            <a:r>
+              <a:rPr lang="pt-BR" sz="3200" b="1" dirty="0">
+                <a:solidFill>
+                  <a:srgbClr val="FF0000"/>
+                </a:solidFill>
+                <a:latin typeface="Century Schoolbook"/>
+                <a:ea typeface="Century Schoolbook"/>
+                <a:cs typeface="Century Schoolbook"/>
+                <a:sym typeface="Century Schoolbook"/>
+              </a:rPr>
+              <a:t>Modelo Lógico – Paradigma OO (UML)</a:t>
+            </a:r>
+            <a:endParaRPr sz="3200" b="1" i="0" u="none" strike="noStrike" cap="none" dirty="0">
+              <a:solidFill>
+                <a:srgbClr val="000000"/>
+              </a:solidFill>
+              <a:latin typeface="Century Schoolbook"/>
+              <a:ea typeface="Century Schoolbook"/>
+              <a:cs typeface="Century Schoolbook"/>
+              <a:sym typeface="Century Schoolbook"/>
+            </a:endParaRPr>
+          </a:p>
+        </p:txBody>
+      </p:sp>
+      <p:pic>
+        <p:nvPicPr>
+          <p:cNvPr id="5" name="Imagem 4">
+            <a:extLst>
+              <a:ext uri="{FF2B5EF4-FFF2-40B4-BE49-F238E27FC236}">
+                <a16:creationId xmlns:a16="http://schemas.microsoft.com/office/drawing/2014/main" id="{61EC921F-D17E-B2C3-6BB3-A6FC3D257A23}"/>
+              </a:ext>
+            </a:extLst>
+          </p:cNvPr>
+          <p:cNvPicPr>
+            <a:picLocks noChangeAspect="1"/>
+          </p:cNvPicPr>
+          <p:nvPr/>
+        </p:nvPicPr>
+        <p:blipFill>
+          <a:blip r:embed="rId4"/>
+          <a:stretch>
+            <a:fillRect/>
+          </a:stretch>
+        </p:blipFill>
+        <p:spPr>
+          <a:xfrm>
+            <a:off x="409754" y="1360081"/>
+            <a:ext cx="10967686" cy="5115670"/>
+          </a:xfrm>
+          <a:prstGeom prst="rect">
+            <a:avLst/>
+          </a:prstGeom>
+        </p:spPr>
+      </p:pic>
+      <p:sp>
+        <p:nvSpPr>
+          <p:cNvPr id="6" name="CaixaDeTexto 5">
+            <a:extLst>
+              <a:ext uri="{FF2B5EF4-FFF2-40B4-BE49-F238E27FC236}">
+                <a16:creationId xmlns:a16="http://schemas.microsoft.com/office/drawing/2014/main" id="{5104056A-2D45-7A35-C142-D2A9296CE29F}"/>
+              </a:ext>
+            </a:extLst>
+          </p:cNvPr>
+          <p:cNvSpPr txBox="1"/>
+          <p:nvPr/>
+        </p:nvSpPr>
+        <p:spPr>
+          <a:xfrm>
+            <a:off x="2977023" y="3563810"/>
+            <a:ext cx="4383148" cy="523220"/>
+          </a:xfrm>
+          <a:prstGeom prst="rect">
+            <a:avLst/>
+          </a:prstGeom>
+          <a:noFill/>
+        </p:spPr>
+        <p:txBody>
+          <a:bodyPr wrap="square" rtlCol="0">
+            <a:spAutoFit/>
+          </a:bodyPr>
+          <a:lstStyle/>
+          <a:p>
+            <a:r>
+              <a:rPr lang="pt-BR" sz="2800" b="1" dirty="0">
+                <a:solidFill>
+                  <a:srgbClr val="FF0000"/>
+                </a:solidFill>
+              </a:rPr>
+              <a:t>Exemplo Modelo Lógico</a:t>
+            </a:r>
+          </a:p>
+        </p:txBody>
+      </p:sp>
+    </p:spTree>
+    <p:extLst>
+      <p:ext uri="{BB962C8B-B14F-4D97-AF65-F5344CB8AC3E}">
+        <p14:creationId xmlns:p14="http://schemas.microsoft.com/office/powerpoint/2010/main" val="857012931"/>
+      </p:ext>
+    </p:extLst>
+  </p:cSld>
+  <p:clrMapOvr>
+    <a:masterClrMapping/>
+  </p:clrMapOvr>
+  <p:timing>
+    <p:tnLst>
+      <p:par>
+        <p:cTn id="1" dur="indefinite" restart="never" nodeType="tmRoot">
+          <p:childTnLst>
+            <p:seq concurrent="1" nextAc="seek">
+              <p:cTn id="2" dur="indefinite" nodeType="mainSeq">
+                <p:childTnLst>
+                  <p:par>
+                    <p:cTn id="3" fill="hold">
+                      <p:stCondLst>
+                        <p:cond delay="indefinite"/>
+                      </p:stCondLst>
+                      <p:childTnLst>
+                        <p:par>
+                          <p:cTn id="4" fill="hold">
+                            <p:stCondLst>
+                              <p:cond delay="0"/>
+                            </p:stCondLst>
+                            <p:childTnLst>
+                              <p:par>
+                                <p:cTn id="5" presetID="10" presetClass="entr" presetSubtype="0" fill="hold" nodeType="clickEffect" nodePh="1">
+                                  <p:stCondLst>
+                                    <p:cond delay="0"/>
+                                  </p:stCondLst>
+                                  <p:endCondLst>
+                                    <p:cond evt="begin" delay="0">
+                                      <p:tn val="5"/>
+                                    </p:cond>
+                                  </p:endCondLst>
+                                  <p:childTnLst>
+                                    <p:set>
+                                      <p:cBhvr>
+                                        <p:cTn id="6" dur="1" fill="hold">
+                                          <p:stCondLst>
+                                            <p:cond delay="0"/>
+                                          </p:stCondLst>
+                                        </p:cTn>
+                                        <p:tgtEl>
+                                          <p:spTgt spid="100">
+                                            <p:txEl>
+                                              <p:pRg st="0" end="0"/>
+                                            </p:txEl>
+                                          </p:spTgt>
+                                        </p:tgtEl>
+                                        <p:attrNameLst>
+                                          <p:attrName>style.visibility</p:attrName>
+                                        </p:attrNameLst>
+                                      </p:cBhvr>
+                                      <p:to>
+                                        <p:strVal val="visible"/>
+                                      </p:to>
+                                    </p:set>
+                                    <p:animEffect transition="in" filter="fade">
+                                      <p:cBhvr>
+                                        <p:cTn id="7" dur="500"/>
+                                        <p:tgtEl>
+                                          <p:spTgt spid="100">
+                                            <p:txEl>
+                                              <p:pRg st="0" end="0"/>
+                                            </p:txEl>
+                                          </p:spTgt>
+                                        </p:tgtEl>
+                                      </p:cBhvr>
+                                    </p:animEffect>
+                                  </p:childTnLst>
+                                </p:cTn>
+                              </p:par>
+                            </p:childTnLst>
+                          </p:cTn>
+                        </p:par>
+                      </p:childTnLst>
+                    </p:cTn>
+                  </p:par>
+                </p:childTnLst>
+              </p:cTn>
+              <p:prevCondLst>
+                <p:cond evt="onPrev" delay="0">
+                  <p:tgtEl>
+                    <p:sldTgt/>
+                  </p:tgtEl>
+                </p:cond>
+              </p:prevCondLst>
+              <p:nextCondLst>
+                <p:cond evt="onNext" delay="0">
+                  <p:tgtEl>
+                    <p:sldTgt/>
+                  </p:tgtEl>
+                </p:cond>
+              </p:nextCondLst>
+            </p:seq>
+          </p:childTnLst>
+        </p:cTn>
+      </p:par>
+    </p:tnLst>
+  </p:timing>
+</p:sld>
+</file>
+
+<file path=ppt/slides/slide5.xml><?xml version="1.0" encoding="utf-8"?>
+<p:sld xmlns:a="http://schemas.openxmlformats.org/drawingml/2006/main" xmlns:r="http://schemas.openxmlformats.org/officeDocument/2006/relationships" xmlns:p="http://schemas.openxmlformats.org/presentationml/2006/main">
+  <p:cSld>
+    <p:spTree>
+      <p:nvGrpSpPr>
+        <p:cNvPr id="1" name="Shape 96"/>
+        <p:cNvGrpSpPr/>
+        <p:nvPr/>
+      </p:nvGrpSpPr>
+      <p:grpSpPr>
+        <a:xfrm>
+          <a:off x="0" y="0"/>
+          <a:ext cx="0" cy="0"/>
+          <a:chOff x="0" y="0"/>
+          <a:chExt cx="0" cy="0"/>
+        </a:xfrm>
+      </p:grpSpPr>
+      <p:sp>
+        <p:nvSpPr>
+          <p:cNvPr id="97" name="Google Shape;97;g1df91a3117e_0_0"/>
+          <p:cNvSpPr/>
+          <p:nvPr/>
+        </p:nvSpPr>
+        <p:spPr>
+          <a:xfrm>
+            <a:off x="0" y="0"/>
+            <a:ext cx="12192000" cy="1747800"/>
+          </a:xfrm>
+          <a:prstGeom prst="rect">
+            <a:avLst/>
+          </a:prstGeom>
+          <a:noFill/>
+          <a:ln>
+            <a:noFill/>
+          </a:ln>
+        </p:spPr>
+        <p:txBody>
+          <a:bodyPr spcFirstLastPara="1" wrap="square" lIns="91425" tIns="45700" rIns="91425" bIns="45700" anchor="ctr" anchorCtr="0">
+            <a:noAutofit/>
+          </a:bodyPr>
+          <a:lstStyle/>
+          <a:p>
+            <a:pPr marL="0" marR="0" lvl="0" indent="0" algn="ctr" rtl="0">
+              <a:lnSpc>
+                <a:spcPct val="100000"/>
+              </a:lnSpc>
+              <a:spcBef>
+                <a:spcPts val="0"/>
+              </a:spcBef>
+              <a:spcAft>
+                <a:spcPts val="0"/>
+              </a:spcAft>
+              <a:buClr>
+                <a:srgbClr val="000000"/>
+              </a:buClr>
+              <a:buSzPts val="1800"/>
+              <a:buFont typeface="Arial"/>
+              <a:buNone/>
+            </a:pPr>
+            <a:endParaRPr sz="1800" b="0" i="0" u="none" strike="noStrike" cap="none">
+              <a:solidFill>
+                <a:schemeClr val="lt1"/>
+              </a:solidFill>
+              <a:latin typeface="Arial"/>
+              <a:ea typeface="Arial"/>
+              <a:cs typeface="Arial"/>
+              <a:sym typeface="Arial"/>
+            </a:endParaRPr>
+          </a:p>
+        </p:txBody>
+      </p:sp>
+      <p:sp>
+        <p:nvSpPr>
+          <p:cNvPr id="98" name="Google Shape;98;g1df91a3117e_0_0"/>
+          <p:cNvSpPr txBox="1">
+            <a:spLocks noGrp="1"/>
+          </p:cNvSpPr>
+          <p:nvPr>
+            <p:ph type="sldNum" idx="12"/>
+          </p:nvPr>
+        </p:nvSpPr>
+        <p:spPr>
+          <a:xfrm>
+            <a:off x="8737600" y="6356351"/>
+            <a:ext cx="2844900" cy="365100"/>
+          </a:xfrm>
+          <a:prstGeom prst="rect">
+            <a:avLst/>
+          </a:prstGeom>
+          <a:noFill/>
+          <a:ln>
+            <a:noFill/>
+          </a:ln>
+        </p:spPr>
+        <p:txBody>
+          <a:bodyPr spcFirstLastPara="1" wrap="square" lIns="91425" tIns="45700" rIns="91425" bIns="45700" anchor="ctr" anchorCtr="0">
+            <a:noAutofit/>
+          </a:bodyPr>
+          <a:lstStyle/>
+          <a:p>
+            <a:pPr marL="0" lvl="0" indent="0" algn="r" rtl="0">
+              <a:lnSpc>
+                <a:spcPct val="100000"/>
+              </a:lnSpc>
+              <a:spcBef>
+                <a:spcPts val="0"/>
+              </a:spcBef>
+              <a:spcAft>
+                <a:spcPts val="0"/>
+              </a:spcAft>
+              <a:buClr>
+                <a:srgbClr val="000000"/>
+              </a:buClr>
+              <a:buSzPts val="1200"/>
+              <a:buFont typeface="Arial"/>
+              <a:buNone/>
+            </a:pPr>
+            <a:fld id="{00000000-1234-1234-1234-123412341234}" type="slidenum">
+              <a:rPr lang="pt-BR"/>
+              <a:t>5</a:t>
             </a:fld>
             <a:endParaRPr/>
           </a:p>
@@ -25091,7 +26659,7 @@
 </p:sld>
 </file>
 
-<file path=ppt/slides/slide5.xml><?xml version="1.0" encoding="utf-8"?>
+<file path=ppt/slides/slide6.xml><?xml version="1.0" encoding="utf-8"?>
 <p:sld xmlns:a="http://schemas.openxmlformats.org/drawingml/2006/main" xmlns:r="http://schemas.openxmlformats.org/officeDocument/2006/relationships" xmlns:p="http://schemas.openxmlformats.org/presentationml/2006/main">
   <p:cSld>
     <p:spTree>
@@ -25210,7 +26778,7 @@
             </a:pPr>
             <a:fld id="{00000000-1234-1234-1234-123412341234}" type="slidenum">
               <a:rPr lang="pt-BR"/>
-              <a:t>5</a:t>
+              <a:t>6</a:t>
             </a:fld>
             <a:endParaRPr/>
           </a:p>
@@ -25798,7 +27366,7 @@
 </p:sld>
 </file>
 
-<file path=ppt/slides/slide6.xml><?xml version="1.0" encoding="utf-8"?>
+<file path=ppt/slides/slide7.xml><?xml version="1.0" encoding="utf-8"?>
 <p:sld xmlns:a="http://schemas.openxmlformats.org/drawingml/2006/main" xmlns:r="http://schemas.openxmlformats.org/officeDocument/2006/relationships" xmlns:p="http://schemas.openxmlformats.org/presentationml/2006/main">
   <p:cSld>
     <p:spTree>
@@ -25917,7 +27485,7 @@
             </a:pPr>
             <a:fld id="{00000000-1234-1234-1234-123412341234}" type="slidenum">
               <a:rPr lang="pt-BR"/>
-              <a:t>6</a:t>
+              <a:t>7</a:t>
             </a:fld>
             <a:endParaRPr/>
           </a:p>
@@ -26703,7 +28271,7 @@
 </p:sld>
 </file>
 
-<file path=ppt/slides/slide7.xml><?xml version="1.0" encoding="utf-8"?>
+<file path=ppt/slides/slide8.xml><?xml version="1.0" encoding="utf-8"?>
 <p:sld xmlns:a="http://schemas.openxmlformats.org/drawingml/2006/main" xmlns:r="http://schemas.openxmlformats.org/officeDocument/2006/relationships" xmlns:p="http://schemas.openxmlformats.org/presentationml/2006/main">
   <p:cSld>
     <p:spTree>
@@ -26822,7 +28390,7 @@
             </a:pPr>
             <a:fld id="{00000000-1234-1234-1234-123412341234}" type="slidenum">
               <a:rPr lang="pt-BR"/>
-              <a:t>7</a:t>
+              <a:t>8</a:t>
             </a:fld>
             <a:endParaRPr/>
           </a:p>
@@ -27757,7 +29325,7 @@
 </p:sld>
 </file>
 
-<file path=ppt/slides/slide8.xml><?xml version="1.0" encoding="utf-8"?>
+<file path=ppt/slides/slide9.xml><?xml version="1.0" encoding="utf-8"?>
 <p:sld xmlns:a="http://schemas.openxmlformats.org/drawingml/2006/main" xmlns:r="http://schemas.openxmlformats.org/officeDocument/2006/relationships" xmlns:p="http://schemas.openxmlformats.org/presentationml/2006/main">
   <p:cSld>
     <p:spTree>
@@ -27876,7 +29444,7 @@
             </a:pPr>
             <a:fld id="{00000000-1234-1234-1234-123412341234}" type="slidenum">
               <a:rPr lang="pt-BR"/>
-              <a:t>8</a:t>
+              <a:t>9</a:t>
             </a:fld>
             <a:endParaRPr/>
           </a:p>
@@ -28472,931 +30040,6 @@
                                         </p:tgtEl>
                                       </p:cBhvr>
                                     </p:animEffect>
-                                  </p:childTnLst>
-                                </p:cTn>
-                              </p:par>
-                            </p:childTnLst>
-                          </p:cTn>
-                        </p:par>
-                      </p:childTnLst>
-                    </p:cTn>
-                  </p:par>
-                </p:childTnLst>
-              </p:cTn>
-              <p:prevCondLst>
-                <p:cond evt="onPrev" delay="0">
-                  <p:tgtEl>
-                    <p:sldTgt/>
-                  </p:tgtEl>
-                </p:cond>
-              </p:prevCondLst>
-              <p:nextCondLst>
-                <p:cond evt="onNext" delay="0">
-                  <p:tgtEl>
-                    <p:sldTgt/>
-                  </p:tgtEl>
-                </p:cond>
-              </p:nextCondLst>
-            </p:seq>
-          </p:childTnLst>
-        </p:cTn>
-      </p:par>
-    </p:tnLst>
-  </p:timing>
-</p:sld>
-</file>
-
-<file path=ppt/slides/slide9.xml><?xml version="1.0" encoding="utf-8"?>
-<p:sld xmlns:a="http://schemas.openxmlformats.org/drawingml/2006/main" xmlns:r="http://schemas.openxmlformats.org/officeDocument/2006/relationships" xmlns:p="http://schemas.openxmlformats.org/presentationml/2006/main">
-  <p:cSld>
-    <p:spTree>
-      <p:nvGrpSpPr>
-        <p:cNvPr id="1" name="Shape 126"/>
-        <p:cNvGrpSpPr/>
-        <p:nvPr/>
-      </p:nvGrpSpPr>
-      <p:grpSpPr>
-        <a:xfrm>
-          <a:off x="0" y="0"/>
-          <a:ext cx="0" cy="0"/>
-          <a:chOff x="0" y="0"/>
-          <a:chExt cx="0" cy="0"/>
-        </a:xfrm>
-      </p:grpSpPr>
-      <p:sp>
-        <p:nvSpPr>
-          <p:cNvPr id="127" name="Google Shape;127;gc6d6ded6e2_0_9"/>
-          <p:cNvSpPr/>
-          <p:nvPr/>
-        </p:nvSpPr>
-        <p:spPr>
-          <a:xfrm>
-            <a:off x="0" y="0"/>
-            <a:ext cx="12192000" cy="1747800"/>
-          </a:xfrm>
-          <a:prstGeom prst="rect">
-            <a:avLst/>
-          </a:prstGeom>
-          <a:noFill/>
-          <a:ln>
-            <a:noFill/>
-          </a:ln>
-        </p:spPr>
-        <p:txBody>
-          <a:bodyPr spcFirstLastPara="1" wrap="square" lIns="91425" tIns="45700" rIns="91425" bIns="45700" anchor="ctr" anchorCtr="0">
-            <a:noAutofit/>
-          </a:bodyPr>
-          <a:lstStyle/>
-          <a:p>
-            <a:pPr marL="0" marR="0" lvl="0" indent="0" algn="ctr" rtl="0">
-              <a:lnSpc>
-                <a:spcPct val="100000"/>
-              </a:lnSpc>
-              <a:spcBef>
-                <a:spcPts val="0"/>
-              </a:spcBef>
-              <a:spcAft>
-                <a:spcPts val="0"/>
-              </a:spcAft>
-              <a:buClr>
-                <a:srgbClr val="000000"/>
-              </a:buClr>
-              <a:buSzPts val="1800"/>
-              <a:buFont typeface="Arial"/>
-              <a:buNone/>
-            </a:pPr>
-            <a:endParaRPr sz="1800" b="0" i="0" u="none" strike="noStrike" cap="none">
-              <a:solidFill>
-                <a:schemeClr val="lt1"/>
-              </a:solidFill>
-              <a:latin typeface="Arial"/>
-              <a:ea typeface="Arial"/>
-              <a:cs typeface="Arial"/>
-              <a:sym typeface="Arial"/>
-            </a:endParaRPr>
-          </a:p>
-        </p:txBody>
-      </p:sp>
-      <p:sp>
-        <p:nvSpPr>
-          <p:cNvPr id="128" name="Google Shape;128;gc6d6ded6e2_0_9"/>
-          <p:cNvSpPr txBox="1">
-            <a:spLocks noGrp="1"/>
-          </p:cNvSpPr>
-          <p:nvPr>
-            <p:ph type="sldNum" idx="12"/>
-          </p:nvPr>
-        </p:nvSpPr>
-        <p:spPr>
-          <a:xfrm>
-            <a:off x="8737600" y="6356351"/>
-            <a:ext cx="2844900" cy="365100"/>
-          </a:xfrm>
-          <a:prstGeom prst="rect">
-            <a:avLst/>
-          </a:prstGeom>
-          <a:noFill/>
-          <a:ln>
-            <a:noFill/>
-          </a:ln>
-        </p:spPr>
-        <p:txBody>
-          <a:bodyPr spcFirstLastPara="1" wrap="square" lIns="91425" tIns="45700" rIns="91425" bIns="45700" anchor="ctr" anchorCtr="0">
-            <a:noAutofit/>
-          </a:bodyPr>
-          <a:lstStyle/>
-          <a:p>
-            <a:pPr marL="0" lvl="0" indent="0" algn="r" rtl="0">
-              <a:lnSpc>
-                <a:spcPct val="100000"/>
-              </a:lnSpc>
-              <a:spcBef>
-                <a:spcPts val="0"/>
-              </a:spcBef>
-              <a:spcAft>
-                <a:spcPts val="0"/>
-              </a:spcAft>
-              <a:buClr>
-                <a:srgbClr val="000000"/>
-              </a:buClr>
-              <a:buSzPts val="1200"/>
-              <a:buFont typeface="Arial"/>
-              <a:buNone/>
-            </a:pPr>
-            <a:fld id="{00000000-1234-1234-1234-123412341234}" type="slidenum">
-              <a:rPr lang="pt-BR"/>
-              <a:t>9</a:t>
-            </a:fld>
-            <a:endParaRPr/>
-          </a:p>
-        </p:txBody>
-      </p:sp>
-      <p:sp>
-        <p:nvSpPr>
-          <p:cNvPr id="129" name="Google Shape;129;gc6d6ded6e2_0_9"/>
-          <p:cNvSpPr/>
-          <p:nvPr/>
-        </p:nvSpPr>
-        <p:spPr>
-          <a:xfrm>
-            <a:off x="316401" y="220250"/>
-            <a:ext cx="8960100" cy="584700"/>
-          </a:xfrm>
-          <a:prstGeom prst="rect">
-            <a:avLst/>
-          </a:prstGeom>
-          <a:noFill/>
-          <a:ln>
-            <a:noFill/>
-          </a:ln>
-        </p:spPr>
-        <p:txBody>
-          <a:bodyPr spcFirstLastPara="1" wrap="square" lIns="91425" tIns="45700" rIns="91425" bIns="45700" anchor="t" anchorCtr="0">
-            <a:noAutofit/>
-          </a:bodyPr>
-          <a:lstStyle/>
-          <a:p>
-            <a:pPr marL="0" marR="0" lvl="0" indent="0" algn="l" rtl="0">
-              <a:lnSpc>
-                <a:spcPct val="100000"/>
-              </a:lnSpc>
-              <a:spcBef>
-                <a:spcPts val="0"/>
-              </a:spcBef>
-              <a:spcAft>
-                <a:spcPts val="0"/>
-              </a:spcAft>
-              <a:buClr>
-                <a:srgbClr val="000000"/>
-              </a:buClr>
-              <a:buSzPts val="3200"/>
-              <a:buFont typeface="Arial"/>
-              <a:buNone/>
-            </a:pPr>
-            <a:r>
-              <a:rPr lang="pt-BR" sz="3200" b="1" i="0" u="none" strike="noStrike" cap="none">
-                <a:solidFill>
-                  <a:srgbClr val="FF0000"/>
-                </a:solidFill>
-                <a:latin typeface="Century Schoolbook"/>
-                <a:ea typeface="Century Schoolbook"/>
-                <a:cs typeface="Century Schoolbook"/>
-                <a:sym typeface="Century Schoolbook"/>
-              </a:rPr>
-              <a:t>Atividade Aula: Modelo Lógico</a:t>
-            </a:r>
-            <a:endParaRPr sz="3200" b="1" i="0" u="none" strike="noStrike" cap="none">
-              <a:solidFill>
-                <a:srgbClr val="FF0000"/>
-              </a:solidFill>
-              <a:latin typeface="Century Schoolbook"/>
-              <a:ea typeface="Century Schoolbook"/>
-              <a:cs typeface="Century Schoolbook"/>
-              <a:sym typeface="Century Schoolbook"/>
-            </a:endParaRPr>
-          </a:p>
-        </p:txBody>
-      </p:sp>
-      <p:pic>
-        <p:nvPicPr>
-          <p:cNvPr id="130" name="Google Shape;130;gc6d6ded6e2_0_9"/>
-          <p:cNvPicPr preferRelativeResize="0"/>
-          <p:nvPr/>
-        </p:nvPicPr>
-        <p:blipFill rotWithShape="1">
-          <a:blip r:embed="rId3">
-            <a:alphaModFix/>
-          </a:blip>
-          <a:srcRect/>
-          <a:stretch/>
-        </p:blipFill>
-        <p:spPr>
-          <a:xfrm>
-            <a:off x="9206151" y="0"/>
-            <a:ext cx="2380082" cy="1371599"/>
-          </a:xfrm>
-          <a:prstGeom prst="rect">
-            <a:avLst/>
-          </a:prstGeom>
-          <a:noFill/>
-          <a:ln>
-            <a:noFill/>
-          </a:ln>
-        </p:spPr>
-      </p:pic>
-      <p:sp>
-        <p:nvSpPr>
-          <p:cNvPr id="131" name="Google Shape;131;gc6d6ded6e2_0_9"/>
-          <p:cNvSpPr/>
-          <p:nvPr/>
-        </p:nvSpPr>
-        <p:spPr>
-          <a:xfrm>
-            <a:off x="493235" y="1225072"/>
-            <a:ext cx="11089200" cy="5412678"/>
-          </a:xfrm>
-          <a:prstGeom prst="rect">
-            <a:avLst/>
-          </a:prstGeom>
-          <a:noFill/>
-          <a:ln>
-            <a:noFill/>
-          </a:ln>
-        </p:spPr>
-        <p:txBody>
-          <a:bodyPr spcFirstLastPara="1" wrap="square" lIns="91425" tIns="45700" rIns="91425" bIns="45700" anchor="t" anchorCtr="0">
-            <a:noAutofit/>
-          </a:bodyPr>
-          <a:lstStyle/>
-          <a:p>
-            <a:pPr marL="0" marR="0" lvl="0" indent="0" algn="just" rtl="0">
-              <a:lnSpc>
-                <a:spcPct val="150000"/>
-              </a:lnSpc>
-              <a:spcBef>
-                <a:spcPts val="0"/>
-              </a:spcBef>
-              <a:spcAft>
-                <a:spcPts val="0"/>
-              </a:spcAft>
-              <a:buClr>
-                <a:srgbClr val="000000"/>
-              </a:buClr>
-              <a:buSzPts val="1800"/>
-              <a:buFont typeface="Arial"/>
-              <a:buNone/>
-            </a:pPr>
-            <a:r>
-              <a:rPr lang="pt-BR" sz="1800" b="0" i="0" u="none" strike="noStrike" cap="none" dirty="0">
-                <a:solidFill>
-                  <a:schemeClr val="dk1"/>
-                </a:solidFill>
-                <a:latin typeface="Arial"/>
-                <a:ea typeface="Arial"/>
-                <a:cs typeface="Arial"/>
-                <a:sym typeface="Arial"/>
-              </a:rPr>
-              <a:t>- Detalhe mais o diagrama criado transforma-o em um </a:t>
-            </a:r>
-            <a:r>
-              <a:rPr lang="pt-BR" sz="1800" b="1" i="0" u="none" strike="noStrike" cap="none" dirty="0">
-                <a:solidFill>
-                  <a:schemeClr val="dk1"/>
-                </a:solidFill>
-                <a:latin typeface="Arial"/>
-                <a:ea typeface="Arial"/>
-                <a:cs typeface="Arial"/>
-                <a:sym typeface="Arial"/>
-              </a:rPr>
-              <a:t>Modelo Lógico</a:t>
-            </a:r>
-            <a:r>
-              <a:rPr lang="pt-BR" sz="1800" b="0" i="0" u="none" strike="noStrike" cap="none" dirty="0">
-                <a:solidFill>
-                  <a:schemeClr val="dk1"/>
-                </a:solidFill>
-                <a:latin typeface="Arial"/>
-                <a:ea typeface="Arial"/>
-                <a:cs typeface="Arial"/>
-                <a:sym typeface="Arial"/>
-              </a:rPr>
-              <a:t>. Para isto, apresente os atributos e domínios das entidades definidas.</a:t>
-            </a:r>
-            <a:endParaRPr sz="1800" b="0" i="0" u="none" strike="noStrike" cap="none" dirty="0">
-              <a:solidFill>
-                <a:schemeClr val="dk1"/>
-              </a:solidFill>
-              <a:latin typeface="Arial"/>
-              <a:ea typeface="Arial"/>
-              <a:cs typeface="Arial"/>
-              <a:sym typeface="Arial"/>
-            </a:endParaRPr>
-          </a:p>
-          <a:p>
-            <a:pPr marL="0" marR="0" lvl="0" indent="0" algn="just" rtl="0">
-              <a:lnSpc>
-                <a:spcPct val="150000"/>
-              </a:lnSpc>
-              <a:spcBef>
-                <a:spcPts val="0"/>
-              </a:spcBef>
-              <a:spcAft>
-                <a:spcPts val="0"/>
-              </a:spcAft>
-              <a:buClr>
-                <a:srgbClr val="000000"/>
-              </a:buClr>
-              <a:buSzPts val="1800"/>
-              <a:buFont typeface="Arial"/>
-              <a:buNone/>
-            </a:pPr>
-            <a:endParaRPr sz="1800" b="0" i="0" u="none" strike="noStrike" cap="none" dirty="0">
-              <a:solidFill>
-                <a:schemeClr val="dk1"/>
-              </a:solidFill>
-              <a:latin typeface="Arial"/>
-              <a:ea typeface="Arial"/>
-              <a:cs typeface="Arial"/>
-              <a:sym typeface="Arial"/>
-            </a:endParaRPr>
-          </a:p>
-          <a:p>
-            <a:pPr marL="285750" marR="0" lvl="0" indent="-285750" algn="just" rtl="0">
-              <a:lnSpc>
-                <a:spcPct val="150000"/>
-              </a:lnSpc>
-              <a:spcBef>
-                <a:spcPts val="0"/>
-              </a:spcBef>
-              <a:spcAft>
-                <a:spcPts val="0"/>
-              </a:spcAft>
-              <a:buClr>
-                <a:srgbClr val="000000"/>
-              </a:buClr>
-              <a:buSzPts val="1800"/>
-              <a:buFontTx/>
-              <a:buChar char="-"/>
-            </a:pPr>
-            <a:r>
-              <a:rPr lang="pt-BR" sz="1800" b="0" i="0" u="none" strike="noStrike" cap="none" dirty="0">
-                <a:solidFill>
-                  <a:schemeClr val="dk1"/>
-                </a:solidFill>
-                <a:latin typeface="Arial"/>
-                <a:ea typeface="Arial"/>
-                <a:cs typeface="Arial"/>
-                <a:sym typeface="Arial"/>
-              </a:rPr>
-              <a:t>Para cada uma das entidades envolvidas no </a:t>
-            </a:r>
-            <a:r>
-              <a:rPr lang="pt-BR" sz="1800" b="1" i="0" u="none" strike="noStrike" cap="none" dirty="0">
-                <a:solidFill>
-                  <a:schemeClr val="dk1"/>
-                </a:solidFill>
-                <a:latin typeface="Arial"/>
-                <a:ea typeface="Arial"/>
-                <a:cs typeface="Arial"/>
-                <a:sym typeface="Arial"/>
-              </a:rPr>
-              <a:t>modelo lógico</a:t>
-            </a:r>
-            <a:r>
-              <a:rPr lang="pt-BR" sz="1800" b="0" i="0" u="none" strike="noStrike" cap="none" dirty="0">
-                <a:solidFill>
-                  <a:schemeClr val="dk1"/>
-                </a:solidFill>
-                <a:latin typeface="Arial"/>
-                <a:ea typeface="Arial"/>
-                <a:cs typeface="Arial"/>
-                <a:sym typeface="Arial"/>
-              </a:rPr>
-              <a:t>, defina a chave primária e estrangeira (se houver). </a:t>
-            </a:r>
-          </a:p>
-          <a:p>
-            <a:pPr marL="285750" indent="-285750" algn="just">
-              <a:lnSpc>
-                <a:spcPct val="150000"/>
-              </a:lnSpc>
-              <a:buSzPts val="1800"/>
-              <a:buFontTx/>
-              <a:buChar char="-"/>
-            </a:pPr>
-            <a:r>
-              <a:rPr lang="pt-BR" sz="1800" dirty="0">
-                <a:solidFill>
-                  <a:schemeClr val="dk1"/>
-                </a:solidFill>
-              </a:rPr>
-              <a:t>Apresente o modelo lógico feito explicando as cardinalidades e definições de chaves.</a:t>
-            </a:r>
-            <a:endParaRPr lang="pt-BR" dirty="0"/>
-          </a:p>
-          <a:p>
-            <a:pPr marL="285750" marR="0" lvl="0" indent="-285750" algn="just" rtl="0">
-              <a:lnSpc>
-                <a:spcPct val="150000"/>
-              </a:lnSpc>
-              <a:spcBef>
-                <a:spcPts val="0"/>
-              </a:spcBef>
-              <a:spcAft>
-                <a:spcPts val="0"/>
-              </a:spcAft>
-              <a:buClr>
-                <a:srgbClr val="000000"/>
-              </a:buClr>
-              <a:buSzPts val="1800"/>
-              <a:buFontTx/>
-              <a:buChar char="-"/>
-            </a:pPr>
-            <a:endParaRPr lang="pt-BR" sz="1800" b="0" i="0" u="none" strike="noStrike" cap="none" dirty="0">
-              <a:solidFill>
-                <a:schemeClr val="dk1"/>
-              </a:solidFill>
-              <a:latin typeface="Arial"/>
-              <a:ea typeface="Arial"/>
-              <a:cs typeface="Arial"/>
-              <a:sym typeface="Arial"/>
-            </a:endParaRPr>
-          </a:p>
-          <a:p>
-            <a:pPr marL="285750" marR="0" lvl="0" indent="-285750" algn="just" rtl="0">
-              <a:lnSpc>
-                <a:spcPct val="150000"/>
-              </a:lnSpc>
-              <a:spcBef>
-                <a:spcPts val="0"/>
-              </a:spcBef>
-              <a:spcAft>
-                <a:spcPts val="0"/>
-              </a:spcAft>
-              <a:buClr>
-                <a:srgbClr val="000000"/>
-              </a:buClr>
-              <a:buSzPts val="1800"/>
-              <a:buFontTx/>
-              <a:buChar char="-"/>
-            </a:pPr>
-            <a:endParaRPr lang="pt-BR" sz="1800" b="0" i="0" u="none" strike="noStrike" cap="none" dirty="0">
-              <a:solidFill>
-                <a:schemeClr val="dk1"/>
-              </a:solidFill>
-              <a:latin typeface="Arial"/>
-              <a:ea typeface="Arial"/>
-              <a:cs typeface="Arial"/>
-              <a:sym typeface="Arial"/>
-            </a:endParaRPr>
-          </a:p>
-          <a:p>
-            <a:pPr marL="0" marR="0" lvl="0" indent="0" algn="just" rtl="0">
-              <a:lnSpc>
-                <a:spcPct val="150000"/>
-              </a:lnSpc>
-              <a:spcBef>
-                <a:spcPts val="0"/>
-              </a:spcBef>
-              <a:spcAft>
-                <a:spcPts val="0"/>
-              </a:spcAft>
-              <a:buClr>
-                <a:srgbClr val="000000"/>
-              </a:buClr>
-              <a:buSzPts val="1800"/>
-              <a:buFont typeface="Arial"/>
-              <a:buNone/>
-            </a:pPr>
-            <a:endParaRPr sz="1800" b="0" i="0" u="none" strike="noStrike" cap="none" dirty="0">
-              <a:solidFill>
-                <a:schemeClr val="dk1"/>
-              </a:solidFill>
-              <a:latin typeface="Arial"/>
-              <a:ea typeface="Arial"/>
-              <a:cs typeface="Arial"/>
-              <a:sym typeface="Arial"/>
-            </a:endParaRPr>
-          </a:p>
-        </p:txBody>
-      </p:sp>
-      <p:pic>
-        <p:nvPicPr>
-          <p:cNvPr id="132" name="Google Shape;132;gc6d6ded6e2_0_9" descr="Uma imagem contendo captura de tela&#10;&#10;Descrição gerada com muito alta confiança"/>
-          <p:cNvPicPr preferRelativeResize="0"/>
-          <p:nvPr/>
-        </p:nvPicPr>
-        <p:blipFill rotWithShape="1">
-          <a:blip r:embed="rId4">
-            <a:alphaModFix/>
-          </a:blip>
-          <a:srcRect/>
-          <a:stretch/>
-        </p:blipFill>
-        <p:spPr>
-          <a:xfrm>
-            <a:off x="4753007" y="4277744"/>
-            <a:ext cx="5440304" cy="2360006"/>
-          </a:xfrm>
-          <a:prstGeom prst="rect">
-            <a:avLst/>
-          </a:prstGeom>
-          <a:noFill/>
-          <a:ln>
-            <a:noFill/>
-          </a:ln>
-        </p:spPr>
-      </p:pic>
-      <p:pic>
-        <p:nvPicPr>
-          <p:cNvPr id="133" name="Google Shape;133;gc6d6ded6e2_0_9" descr="Uma imagem contendo captura de tela&#10;&#10;Descrição gerada com muito alta confiança"/>
-          <p:cNvPicPr preferRelativeResize="0"/>
-          <p:nvPr/>
-        </p:nvPicPr>
-        <p:blipFill rotWithShape="1">
-          <a:blip r:embed="rId5">
-            <a:alphaModFix/>
-          </a:blip>
-          <a:srcRect/>
-          <a:stretch/>
-        </p:blipFill>
-        <p:spPr>
-          <a:xfrm>
-            <a:off x="886986" y="4689262"/>
-            <a:ext cx="2743200" cy="1667089"/>
-          </a:xfrm>
-          <a:prstGeom prst="rect">
-            <a:avLst/>
-          </a:prstGeom>
-          <a:noFill/>
-          <a:ln>
-            <a:noFill/>
-          </a:ln>
-        </p:spPr>
-      </p:pic>
-      <p:sp>
-        <p:nvSpPr>
-          <p:cNvPr id="134" name="Google Shape;134;gc6d6ded6e2_0_9"/>
-          <p:cNvSpPr txBox="1"/>
-          <p:nvPr/>
-        </p:nvSpPr>
-        <p:spPr>
-          <a:xfrm>
-            <a:off x="609565" y="4009493"/>
-            <a:ext cx="11292625" cy="646300"/>
-          </a:xfrm>
-          <a:prstGeom prst="rect">
-            <a:avLst/>
-          </a:prstGeom>
-          <a:noFill/>
-          <a:ln>
-            <a:noFill/>
-          </a:ln>
-        </p:spPr>
-        <p:txBody>
-          <a:bodyPr spcFirstLastPara="1" wrap="square" lIns="91425" tIns="91425" rIns="91425" bIns="91425" anchor="t" anchorCtr="0">
-            <a:spAutoFit/>
-          </a:bodyPr>
-          <a:lstStyle/>
-          <a:p>
-            <a:pPr marL="0" marR="0" lvl="0" indent="0" algn="just" rtl="0">
-              <a:lnSpc>
-                <a:spcPct val="150000"/>
-              </a:lnSpc>
-              <a:spcBef>
-                <a:spcPts val="0"/>
-              </a:spcBef>
-              <a:spcAft>
-                <a:spcPts val="0"/>
-              </a:spcAft>
-              <a:buClr>
-                <a:srgbClr val="000000"/>
-              </a:buClr>
-              <a:buSzPts val="1800"/>
-              <a:buFont typeface="Arial"/>
-              <a:buNone/>
-            </a:pPr>
-            <a:r>
-              <a:rPr lang="pt-BR" sz="2000" b="1" i="0" u="none" strike="noStrike" cap="none" dirty="0">
-                <a:solidFill>
-                  <a:srgbClr val="000000"/>
-                </a:solidFill>
-                <a:latin typeface="Arial"/>
-                <a:ea typeface="Arial"/>
-                <a:cs typeface="Arial"/>
-                <a:sym typeface="Arial"/>
-              </a:rPr>
-              <a:t>Exemplo de Modelo Lógico:</a:t>
-            </a:r>
-            <a:endParaRPr sz="2000" b="1" i="0" u="none" strike="noStrike" cap="none" dirty="0">
-              <a:solidFill>
-                <a:srgbClr val="000000"/>
-              </a:solidFill>
-              <a:latin typeface="Arial"/>
-              <a:ea typeface="Arial"/>
-              <a:cs typeface="Arial"/>
-              <a:sym typeface="Arial"/>
-            </a:endParaRPr>
-          </a:p>
-        </p:txBody>
-      </p:sp>
-    </p:spTree>
-  </p:cSld>
-  <p:clrMapOvr>
-    <a:masterClrMapping/>
-  </p:clrMapOvr>
-  <p:timing>
-    <p:tnLst>
-      <p:par>
-        <p:cTn id="1" dur="indefinite" restart="never" nodeType="tmRoot">
-          <p:childTnLst>
-            <p:seq concurrent="1" nextAc="seek">
-              <p:cTn id="2" dur="indefinite" nodeType="mainSeq">
-                <p:childTnLst>
-                  <p:par>
-                    <p:cTn id="3" fill="hold">
-                      <p:stCondLst>
-                        <p:cond delay="indefinite"/>
-                      </p:stCondLst>
-                      <p:childTnLst>
-                        <p:par>
-                          <p:cTn id="4" fill="hold">
-                            <p:stCondLst>
-                              <p:cond delay="0"/>
-                            </p:stCondLst>
-                            <p:childTnLst>
-                              <p:par>
-                                <p:cTn id="5" presetID="10" presetClass="entr" presetSubtype="0" fill="hold" nodeType="clickEffect">
-                                  <p:stCondLst>
-                                    <p:cond delay="0"/>
-                                  </p:stCondLst>
-                                  <p:childTnLst>
-                                    <p:set>
-                                      <p:cBhvr>
-                                        <p:cTn id="6" dur="1" fill="hold">
-                                          <p:stCondLst>
-                                            <p:cond delay="0"/>
-                                          </p:stCondLst>
-                                        </p:cTn>
-                                        <p:tgtEl>
-                                          <p:spTgt spid="131">
-                                            <p:txEl>
-                                              <p:pRg st="0" end="0"/>
-                                            </p:txEl>
-                                          </p:spTgt>
-                                        </p:tgtEl>
-                                        <p:attrNameLst>
-                                          <p:attrName>style.visibility</p:attrName>
-                                        </p:attrNameLst>
-                                      </p:cBhvr>
-                                      <p:to>
-                                        <p:strVal val="visible"/>
-                                      </p:to>
-                                    </p:set>
-                                    <p:animEffect transition="in" filter="fade">
-                                      <p:cBhvr>
-                                        <p:cTn id="7" dur="500"/>
-                                        <p:tgtEl>
-                                          <p:spTgt spid="131">
-                                            <p:txEl>
-                                              <p:pRg st="0" end="0"/>
-                                            </p:txEl>
-                                          </p:spTgt>
-                                        </p:tgtEl>
-                                      </p:cBhvr>
-                                    </p:animEffect>
-                                  </p:childTnLst>
-                                </p:cTn>
-                              </p:par>
-                            </p:childTnLst>
-                          </p:cTn>
-                        </p:par>
-                      </p:childTnLst>
-                    </p:cTn>
-                  </p:par>
-                  <p:par>
-                    <p:cTn id="8" fill="hold">
-                      <p:stCondLst>
-                        <p:cond delay="indefinite"/>
-                      </p:stCondLst>
-                      <p:childTnLst>
-                        <p:par>
-                          <p:cTn id="9" fill="hold">
-                            <p:stCondLst>
-                              <p:cond delay="0"/>
-                            </p:stCondLst>
-                            <p:childTnLst>
-                              <p:par>
-                                <p:cTn id="10" presetID="10" presetClass="entr" presetSubtype="0" fill="hold" nodeType="clickEffect">
-                                  <p:stCondLst>
-                                    <p:cond delay="0"/>
-                                  </p:stCondLst>
-                                  <p:childTnLst>
-                                    <p:set>
-                                      <p:cBhvr>
-                                        <p:cTn id="11" dur="1" fill="hold">
-                                          <p:stCondLst>
-                                            <p:cond delay="0"/>
-                                          </p:stCondLst>
-                                        </p:cTn>
-                                        <p:tgtEl>
-                                          <p:spTgt spid="131">
-                                            <p:txEl>
-                                              <p:pRg st="2" end="2"/>
-                                            </p:txEl>
-                                          </p:spTgt>
-                                        </p:tgtEl>
-                                        <p:attrNameLst>
-                                          <p:attrName>style.visibility</p:attrName>
-                                        </p:attrNameLst>
-                                      </p:cBhvr>
-                                      <p:to>
-                                        <p:strVal val="visible"/>
-                                      </p:to>
-                                    </p:set>
-                                    <p:animEffect transition="in" filter="fade">
-                                      <p:cBhvr>
-                                        <p:cTn id="12" dur="500"/>
-                                        <p:tgtEl>
-                                          <p:spTgt spid="131">
-                                            <p:txEl>
-                                              <p:pRg st="2" end="2"/>
-                                            </p:txEl>
-                                          </p:spTgt>
-                                        </p:tgtEl>
-                                      </p:cBhvr>
-                                    </p:animEffect>
-                                  </p:childTnLst>
-                                </p:cTn>
-                              </p:par>
-                            </p:childTnLst>
-                          </p:cTn>
-                        </p:par>
-                      </p:childTnLst>
-                    </p:cTn>
-                  </p:par>
-                  <p:par>
-                    <p:cTn id="13" fill="hold">
-                      <p:stCondLst>
-                        <p:cond delay="indefinite"/>
-                      </p:stCondLst>
-                      <p:childTnLst>
-                        <p:par>
-                          <p:cTn id="14" fill="hold">
-                            <p:stCondLst>
-                              <p:cond delay="0"/>
-                            </p:stCondLst>
-                            <p:childTnLst>
-                              <p:par>
-                                <p:cTn id="15" presetID="10" presetClass="entr" presetSubtype="0" fill="hold" nodeType="clickEffect">
-                                  <p:stCondLst>
-                                    <p:cond delay="0"/>
-                                  </p:stCondLst>
-                                  <p:childTnLst>
-                                    <p:set>
-                                      <p:cBhvr>
-                                        <p:cTn id="16" dur="1" fill="hold">
-                                          <p:stCondLst>
-                                            <p:cond delay="0"/>
-                                          </p:stCondLst>
-                                        </p:cTn>
-                                        <p:tgtEl>
-                                          <p:spTgt spid="131">
-                                            <p:txEl>
-                                              <p:pRg st="3" end="3"/>
-                                            </p:txEl>
-                                          </p:spTgt>
-                                        </p:tgtEl>
-                                        <p:attrNameLst>
-                                          <p:attrName>style.visibility</p:attrName>
-                                        </p:attrNameLst>
-                                      </p:cBhvr>
-                                      <p:to>
-                                        <p:strVal val="visible"/>
-                                      </p:to>
-                                    </p:set>
-                                    <p:animEffect transition="in" filter="fade">
-                                      <p:cBhvr>
-                                        <p:cTn id="17" dur="500"/>
-                                        <p:tgtEl>
-                                          <p:spTgt spid="131">
-                                            <p:txEl>
-                                              <p:pRg st="3" end="3"/>
-                                            </p:txEl>
-                                          </p:spTgt>
-                                        </p:tgtEl>
-                                      </p:cBhvr>
-                                    </p:animEffect>
-                                  </p:childTnLst>
-                                </p:cTn>
-                              </p:par>
-                            </p:childTnLst>
-                          </p:cTn>
-                        </p:par>
-                      </p:childTnLst>
-                    </p:cTn>
-                  </p:par>
-                  <p:par>
-                    <p:cTn id="18" fill="hold">
-                      <p:stCondLst>
-                        <p:cond delay="indefinite"/>
-                      </p:stCondLst>
-                      <p:childTnLst>
-                        <p:par>
-                          <p:cTn id="19" fill="hold">
-                            <p:stCondLst>
-                              <p:cond delay="0"/>
-                            </p:stCondLst>
-                            <p:childTnLst>
-                              <p:par>
-                                <p:cTn id="20" presetID="1" presetClass="entr" presetSubtype="0" fill="hold" nodeType="clickEffect">
-                                  <p:stCondLst>
-                                    <p:cond delay="0"/>
-                                  </p:stCondLst>
-                                  <p:childTnLst>
-                                    <p:set>
-                                      <p:cBhvr>
-                                        <p:cTn id="21" dur="1" fill="hold">
-                                          <p:stCondLst>
-                                            <p:cond delay="0"/>
-                                          </p:stCondLst>
-                                        </p:cTn>
-                                        <p:tgtEl>
-                                          <p:spTgt spid="132"/>
-                                        </p:tgtEl>
-                                        <p:attrNameLst>
-                                          <p:attrName>style.visibility</p:attrName>
-                                        </p:attrNameLst>
-                                      </p:cBhvr>
-                                      <p:to>
-                                        <p:strVal val="visible"/>
-                                      </p:to>
-                                    </p:set>
-                                  </p:childTnLst>
-                                </p:cTn>
-                              </p:par>
-                            </p:childTnLst>
-                          </p:cTn>
-                        </p:par>
-                      </p:childTnLst>
-                    </p:cTn>
-                  </p:par>
-                  <p:par>
-                    <p:cTn id="22" fill="hold">
-                      <p:stCondLst>
-                        <p:cond delay="indefinite"/>
-                      </p:stCondLst>
-                      <p:childTnLst>
-                        <p:par>
-                          <p:cTn id="23" fill="hold">
-                            <p:stCondLst>
-                              <p:cond delay="0"/>
-                            </p:stCondLst>
-                            <p:childTnLst>
-                              <p:par>
-                                <p:cTn id="24" presetID="1" presetClass="entr" presetSubtype="0" fill="hold" nodeType="clickEffect">
-                                  <p:stCondLst>
-                                    <p:cond delay="0"/>
-                                  </p:stCondLst>
-                                  <p:childTnLst>
-                                    <p:set>
-                                      <p:cBhvr>
-                                        <p:cTn id="25" dur="1" fill="hold">
-                                          <p:stCondLst>
-                                            <p:cond delay="0"/>
-                                          </p:stCondLst>
-                                        </p:cTn>
-                                        <p:tgtEl>
-                                          <p:spTgt spid="133"/>
-                                        </p:tgtEl>
-                                        <p:attrNameLst>
-                                          <p:attrName>style.visibility</p:attrName>
-                                        </p:attrNameLst>
-                                      </p:cBhvr>
-                                      <p:to>
-                                        <p:strVal val="visible"/>
-                                      </p:to>
-                                    </p:set>
                                   </p:childTnLst>
                                 </p:cTn>
                               </p:par>

</xml_diff>

<commit_message>
atualização slides de aulasss 01Set2023
</commit_message>
<xml_diff>
--- a/01 Classes/Aula03- BD Dinâmica Modelo de Domínio.pptx
+++ b/01 Classes/Aula03- BD Dinâmica Modelo de Domínio.pptx
@@ -283,7 +283,7 @@
       </p15:sldGuideLst>
     </p:ext>
     <p:ext uri="http://customooxmlschemas.google.com/">
-      <go:slidesCustomData xmlns="" xmlns:mc="http://schemas.openxmlformats.org/markup-compatibility/2006" xmlns:mv="urn:schemas-microsoft-com:mac:vml" xmlns:c="http://schemas.openxmlformats.org/drawingml/2006/chart" xmlns:dgm="http://schemas.openxmlformats.org/drawingml/2006/diagram" xmlns:o="urn:schemas-microsoft-com:office:office" xmlns:v="urn:schemas-microsoft-com:vml" xmlns:pvml="urn:schemas-microsoft-com:office:powerpoint" xmlns:com="http://schemas.openxmlformats.org/drawingml/2006/compatibility" xmlns:p14="http://schemas.microsoft.com/office/powerpoint/2010/main" xmlns:p15="http://schemas.microsoft.com/office/powerpoint/2012/main" xmlns:ahyp="http://schemas.microsoft.com/office/drawing/2018/hyperlinkcolor" xmlns:go="http://customooxmlschemas.google.com/" r:id="rId22" roundtripDataSignature="AMtx7mijM5gPELxtLrcASW3xn+zmCa30EQ=="/>
+      <go:slidesCustomData xmlns:go="http://customooxmlschemas.google.com/" xmlns:ahyp="http://schemas.microsoft.com/office/drawing/2018/hyperlinkcolor" xmlns:p15="http://schemas.microsoft.com/office/powerpoint/2012/main" xmlns:p14="http://schemas.microsoft.com/office/powerpoint/2010/main" xmlns:com="http://schemas.openxmlformats.org/drawingml/2006/compatibility" xmlns:pvml="urn:schemas-microsoft-com:office:powerpoint" xmlns:v="urn:schemas-microsoft-com:vml" xmlns:o="urn:schemas-microsoft-com:office:office" xmlns:dgm="http://schemas.openxmlformats.org/drawingml/2006/diagram" xmlns:c="http://schemas.openxmlformats.org/drawingml/2006/chart" xmlns:mv="urn:schemas-microsoft-com:mac:vml" xmlns:mc="http://schemas.openxmlformats.org/markup-compatibility/2006" xmlns="" r:id="rId22" roundtripDataSignature="AMtx7mijM5gPELxtLrcASW3xn+zmCa30EQ=="/>
     </p:ext>
   </p:extLst>
 </p:presentation>
@@ -24321,13 +24321,6 @@
             </a:r>
           </a:p>
           <a:p>
-            <a:endParaRPr lang="pt-BR" sz="2000" dirty="0">
-              <a:solidFill>
-                <a:srgbClr val="FF0000"/>
-              </a:solidFill>
-            </a:endParaRPr>
-          </a:p>
-          <a:p>
             <a:r>
               <a:rPr lang="pt-BR" sz="2000" dirty="0">
                 <a:solidFill>
@@ -24413,17 +24406,6 @@
                 <a:solidFill>
                   <a:srgbClr val="FF0000"/>
                 </a:solidFill>
-                <a:hlinkClick r:id="rId6"/>
-              </a:rPr>
-              <a:t>           </a:t>
-            </a:r>
-          </a:p>
-          <a:p>
-            <a:r>
-              <a:rPr lang="pt-BR" sz="2000" dirty="0">
-                <a:solidFill>
-                  <a:srgbClr val="FF0000"/>
-                </a:solidFill>
               </a:rPr>
               <a:t>	MySQL Community Downloads - </a:t>
             </a:r>
@@ -24516,6 +24498,139 @@
                   <a:srgbClr val="FF0000"/>
                 </a:solidFill>
               </a:rPr>
+              <a:t>	Download: </a:t>
+            </a:r>
+            <a:r>
+              <a:rPr lang="pt-BR" sz="2000" dirty="0">
+                <a:solidFill>
+                  <a:srgbClr val="FF0000"/>
+                </a:solidFill>
+                <a:hlinkClick r:id="rId9"/>
+              </a:rPr>
+              <a:t>http://www.sis4.com/brModelo/download.html</a:t>
+            </a:r>
+            <a:r>
+              <a:rPr lang="pt-BR" sz="2000" dirty="0">
+                <a:solidFill>
+                  <a:srgbClr val="FF0000"/>
+                </a:solidFill>
+              </a:rPr>
+              <a:t> (versão </a:t>
+            </a:r>
+            <a:r>
+              <a:rPr lang="pt-BR" sz="2000" dirty="0" err="1">
+                <a:solidFill>
+                  <a:srgbClr val="FF0000"/>
+                </a:solidFill>
+              </a:rPr>
+              <a:t>java</a:t>
+            </a:r>
+            <a:r>
+              <a:rPr lang="pt-BR" sz="2000" dirty="0">
+                <a:solidFill>
+                  <a:srgbClr val="FF0000"/>
+                </a:solidFill>
+              </a:rPr>
+              <a:t> -</a:t>
+            </a:r>
+            <a:r>
+              <a:rPr lang="pt-BR" sz="2000" dirty="0" err="1">
+                <a:solidFill>
+                  <a:srgbClr val="FF0000"/>
+                </a:solidFill>
+              </a:rPr>
+              <a:t>jar</a:t>
+            </a:r>
+            <a:r>
+              <a:rPr lang="pt-BR" sz="2000" dirty="0">
+                <a:solidFill>
+                  <a:srgbClr val="FF0000"/>
+                </a:solidFill>
+              </a:rPr>
+              <a:t> "brModelo.jar"); </a:t>
+            </a:r>
+          </a:p>
+          <a:p>
+            <a:r>
+              <a:rPr lang="pt-BR" sz="2000" dirty="0">
+                <a:solidFill>
+                  <a:srgbClr val="FF0000"/>
+                </a:solidFill>
+              </a:rPr>
+              <a:t>	Nota: </a:t>
+            </a:r>
+            <a:r>
+              <a:rPr lang="pt-BR" sz="2000" dirty="0">
+                <a:solidFill>
+                  <a:schemeClr val="tx1"/>
+                </a:solidFill>
+              </a:rPr>
+              <a:t>O Java deve está instalado, criar arquivo </a:t>
+            </a:r>
+            <a:r>
+              <a:rPr lang="pt-BR" sz="2000" b="1" dirty="0">
+                <a:solidFill>
+                  <a:schemeClr val="tx1"/>
+                </a:solidFill>
+              </a:rPr>
+              <a:t>brModelo.bat</a:t>
+            </a:r>
+            <a:r>
+              <a:rPr lang="pt-BR" sz="2000" dirty="0">
+                <a:solidFill>
+                  <a:schemeClr val="tx1"/>
+                </a:solidFill>
+              </a:rPr>
+              <a:t> </a:t>
+            </a:r>
+            <a:r>
+              <a:rPr lang="pt-BR" sz="2000" dirty="0">
+                <a:solidFill>
+                  <a:srgbClr val="FF0000"/>
+                </a:solidFill>
+              </a:rPr>
+              <a:t>(</a:t>
+            </a:r>
+            <a:r>
+              <a:rPr lang="pt-BR" sz="2000" dirty="0" err="1">
+                <a:solidFill>
+                  <a:srgbClr val="FF0000"/>
+                </a:solidFill>
+              </a:rPr>
+              <a:t>java</a:t>
+            </a:r>
+            <a:r>
+              <a:rPr lang="pt-BR" sz="2000" dirty="0">
+                <a:solidFill>
+                  <a:srgbClr val="FF0000"/>
+                </a:solidFill>
+              </a:rPr>
+              <a:t> -</a:t>
+            </a:r>
+            <a:r>
+              <a:rPr lang="pt-BR" sz="2000" dirty="0" err="1">
+                <a:solidFill>
+                  <a:srgbClr val="FF0000"/>
+                </a:solidFill>
+              </a:rPr>
+              <a:t>jar</a:t>
+            </a:r>
+            <a:r>
+              <a:rPr lang="pt-BR" sz="2000" dirty="0">
+                <a:solidFill>
+                  <a:srgbClr val="FF0000"/>
+                </a:solidFill>
+              </a:rPr>
+              <a:t> "brModelo.jar")</a:t>
+            </a:r>
+          </a:p>
+          <a:p>
+            <a:r>
+              <a:rPr lang="pt-BR" sz="2000" dirty="0">
+                <a:solidFill>
+                  <a:srgbClr val="FF0000"/>
+                </a:solidFill>
+              </a:rPr>
               <a:t>	Draw.io - </a:t>
             </a:r>
             <a:r>
@@ -24523,7 +24638,7 @@
                 <a:solidFill>
                   <a:srgbClr val="FF0000"/>
                 </a:solidFill>
-                <a:hlinkClick r:id="rId9"/>
+                <a:hlinkClick r:id="rId10"/>
               </a:rPr>
               <a:t>https://app.diagrams.net/</a:t>
             </a:r>
@@ -24564,13 +24679,6 @@
             </a:endParaRPr>
           </a:p>
           <a:p>
-            <a:endParaRPr lang="pt-BR" sz="2000" b="1" dirty="0">
-              <a:solidFill>
-                <a:schemeClr val="tx1"/>
-              </a:solidFill>
-            </a:endParaRPr>
-          </a:p>
-          <a:p>
             <a:r>
               <a:rPr lang="pt-BR" sz="2000" dirty="0">
                 <a:solidFill>
@@ -24584,7 +24692,7 @@
                 <a:solidFill>
                   <a:srgbClr val="FF0000"/>
                 </a:solidFill>
-                <a:hlinkClick r:id="rId10"/>
+                <a:hlinkClick r:id="rId11"/>
               </a:rPr>
               <a:t>https://www.youtube.com/watch?v=JepxObKT324</a:t>
             </a:r>

</xml_diff>